<commit_message>
Edited Gantt and Document as per new Problem Statement
</commit_message>
<xml_diff>
--- a/Timeline BC_6.pptx
+++ b/Timeline BC_6.pptx
@@ -3116,7 +3116,7 @@
         </p:nvCxnSpPr>
         <p:spPr>
           <a:xfrm>
-            <a:off x="844465" y="1942338"/>
+            <a:off x="849990" y="1566208"/>
             <a:ext cx="0" cy="94319"/>
           </a:xfrm>
           <a:prstGeom prst="line">
@@ -4192,9 +4192,9 @@
           </p:nvPr>
         </p:nvCxnSpPr>
         <p:spPr>
-          <a:xfrm flipH="1">
-            <a:off x="844465" y="1802638"/>
-            <a:ext cx="577088" cy="0"/>
+          <a:xfrm flipH="1" flipV="1">
+            <a:off x="849990" y="1426508"/>
+            <a:ext cx="629772" cy="54154"/>
           </a:xfrm>
           <a:prstGeom prst="line">
             <a:avLst/>
@@ -5210,8 +5210,8 @@
         </p:nvSpPr>
         <p:spPr>
           <a:xfrm>
-            <a:off x="844465" y="1289219"/>
-            <a:ext cx="1320800" cy="279400"/>
+            <a:off x="844464" y="2034246"/>
+            <a:ext cx="2633687" cy="290870"/>
           </a:xfrm>
           <a:prstGeom prst="homePlate">
             <a:avLst/>
@@ -5291,7 +5291,7 @@
         </p:nvSpPr>
         <p:spPr>
           <a:xfrm>
-            <a:off x="844465" y="1662938"/>
+            <a:off x="849990" y="1286808"/>
             <a:ext cx="1320800" cy="279400"/>
           </a:xfrm>
           <a:prstGeom prst="homePlate">
@@ -5372,7 +5372,7 @@
         </p:nvSpPr>
         <p:spPr>
           <a:xfrm>
-            <a:off x="844465" y="2036657"/>
+            <a:off x="849990" y="1660527"/>
             <a:ext cx="1320800" cy="279400"/>
           </a:xfrm>
           <a:prstGeom prst="homePlate">
@@ -6772,8 +6772,8 @@
         </p:nvSpPr>
         <p:spPr>
           <a:xfrm>
-            <a:off x="2207239" y="1351407"/>
-            <a:ext cx="381000" cy="155025"/>
+            <a:off x="3520124" y="2097002"/>
+            <a:ext cx="865255" cy="153888"/>
           </a:xfrm>
           <a:prstGeom prst="rect">
             <a:avLst/>
@@ -6787,13 +6787,13 @@
           <a:lstStyle/>
           <a:p>
             <a:r>
-              <a:rPr lang="en-US" sz="1000" spc="-4">
+              <a:rPr lang="en-US" sz="1000" spc="-4" dirty="0">
                 <a:solidFill>
                   <a:schemeClr val="dk2"/>
                 </a:solidFill>
                 <a:latin typeface="Calibri" panose="020F0502020204030204" pitchFamily="34" charset="0"/>
               </a:rPr>
-              <a:t>Mar 27</a:t>
+              <a:t>Mar 27 – Mar 28</a:t>
             </a:r>
           </a:p>
         </p:txBody>
@@ -6816,8 +6816,8 @@
         </p:nvSpPr>
         <p:spPr>
           <a:xfrm>
-            <a:off x="869918" y="1343660"/>
-            <a:ext cx="1270000" cy="170519"/>
+            <a:off x="802490" y="2097209"/>
+            <a:ext cx="2603718" cy="169277"/>
           </a:xfrm>
           <a:prstGeom prst="rect">
             <a:avLst/>
@@ -7028,7 +7028,7 @@
         </p:nvSpPr>
         <p:spPr>
           <a:xfrm>
-            <a:off x="902440" y="1683335"/>
+            <a:off x="907965" y="1307205"/>
             <a:ext cx="1044704" cy="227296"/>
           </a:xfrm>
           <a:prstGeom prst="rect">
@@ -7072,7 +7072,7 @@
         </p:nvSpPr>
         <p:spPr>
           <a:xfrm>
-            <a:off x="2207239" y="1725126"/>
+            <a:off x="2212764" y="1348996"/>
             <a:ext cx="381000" cy="155025"/>
           </a:xfrm>
           <a:prstGeom prst="rect">
@@ -7283,7 +7283,7 @@
         </p:nvSpPr>
         <p:spPr>
           <a:xfrm>
-            <a:off x="2207239" y="2098844"/>
+            <a:off x="2212764" y="1722714"/>
             <a:ext cx="381000" cy="155025"/>
           </a:xfrm>
           <a:prstGeom prst="rect">
@@ -7327,7 +7327,7 @@
         </p:nvSpPr>
         <p:spPr>
           <a:xfrm>
-            <a:off x="1143053" y="2091097"/>
+            <a:off x="1148578" y="1714967"/>
             <a:ext cx="723900" cy="170519"/>
           </a:xfrm>
           <a:prstGeom prst="rect">
@@ -10028,7 +10028,7 @@
 
 <file path=ppt/tags/tag1.xml><?xml version="1.0" encoding="utf-8"?>
 <p:tagLst xmlns:a="http://schemas.openxmlformats.org/drawingml/2006/main" xmlns:r="http://schemas.openxmlformats.org/officeDocument/2006/relationships" xmlns:p="http://schemas.openxmlformats.org/presentationml/2006/main">
-  <p:tag name="__PART_0" val="eyIkaWQiOiIxIiwiQ3VsdHVyZUluZm9OYW1lIjoiZW4tVVMiLCJTdHlsZU5hbWUiOm51bGwsIlZlcnNpb24iOnsiJGlkIjoiMiIsIlZlcnNpb24iOiIzLjMuMiIsIk9yaWdpbmFsQXNzZW1ibHlWZXJzaW9uIjoiNS4wMS4wMC4wMCIsIkVkaXRpb24iOiJGcmVlIiwiSXNQbHVzRWRpdGlvbiI6ZmFsc2UsIklzUHJvRWRpdGlvbiI6ZmFsc2V9LCJFZmZlY3QiOjEsIlN0eWxlIjp7IiRpZCI6IjMiLCJUaW1lYmFuZFN0eWxlIjp7IiRpZCI6IjQiLCJTY2FsZU1hcmtpbmciOjAsIlNoYXBlIjozLCJTaGFwZVN0eWxlIjp7IiRpZCI6IjUiLCJNYXJnaW4iOnsiJGlkIjoiNiIsIlRvcCI6MCwiTGVmdCI6MTAsIlJpZ2h0IjoxMCwiQm90dG9tIjowfSwiUGFkZGluZyI6eyIkaWQiOiI3IiwiVG9wIjozLCJMZWZ0IjowLCJSaWdodCI6MCwiQm90dG9tIjozfSwiQmFja2dyb3VuZCI6eyIkaWQiOiI4IiwiQ29sb3IiOnsiJGlkIjoiOSIsIkEiOjI1NSwiUiI6MTc4LCJHIjoxNzgsIkIiOjE3OH19LCJJc1Zpc2libGUiOnRydWUsIldpZHRoIjowLjAsIkhlaWdodCI6MzAuMCwiQm9yZGVyU3R5bGUiOnsiJGlkIjoiMTAiLCJMaW5lQ29sb3IiOnsiJGlkIjoiMTEiLCIkdHlwZSI6Ik5MUkUuQ29tbW9uLkRvbS5Tb2xpZENvbG9yQnJ1c2gsIE5MUkUuQ29tbW9uIiwiQ29sb3IiOnsiJGlkIjoiMTIiLCJBIjoyNTUsIlIiOjI1NSwiRyI6MCwiQiI6MH19LCJMaW5lV2VpZ2h0IjowLjAsIkxpbmVUeXBlIjowLCJQYXJlbnRTdHlsZSI6bnVsbH0sIlBhcmVudFN0eWxlIjpudWxsfSwiUmlnaHRFbmRDYXBzU3R5bGUiOnsiJGlkIjoiMTMiLCJGb250U2V0dGluZ3MiOnsiJGlkIjoiMTQiLCJGb250U2l6ZSI6MTgsIkZvbnROYW1lIjoiQ2FsaWJyaSIsIklzQm9sZCI6dHJ1ZSwiSXNJdGFsaWMiOmZhbHNlLCJJc1VuZGVybGluZWQiOmZhbHNlLCJQYXJlbnRTdHlsZSI6bnVsbH0sIkF1dG9TaXplIjowLCJGb3JlZ3JvdW5kIjp7IiRpZCI6IjE1IiwiQ29sb3IiOnsiJGlkIjoiMTYiLCJBIjoyNTUsIlIiOjIzNywiRyI6MTI1LCJCIjo0OX19LCJNYXhXaWR0aCI6IkluZmluaXR5IiwiTWF4SGVpZ2h0IjoiSW5maW5pdHkiLCJTbWFydEZvcmVncm91bmRJc0FjdGl2ZSI6ZmFsc2UsIkhvcml6b250YWxBbGlnbm1lbnQiOjAsIlZlcnRpY2FsQWxpZ25tZW50IjowLCJTbWFydEZvcmVncm91bmQiOm51bGwsIkJhY2tncm91bmRGaWxsVHlwZSI6MCwiTWFyZ2luIjp7IiRpZCI6IjE3IiwiVG9wIjowLCJMZWZ0IjowLCJSaWdodCI6MjAsIkJvdHRvbSI6MH0sIlBhZGRpbmciOnsiJGlkIjoiMTgiLCJUb3AiOjAsIkxlZnQiOjAsIlJpZ2h0IjowLCJCb3R0b20iOjB9LCJCYWNrZ3JvdW5kIjp7IiRpZCI6IjE5IiwiQ29sb3IiOnsiJGlkIjoiMjAiLCJBIjo4OSwiUiI6MCwiRyI6MCwiQiI6MH19LCJJc1Zpc2libGUiOnRydWUsIldpZHRoIjowLjAsIkhlaWdodCI6MC4wLCJCb3JkZXJTdHlsZSI6bnVsbCwiUGFyZW50U3R5bGUiOm51bGx9LCJMZWZ0RW5kQ2Fwc1N0eWxlIjp7IiRpZCI6IjIxIiwiRm9udFNldHRpbmdzIjp7IiRpZCI6IjIyIiwiRm9udFNpemUiOjE4LCJGb250TmFtZSI6IkNhbGlicmkiLCJJc0JvbGQiOnRydWUsIklzSXRhbGljIjpmYWxzZSwiSXNVbmRlcmxpbmVkIjpmYWxzZSwiUGFyZW50U3R5bGUiOm51bGx9LCJBdXRvU2l6ZSI6MCwiRm9yZWdyb3VuZCI6eyIkaWQiOiIyMyIsIkNvbG9yIjp7IiRpZCI6IjI0IiwiQSI6MjU1LCJSIjoyMzcsIkciOjEyNSwiQiI6NDl9fSwiTWF4V2lkdGgiOiJJbmZpbml0eSIsIk1heEhlaWdodCI6IkluZmluaXR5IiwiU21hcnRGb3JlZ3JvdW5kSXNBY3RpdmUiOmZhbHNlLCJIb3Jpem9udGFsQWxpZ25tZW50IjowLCJWZXJ0aWNhbEFsaWdubWVudCI6MCwiU21hcnRGb3JlZ3JvdW5kIjpudWxsLCJCYWNrZ3JvdW5kRmlsbFR5cGUiOjAsIk1hcmdpbiI6eyIkaWQiOiIyNSIsIlRvcCI6MCwiTGVmdCI6MjAsIlJpZ2h0IjowLCJCb3R0b20iOjB9LCJQYWRkaW5nIjp7IiRpZCI6IjI2IiwiVG9wIjowLCJMZWZ0IjowLCJSaWdodCI6MCwiQm90dG9tIjowfSwiQmFja2dyb3VuZCI6eyIkaWQiOiIyNyIsIkNvbG9yIjp7IiRyZWYiOiIyMCJ9fSwiSXNWaXNpYmxlIjpmYWxzZSwiV2lkdGgiOjAuMCwiSGVpZ2h0IjowLjAsIkJvcmRlclN0eWxlIjpudWxsLCJQYXJlbnRTdHlsZSI6bnVsbH0sIlRvZGF5VGV4dFN0eWxlIjp7IiRpZCI6IjI4IiwiRm9udFNldHRpbmdzIjp7IiRpZCI6IjI5IiwiRm9udFNpemUiOjEyLCJGb250TmFtZSI6IkNhbGlicmkiLCJJc0JvbGQiOmZhbHNlLCJJc0l0YWxpYyI6ZmFsc2UsIklzVW5kZXJsaW5lZCI6ZmFsc2UsIlBhcmVudFN0eWxlIjpudWxsfSwiQXV0b1NpemUiOjAsIkZvcmVncm91bmQiOnsiJGlkIjoiMzAiLCJDb2xvciI6eyIkaWQiOiIzMSIsIkEiOjI1NSwiUiI6MCwiRyI6MCwiQiI6MH19LCJNYXhXaWR0aCI6MjAwLjAsIk1heEhlaWdodCI6IkluZmluaXR5IiwiU21hcnRGb3JlZ3JvdW5kSXNBY3RpdmUiOmZhbHNlLCJIb3Jpem9udGFsQWxpZ25tZW50IjowLCJWZXJ0aWNhbEFsaWdubWVudCI6MCwiU21hcnRGb3JlZ3JvdW5kIjpudWxsLCJCYWNrZ3JvdW5kRmlsbFR5cGUiOjAsIk1hcmdpbiI6eyIkaWQiOiIzMiIsIlRvcCI6MCwiTGVmdCI6MCwiUmlnaHQiOjAsIkJvdHRvbSI6MH0sIlBhZGRpbmciOnsiJGlkIjoiMzMiLCJUb3AiOjAsIkxlZnQiOjAsIlJpZ2h0IjowLCJCb3R0b20iOjB9LCJCYWNrZ3JvdW5kIjp7IiRpZCI6IjM0IiwiQ29sb3IiOnsiJHJlZiI6IjIwIn19LCJJc1Zpc2libGUiOnRydWUsIldpZHRoIjowLjAsIkhlaWdodCI6MC4wLCJCb3JkZXJTdHlsZSI6bnVsbCwiUGFyZW50U3R5bGUiOm51bGx9LCJUb2RheU1hcmtlclN0eWxlIjp7IiRpZCI6IjM1IiwiTWFyZ2luIjp7IiRpZCI6IjM2IiwiVG9wIjowLCJMZWZ0IjowLCJSaWdodCI6MCwiQm90dG9tIjowfSwiUGFkZGluZyI6eyIkaWQiOiIzNyIsIlRvcCI6MCwiTGVmdCI6MCwiUmlnaHQiOjAsIkJvdHRvbSI6MH0sIkJhY2tncm91bmQiOnsiJGlkIjoiMzgiLCJDb2xvciI6eyIkaWQiOiIzOSIsIkEiOjI1NSwiUiI6MjU1LCJHIjowLCJCIjowfX0sIklzVmlzaWJsZSI6dHJ1ZSwiV2lkdGgiOjAuMCwiSGVpZ2h0IjowLjAsIkJvcmRlclN0eWxlIjpudWxsLCJQYXJlbnRTdHlsZSI6bnVsbH0sIlNjYWxlU3R5bGUiOnsiJGlkIjoiNDAiLCJTaG93U2VnbWVudFNlcGFyYXRvcnMiOmZhbHNlLCJTZWdtZW50U2VwYXJhdG9yT3BhY2l0eSI6MzAsIkZvbnRTZXR0aW5ncyI6eyIkaWQiOiI0MSIsIkZvbnRTaXplIjoxMiwiRm9udE5hbWUiOiJDYWxpYnJpIiwiSXNCb2xkIjpmYWxzZSwiSXNJdGFsaWMiOmZhbHNlLCJJc1VuZGVybGluZWQiOmZhbHNlLCJQYXJlbnRTdHlsZSI6bnVsbH0sIkF1dG9TaXplIjowLCJGb3JlZ3JvdW5kIjp7IiRpZCI6IjQyIiwiQ29sb3IiOnsiJGlkIjoiNDMiLCJBIjoyNTUsIlIiOjAsIkciOjAsIkIiOjB9fSwiTWF4V2lkdGgiOjIwMC4wLCJNYXhIZWlnaHQiOiJJbmZpbml0eSIsIlNtYXJ0Rm9yZWdyb3VuZElzQWN0aXZlIjpmYWxzZSwiSG9yaXpvbnRhbEFsaWdubWVudCI6MCwiVmVydGljYWxBbGlnbm1lbnQiOjEsIlNtYXJ0Rm9yZWdyb3VuZCI6bnVsbCwiQmFja2dyb3VuZEZpbGxUeXBlIjowLCJNYXJnaW4iOnsiJGlkIjoiNDQiLCJUb3AiOjAsIkxlZnQiOjUsIlJpZ2h0IjowLCJCb3R0b20iOjB9LCJQYWRkaW5nIjp7IiRpZCI6IjQ1IiwiVG9wIjowLCJMZWZ0IjowLCJSaWdodCI6MCwiQm90dG9tIjowfSwiQmFja2dyb3VuZCI6eyIkaWQiOiI0NiIsIkNvbG9yIjp7IiRyZWYiOiIyMCJ9fSwiSXNWaXNpYmxlIjp0cnVlLCJXaWR0aCI6MC4wLCJIZWlnaHQiOjAuMCwiQm9yZGVyU3R5bGUiOm51bGwsIlBhcmVudFN0eWxlIjpudWxsfSwiRWxhcHNlZFRpbWVCYWNrZ3JvdW5kIjp7IiRpZCI6IjQ3IiwiQ29sb3IiOnsiJGlkIjoiNDgiLCJBIjo3NywiUiI6MjU1LCJHIjoxOTIsIkIiOjB9fSwiQXBwZW5kWWVhck9uWWVhckNoYW5nZSI6dHJ1ZSwiRWxhcHNlZFRpbWVGb3JtYXQiOjEsIlRvZGF5TWFya2VyUG9zaXRpb24iOjMsIlF1aWNrUG9zaXRpb24iOjIsIkFic29sdXRlUG9zaXRpb24iOjQwNS4wLCJNYXJnaW4iOnsiJGlkIjoiNDkiLCJUb3AiOjAsIkxlZnQiOjEwLCJSaWdodCI6MTAsIkJvdHRvbSI6MH0sIlBhZGRpbmciOnsiJGlkIjoiNTAiLCJUb3AiOjAsIkxlZnQiOjAsIlJpZ2h0IjowLCJCb3R0b20iOjB9LCJCYWNrZ3JvdW5kIjp7IiRpZCI6IjUxIiwiQ29sb3IiOnsiJGlkIjoiNTIiLCJBIjoyNTUsIlIiOjE3OCwiRyI6MTc4LCJCIjoxNzh9fSwiSXNWaXNpYmxlIjp0cnVlLCJXaWR0aCI6MC4wLCJIZWlnaHQiOjAuMCwiQm9yZGVyU3R5bGUiOm51bGwsIlBhcmVudFN0eWxlIjpudWxsfSwiRGVmYXVsdE1pbGVzdG9uZVN0eWxlIjp7IiRpZCI6IjUzIiwiU2hhcGUiOjcsIkNvbm5lY3Rvck1hcmdpbiI6eyIkaWQiOiI1NCIsIlRvcCI6MCwiTGVmdCI6MiwiUmlnaHQiOjIsIkJvdHRvbSI6MH0sIkNvbm5lY3RvclN0eWxlIjp7IiRpZCI6IjU1IiwiTGluZUNvbG9yIjp7IiRpZCI6IjU2IiwiJHR5cGUiOiJOTFJFLkNvbW1vbi5Eb20uU29saWRDb2xvckJydXNoLCBOTFJFLkNvbW1vbiIsIkNvbG9yIjp7IiRpZCI6IjU3IiwiQSI6MTI3LCJSIjozMSwiRyI6NzMsIkIiOjEyNn19LCJMaW5lV2VpZ2h0IjoxLjAsIkxpbmVUeXBlIjowLCJQYXJlbnRTdHlsZSI6bnVsbH0sIklzQmVsb3dUaW1lYmFuZCI6ZmFsc2UsIlBvc2l0aW9uT25UYXNrIjowLCJIaWRlRGF0ZSI6ZmFsc2UsIlNoYXBlU2l6ZSI6MSwiU3BhY2luZyI6Mi4wLCJQYWRkaW5nIjp7IiRpZCI6IjU4IiwiVG9wIjo3LCJMZWZ0IjozLCJSaWdodCI6MCwiQm90dG9tIjoyfSwiU2hhcGVTdHlsZSI6eyIkaWQiOiI1OSIsIk1hcmdpbiI6eyIkaWQiOiI2MCIsIlRvcCI6MCwiTGVmdCI6MCwiUmlnaHQiOjAsIkJvdHRvbSI6MH0sIlBhZGRpbmciOnsiJGlkIjoiNjEiLCJUb3AiOjAsIkxlZnQiOjAsIlJpZ2h0IjowLCJCb3R0b20iOjB9LCJCYWNrZ3JvdW5kIjp7IiRpZCI6IjYyIiwiQ29sb3IiOnsiJGlkIjoiNjMiLCJBIjoyNTUsIlIiOjAsIkciOjExNCwiQiI6MTg4fX0sIklzVmlzaWJsZSI6dHJ1ZSwiV2lkdGgiOjE4LjAsIkhlaWdodCI6MjAuMCwiQm9yZGVyU3R5bGUiOnsiJGlkIjoiNjQiLCJMaW5lQ29sb3IiOnsiJGlkIjoiNjUiLCIkdHlwZSI6Ik5MUkUuQ29tbW9uLkRvbS5Tb2xpZENvbG9yQnJ1c2gsIE5MUkUuQ29tbW9uIiwiQ29sb3IiOnsiJGlkIjoiNjYiLCJBIjoyNTUsIlIiOjI1NSwiRyI6MCwiQiI6MH19LCJMaW5lV2VpZ2h0IjowLjAsIkxpbmVUeXBlIjowLCJQYXJlbnRTdHlsZSI6bnVsbH0sIlBhcmVudFN0eWxlIjpudWxsfSwiVGl0bGVTdHlsZSI6eyIkaWQiOiI2NyIsIkZvbnRTZXR0aW5ncyI6eyIkaWQiOiI2OCIsIkZvbnRTaXplIjoxMSwiRm9udE5hbWUiOiJDYWxpYnJpIiwiSXNCb2xkIjp0cnVlLCJJc0l0YWxpYyI6ZmFsc2UsIklzVW5kZXJsaW5lZCI6ZmFsc2UsIlBhcmVudFN0eWxlIjpudWxsfSwiQXV0b1NpemUiOjAsIkZvcmVncm91bmQiOnsiJGlkIjoiNjkiLCJDb2xvciI6eyIkaWQiOiI3MCIsIkEiOjI1NSwiUiI6MCwiRyI6MCwiQiI6MH19LCJNYXhXaWR0aCI6MjAwLjAsIk1heEhlaWdodCI6IkluZmluaXR5IiwiU21hcnRGb3JlZ3JvdW5kSXNBY3RpdmUiOmZhbHNlLCJIb3Jpem9udGFsQWxpZ25tZW50IjoxLCJWZXJ0aWNhbEFsaWdubWVudCI6MCwiU21hcnRGb3JlZ3JvdW5kIjpudWxsLCJCYWNrZ3JvdW5kRmlsbFR5cGUiOjAsIk1hcmdpbiI6eyIkaWQiOiI3MSIsIlRvcCI6MCwiTGVmdCI6MCwiUmlnaHQiOjAsIkJvdHRvbSI6MH0sIlBhZGRpbmciOnsiJGlkIjoiNzIiLCJUb3AiOjAsIkxlZnQiOjAsIlJpZ2h0IjowLCJCb3R0b20iOjB9LCJCYWNrZ3JvdW5kIjp7IiRpZCI6IjczIiwiQ29sb3IiOnsiJHJlZiI6IjIwIn19LCJJc1Zpc2libGUiOnRydWUsIldpZHRoIjowLjAsIkhlaWdodCI6MC4wLCJCb3JkZXJTdHlsZSI6bnVsbCwiUGFyZW50U3R5bGUiOm51bGx9LCJEYXRlU3R5bGUiOnsiJGlkIjoiNzQiLCJGb250U2V0dGluZ3MiOnsiJGlkIjoiNzUiLCJGb250U2l6ZSI6MTAsIkZvbnROYW1lIjoiQ2FsaWJyaSIsIklzQm9sZCI6ZmFsc2UsIklzSXRhbGljIjpmYWxzZSwiSXNVbmRlcmxpbmVkIjpmYWxzZSwiUGFyZW50U3R5bGUiOm51bGx9LCJBdXRvU2l6ZSI6MCwiRm9yZWdyb3VuZCI6eyIkaWQiOiI3NiIsIkNvbG9yIjp7IiRpZCI6Ijc3IiwiQSI6MjU1LCJSIjo2OCwiRyI6ODQsIkIiOjEwNn19LCJNYXhXaWR0aCI6MjAwLjAsIk1heEhlaWdodCI6IkluZmluaXR5IiwiU21hcnRGb3JlZ3JvdW5kSXNBY3RpdmUiOmZhbHNlLCJIb3Jpem9udGFsQWxpZ25tZW50IjowLCJWZXJ0aWNhbEFsaWdubWVudCI6MCwiU21hcnRGb3JlZ3JvdW5kIjpudWxsLCJCYWNrZ3JvdW5kRmlsbFR5cGUiOjAsIk1hcmdpbiI6eyIkaWQiOiI3OCIsIlRvcCI6MCwiTGVmdCI6MCwiUmlnaHQiOjAsIkJvdHRvbSI6MH0sIlBhZGRpbmciOnsiJGlkIjoiNzkiLCJUb3AiOjAsIkxlZnQiOjAsIlJpZ2h0IjowLCJCb3R0b20iOjB9LCJCYWNrZ3JvdW5kIjp7IiRpZCI6IjgwIiwiQ29sb3IiOnsiJHJlZiI6IjIwIn19LCJJc1Zpc2libGUiOnRydWUsIldpZHRoIjowLjAsIkhlaWdodCI6MC4wLCJCb3JkZXJTdHlsZSI6bnVsbCwiUGFyZW50U3R5bGUiOm51bGx9LCJEYXRlRm9ybWF0Ijp7IiRpZCI6IjgxIiwiRm9ybWF0U3RyaW5nIjoiTU1NIGQiLCJTZXBhcmF0b3IiOiIvIiwiVXNlSW50ZXJuYXRpb25hbERhdGVGb3JtYXQiOmZhbHNlLCJEYXRlSXNWaXNpYmxlIjp0cnVlLCJUaW1lSXNWaXNpYmxlIjpmYWxzZSwiSG91ckRpZ2l0cyI6MSwiQW1QbURlc2lnbmF0b3IiOjIsIlRyaW0wME1pbnV0ZXMiOmZhbHNlLCJMYXN0S25vd25WaXNpYmlsaXR5U3RhdGUiOm51bGx9LCJXZWVrTnVtYmVyaW5nIjp7IiRpZCI6IjgyIiwiRm9ybWF0IjowLCJJc1Zpc2libGUiOmZhbHNlLCJMYXN0S25vd25WaXNpYmlsaXR5U3RhdGUiOmZhbHNlfSwiSXNWaXNpYmxlIjp0cnVlLCJQYXJlbnRTdHlsZSI6bnVsbH0sIkRlZmF1bHRUYXNrU3R5bGUiOnsiJGlkIjoiODMiLCJTaGFwZSI6MCwiU2hhcGVUaGlja25lc3MiOjIsIkR1cmF0aW9uRm9ybWF0IjowLCJJbmNsdWRlTm9uV29ya2luZ0RheXNJbkR1cmF0aW9uIjpmYWxzZSwiUGVyY2VudGFnZUNvbXBsZXRlU3R5bGUiOnsiJGlkIjoiODQiLCJGb250U2V0dGluZ3MiOnsiJGlkIjoiODUiLCJGb250U2l6ZSI6MTAsIkZvbnROYW1lIjoiQ2FsaWJyaSIsIklzQm9sZCI6ZmFsc2UsIklzSXRhbGljIjpmYWxzZSwiSXNVbmRlcmxpbmVkIjpmYWxzZSwiUGFyZW50U3R5bGUiOm51bGx9LCJBdXRvU2l6ZSI6MCwiRm9yZWdyb3VuZCI6eyIkaWQiOiI4NiIsIkNvbG9yIjp7IiRpZCI6Ijg3IiwiQSI6MjU1LCJSIjoyMzcsIkciOjEyNSwiQiI6NDl9fSwiTWF4V2lkdGgiOjIwMC4wLCJNYXhIZWlnaHQiOiJJbmZpbml0eSIsIlNtYXJ0Rm9yZWdyb3VuZElzQWN0aXZlIjpmYWxzZSwiSG9yaXpvbnRhbEFsaWdubWVudCI6MCwiVmVydGljYWxBbGlnbm1lbnQiOjAsIlNtYXJ0Rm9yZWdyb3VuZCI6bnVsbCwiQmFja2dyb3VuZEZpbGxUeXBlIjowLCJNYXJnaW4iOnsiJGlkIjoiODgiLCJUb3AiOjAsIkxlZnQiOjAsIlJpZ2h0IjowLCJCb3R0b20iOjB9LCJQYWRkaW5nIjp7IiRpZCI6Ijg5IiwiVG9wIjowLCJMZWZ0IjowLCJSaWdodCI6MCwiQm90dG9tIjowfSwiQmFja2dyb3VuZCI6eyIkaWQiOiI5MCIsIkNvbG9yIjp7IiRyZWYiOiIyMCJ9fSwiSXNWaXNpYmxlIjp0cnVlLCJXaWR0aCI6MC4wLCJIZWlnaHQiOjAuMCwiQm9yZGVyU3R5bGUiOm51bGwsIlBhcmVudFN0eWxlIjpudWxsfSwiRHVyYXRpb25TdHlsZSI6eyIkaWQiOiI5MSIsIkZvbnRTZXR0aW5ncyI6eyIkaWQiOiI5MiIsIkZvbnRTaXplIjoxMCwiRm9udE5hbWUiOiJDYWxpYnJpIiwiSXNCb2xkIjpmYWxzZSwiSXNJdGFsaWMiOmZhbHNlLCJJc1VuZGVybGluZWQiOmZhbHNlLCJQYXJlbnRTdHlsZSI6bnVsbH0sIkF1dG9TaXplIjowLCJGb3JlZ3JvdW5kIjp7IiRpZCI6IjkzIiwiQ29sb3IiOnsiJGlkIjoiOTQiLCJBIjoyNTUsIlIiOjIzNywiRyI6MTI1LCJCIjo0OX19LCJNYXhXaWR0aCI6MjAwLjAsIk1heEhlaWdodCI6IkluZmluaXR5IiwiU21hcnRGb3JlZ3JvdW5kSXNBY3RpdmUiOmZhbHNlLCJIb3Jpem9udGFsQWxpZ25tZW50IjowLCJWZXJ0aWNhbEFsaWdubWVudCI6MCwiU21hcnRGb3JlZ3JvdW5kIjpudWxsLCJCYWNrZ3JvdW5kRmlsbFR5cGUiOjAsIk1hcmdpbiI6eyIkaWQiOiI5NSIsIlRvcCI6MCwiTGVmdCI6MCwiUmlnaHQiOjAsIkJvdHRvbSI6MH0sIlBhZGRpbmciOnsiJGlkIjoiOTYiLCJUb3AiOjAsIkxlZnQiOjAsIlJpZ2h0IjowLCJCb3R0b20iOjB9LCJCYWNrZ3JvdW5kIjp7IiRpZCI6Ijk3IiwiQ29sb3IiOnsiJHJlZiI6IjIwIn19LCJJc1Zpc2libGUiOnRydWUsIldpZHRoIjowLjAsIkhlaWdodCI6MC4wLCJCb3JkZXJTdHlsZSI6bnVsbCwiUGFyZW50U3R5bGUiOm51bGx9LCJIb3Jpem9udGFsQ29ubmVjdG9yU3R5bGUiOnsiJGlkIjoiOTgiLCJMaW5lQ29sb3IiOnsiJGlkIjoiOTkiLCIkdHlwZSI6Ik5MUkUuQ29tbW9uLkRvbS5Tb2xpZENvbG9yQnJ1c2gsIE5MUkUuQ29tbW9uIiwiQ29sb3IiOnsiJGlkIjoiMTAwIiwiQSI6MjU1LCJSIjoyMDQsIkciOjIwNCwiQiI6MjA0fX0sIkxpbmVXZWlnaHQiOjEuMCwiTGluZVR5cGUiOjAsIlBhcmVudFN0eWxlIjpudWxsfSwiVmVydGljYWxDb25uZWN0b3JTdHlsZSI6eyIkaWQiOiIxMDEiLCJMaW5lQ29sb3IiOnsiJGlkIjoiMTAyIiwiJHR5cGUiOiJOTFJFLkNvbW1vbi5Eb20uU29saWRDb2xvckJydXNoLCBOTFJFLkNvbW1vbiIsIkNvbG9yIjp7IiRpZCI6IjEwMyIsIkEiOjI1NSwiUiI6MjA0LCJHIjoyMDQsIkIiOjIwNH19LCJMaW5lV2VpZ2h0IjoxLjAsIkxpbmVUeXBlIjowLCJQYXJlbnRTdHlsZSI6bnVsbH0sIk1hcmdpbiI6bnVsbCwiU3RhcnREYXRlUG9zaXRpb24iOjQsIkVuZERhdGVQb3NpdGlvbiI6NCwiRGF0ZUlzVmlzaWJsZSI6dHJ1ZSwiVGl0bGVQb3NpdGlvbiI6MiwiRHVyYXRpb25Qb3NpdGlvbiI6NiwiUGVyY2VudGFnZUNvbXBsZXRlZFBvc2l0aW9uIjo2LCJTcGFjaW5nIjo1LCJJc0JlbG93VGltZWJhbmQiOmZhbHNlLCJQZXJjZW50YWdlQ29tcGxldGVTaGFwZU9wYWNpdHkiOjM1LCJTaGFwZVN0eWxlIjp7IiRpZCI6IjEwNCIsIk1hcmdpbiI6eyIkaWQiOiIxMDUiLCJUb3AiOjAsIkxlZnQiOjQsIlJpZ2h0Ijo0LCJCb3R0b20iOjB9LCJQYWRkaW5nIjp7IiRpZCI6IjEwNiIsIlRvcCI6MCwiTGVmdCI6MCwiUmlnaHQiOjAsIkJvdHRvbSI6MH0sIkJhY2tncm91bmQiOnsiJGlkIjoiMTA3IiwiQ29sb3IiOnsiJGlkIjoiMTA4IiwiQSI6MjU1LCJSIjowLCJHIjoxMTQsIkIiOjE4OH19LCJJc1Zpc2libGUiOnRydWUsIldpZHRoIjowLjAsIkhlaWdodCI6MjIuMCwiQm9yZGVyU3R5bGUiOnsiJGlkIjoiMTA5IiwiTGluZUNvbG9yIjp7IiRpZCI6IjExMCIsIiR0eXBlIjoiTkxSRS5Db21tb24uRG9tLlNvbGlkQ29sb3JCcnVzaCwgTkxSRS5Db21tb24iLCJDb2xvciI6eyIkaWQiOiIxMTEiLCJBIjoyNTUsIlIiOjI1NSwiRyI6MCwiQiI6MH19LCJMaW5lV2VpZ2h0IjowLjAsIkxpbmVUeXBlIjowLCJQYXJlbnRTdHlsZSI6bnVsbH0sIlBhcmVudFN0eWxlIjpudWxsfSwiVGl0bGVTdHlsZSI6eyIkaWQiOiIxMTIiLCJGb250U2V0dGluZ3MiOnsiJGlkIjoiMTEzIiwiRm9udFNpemUiOjExLCJGb250TmFtZSI6IkNhbGlicmkiLCJJc0JvbGQiOnRydWUsIklzSXRhbGljIjpmYWxzZSwiSXNVbmRlcmxpbmVkIjpmYWxzZSwiUGFyZW50U3R5bGUiOm51bGx9LCJBdXRvU2l6ZSI6MCwiRm9yZWdyb3VuZCI6eyIkaWQiOiIxMTQiLCJDb2xvciI6eyIkaWQiOiIxMTUiLCJBIjoyNTUsIlIiOjAsIkciOjAsIkIiOjB9fSwiTWF4V2lkdGgiOjk2MC4wLCJNYXhIZWlnaHQiOiJJbmZpbml0eSIsIlNtYXJ0Rm9yZWdyb3VuZElzQWN0aXZlIjpmYWxzZSwiSG9yaXpvbnRhbEFsaWdubWVudCI6MSwiVmVydGljYWxBbGlnbm1lbnQiOjAsIlNtYXJ0Rm9yZWdyb3VuZCI6bnVsbCwiQmFja2dyb3VuZEZpbGxUeXBlIjowLCJNYXJnaW4iOnsiJGlkIjoiMTE2IiwiVG9wIjowLCJMZWZ0IjowLCJSaWdodCI6MCwiQm90dG9tIjowfSwiUGFkZGluZyI6eyIkaWQiOiIxMTciLCJUb3AiOjAsIkxlZnQiOjAsIlJpZ2h0IjowLCJCb3R0b20iOjB9LCJCYWNrZ3JvdW5kIjp7IiRpZCI6IjExOCIsIkNvbG9yIjp7IiRyZWYiOiIyMCJ9fSwiSXNWaXNpYmxlIjp0cnVlLCJXaWR0aCI6MC4wLCJIZWlnaHQiOjAuMCwiQm9yZGVyU3R5bGUiOm51bGwsIlBhcmVudFN0eWxlIjpudWxsfSwiRGF0ZVN0eWxlIjp7IiRpZCI6IjExOSIsIkZvbnRTZXR0aW5ncyI6eyIkaWQiOiIxMjAiLCJGb250U2l6ZSI6MTAsIkZvbnROYW1lIjoiQ2FsaWJyaSIsIklzQm9sZCI6ZmFsc2UsIklzSXRhbGljIjpmYWxzZSwiSXNVbmRlcmxpbmVkIjpmYWxzZSwiUGFyZW50U3R5bGUiOm51bGx9LCJBdXRvU2l6ZSI6MCwiRm9yZWdyb3VuZCI6eyIkaWQiOiIxMjEiLCJDb2xvciI6eyIkaWQiOiIxMjIiLCJBIjoyNTUsIlIiOjY4LCJHIjo4NCwiQiI6MTA2fX0sIk1heFdpZHRoIjoyMDAuMCwiTWF4SGVpZ2h0IjoiSW5maW5pdHkiLCJTbWFydEZvcmVncm91bmRJc0FjdGl2ZSI6ZmFsc2UsIkhvcml6b250YWxBbGlnbm1lbnQiOjAsIlZlcnRpY2FsQWxpZ25tZW50IjowLCJTbWFydEZvcmVncm91bmQiOm51bGwsIkJhY2tncm91bmRGaWxsVHlwZSI6MCwiTWFyZ2luIjp7IiRpZCI6IjEyMyIsIlRvcCI6MCwiTGVmdCI6MCwiUmlnaHQiOjAsIkJvdHRvbSI6MH0sIlBhZGRpbmciOnsiJGlkIjoiMTI0IiwiVG9wIjowLCJMZWZ0IjowLCJSaWdodCI6MCwiQm90dG9tIjowfSwiQmFja2dyb3VuZCI6eyIkaWQiOiIxMjUiLCJDb2xvciI6eyIkcmVmIjoiMjAifX0sIklzVmlzaWJsZSI6dHJ1ZSwiV2lkdGgiOjAuMCwiSGVpZ2h0IjowLjAsIkJvcmRlclN0eWxlIjpudWxsLCJQYXJlbnRTdHlsZSI6bnVsbH0sIkRhdGVGb3JtYXQiOnsiJGlkIjoiMTI2IiwiRm9ybWF0U3RyaW5nIjoiTU1NIGQiLCJTZXBhcmF0b3IiOiIvIiwiVXNlSW50ZXJuYXRpb25hbERhdGVGb3JtYXQiOmZhbHNlLCJEYXRlSXNWaXNpYmxlIjp0cnVlLCJUaW1lSXNWaXNpYmxlIjpmYWxzZSwiSG91ckRpZ2l0cyI6MSwiQW1QbURlc2lnbmF0b3IiOjIsIlRyaW0wME1pbnV0ZXMiOmZhbHNlLCJMYXN0S25vd25WaXNpYmlsaXR5U3RhdGUiOm51bGx9LCJXZWVrTnVtYmVyaW5nIjp7IiRpZCI6IjEyNyIsIkZvcm1hdCI6MCwiSXNWaXNpYmxlIjpmYWxzZSwiTGFzdEtub3duVmlzaWJpbGl0eVN0YXRlIjpmYWxzZX0sIklzVmlzaWJsZSI6dHJ1ZSwiUGFyZW50U3R5bGUiOm51bGwsIl9leHBsaWNpdGx5U2V0Ijp7IiRpZCI6IjEyOCIsIlNoYXBlU3R5bGUiOmZhbHNlLCJUaXRsZVN0eWxlIjpmYWxzZSwiRGF0ZVN0eWxlIjpmYWxzZSwiSG9yaXpvbnRhbENvbm5lY3RvclN0eWxlIjpmYWxzZSwiVmVydGljYWxDb25uZWN0b3JTdHlsZSI6ZmFsc2UsIlBlcmNlbnRhZ2VDb21wbGV0ZVNoYXBlT3BhY2l0eSI6ZmFsc2UsIkR1cmF0aW9uRm9ybWF0IjpmYWxzZSwiRHVyYXRpb25Qb3NpdGlvbiI6ZmFsc2UsIkVuZERhdGVQb3NpdGlvbiI6ZmFsc2UsIklzQmVsb3dUaW1lYmFuZCI6ZmFsc2UsIlBlcmNlbnRhZ2VDb21wbGV0ZWRQb3NpdGlvbiI6ZmFsc2UsIlNoYXBlIjpmYWxzZSwiU2hhcGVUaGlja25lc3MiOmZhbHNlLCJTcGFjaW5nIjpmYWxzZSwiU3RhcnREYXRlUG9zaXRpb24iOmZhbHNlLCJUaXRsZVBvc2l0aW9uIjpmYWxzZSwiRGF0ZUZvcm1hdCI6ZmFsc2UsIldlZWtOdW1iZXJpbmciOmZhbHNlLCJJc1Zpc2libGUiOmZhbHNlLCJNYXJnaW4iOmZhbHNlfX0sIkdyaWRsaW5lUGFuZWxTdHlsZSI6eyIkaWQiOiIxMjkiLCJHcmlkbGluZVN0eWxlIjp7IiRpZCI6IjEzMCIsIkxpbmVDb2xvciI6eyIkaWQiOiIxMzEiLCIkdHlwZSI6Ik5MUkUuQ29tbW9uLkRvbS5Tb2xpZENvbG9yQnJ1c2gsIE5MUkUuQ29tbW9uIiwiQ29sb3IiOnsiJGlkIjoiMTMyIiwiQSI6MzgsIlIiOjkxLCJHIjoxNTUsIkIiOjIxM319LCJMaW5lV2VpZ2h0IjoxLjAsIkxpbmVUeXBlIjowLCJQYXJlbnRTdHlsZSI6bnVsbH0sIk1hcmdpbiI6eyIkaWQiOiIxMzMiLCJUb3AiOjAsIkxlZnQiOjAsIlJpZ2h0IjowLCJCb3R0b20iOjB9LCJQYWRkaW5nIjp7IiRpZCI6IjEzNCIsIlRvcCI6MCwiTGVmdCI6MCwiUmlnaHQiOjAsIkJvdHRvbSI6MH0sIkJhY2tncm91bmQiOm51bGwsIklzVmlzaWJsZSI6dHJ1ZSwiV2lkdGgiOjAuMCwiSGVpZ2h0IjowLjAsIkJvcmRlclN0eWxlIjp7IiRpZCI6IjEzNSIsIkxpbmVDb2xvciI6bnVsbCwiTGluZVdlaWdodCI6MC4wLCJMaW5lVHlwZSI6MCwiUGFyZW50U3R5bGUiOm51bGx9LCJQYXJlbnRTdHlsZSI6bnVsbH0sIlNob3dFbGFwc2VkVGltZUdyYWRpZW50U3R5bGUiOnRydWUsIkRlZmF1bHRTd2ltbGFuZVN0eWxlIjp7IiRpZCI6IjEzNiIsIkhlYWRlclN0eWxlIjp7IiRpZCI6IjEzNyIsIlRleHRTdHlsZSI6eyIkaWQiOiIxMzgiLCJGb250U2V0dGluZ3MiOnsiJGlkIjoiMTM5IiwiRm9udFNpemUiOjEyLCJGb250TmFtZSI6IkNhbGlicmkiLCJJc0JvbGQiOmZhbHNlLCJJc0l0YWxpYyI6ZmFsc2UsIklzVW5kZXJsaW5lZCI6ZmFsc2UsIlBhcmVudFN0eWxlIjpudWxsfSwiQXV0b1NpemUiOjAsIkZvcmVncm91bmQiOnsiJGlkIjoiMTQwIiwiQ29sb3IiOnsiJGlkIjoiMTQxIiwiQSI6MjU1LCJSIjozMiwiRyI6NTYsIkIiOjEwMH19LCJNYXhXaWR0aCI6MC4wLCJNYXhIZWlnaHQiOjAuMCwiU21hcnRGb3JlZ3JvdW5kSXNBY3RpdmUiOmZhbHNlLCJIb3Jpem9udGFsQWxpZ25tZW50IjowLCJWZXJ0aWNhbEFsaWdubWVudCI6MCwiU21hcnRGb3JlZ3JvdW5kIjpudWxsLCJCYWNrZ3JvdW5kRmlsbFR5cGUiOjAsIk1hcmdpbiI6eyIkaWQiOiIxNDIiLCJUb3AiOjAsIkxlZnQiOjAsIlJpZ2h0IjowLCJCb3R0b20iOjB9LCJQYWRkaW5nIjp7IiRpZCI6IjE0MyIsIlRvcCI6MCwiTGVmdCI6MCwiUmlnaHQiOjAsIkJvdHRvbSI6MH0sIkJhY2tncm91bmQiOm51bGwsIklzVmlzaWJsZSI6ZmFsc2UsIldpZHRoIjowLjAsIkhlaWdodCI6MC4wLCJCb3JkZXJTdHlsZSI6bnVsbCwiUGFyZW50U3R5bGUiOm51bGx9LCJSZWN0YW5nbGVTdHlsZSI6eyIkaWQiOiIxNDQiLCJNYXJnaW4iOnsiJGlkIjoiMTQ1IiwiVG9wIjowLCJMZWZ0IjowLCJSaWdodCI6MCwiQm90dG9tIjowfSwiUGFkZGluZyI6eyIkaWQiOiIxNDYiLCJUb3AiOjAsIkxlZnQiOjAsIlJpZ2h0IjowLCJCb3R0b20iOjB9LCJCYWNrZ3JvdW5kIjp7IiRpZCI6IjE0NyIsIkNvbG9yIjp7IiRpZCI6IjE0OCIsIkEiOjEyNywiUiI6OTEsIkciOjE1NSwiQiI6MjEzfX0sIklzVmlzaWJsZSI6ZmFsc2UsIldpZHRoIjowLjAsIkhlaWdodCI6MC4wLCJCb3JkZXJTdHlsZSI6eyIkaWQiOiIxNDkiLCJMaW5lQ29sb3IiOnsiJGlkIjoiMTUwIiwiJHR5cGUiOiJOTFJFLkNvbW1vbi5Eb20uU29saWRDb2xvckJydXNoLCBOTFJFLkNvbW1vbiIsIkNvbG9yIjp7IiRpZCI6IjE1MSIsIkEiOjI1NSwiUiI6MjU1LCJHIjowLCJCIjowfX0sIkxpbmVXZWlnaHQiOjAuMCwiTGluZVR5cGUiOjAsIlBhcmVudFN0eWxlIjpudWxsfSwiUGFyZW50U3R5bGUiOm51bGx9LCJNYXJnaW4iOnsiJGlkIjoiMTUyIiwiVG9wIjowLCJMZWZ0IjowLCJSaWdodCI6MCwiQm90dG9tIjowfSwiUGFkZGluZyI6eyIkaWQiOiIxNTMiLCJUb3AiOjAsIkxlZnQiOjAsIlJpZ2h0IjowLCJCb3R0b20iOjB9LCJCYWNrZ3JvdW5kIjpudWxsLCJJc1Zpc2libGUiOnRydWUsIldpZHRoIjowLjAsIkhlaWdodCI6MC4wLCJCb3JkZXJTdHlsZSI6bnVsbCwiUGFyZW50U3R5bGUiOm51bGx9LCJCYWNrZ3JvdW5kU3R5bGUiOnsiJGlkIjoiMTU0IiwiTWFyZ2luIjp7IiRpZCI6IjE1NSIsIlRvcCI6MCwiTGVmdCI6MCwiUmlnaHQiOjAsIkJvdHRvbSI6MH0sIlBhZGRpbmciOnsiJGlkIjoiMTU2IiwiVG9wIjowLCJMZWZ0IjowLCJSaWdodCI6MCwiQm90dG9tIjowfSwiQmFja2dyb3VuZCI6eyIkaWQiOiIxNTciLCJDb2xvciI6eyIkaWQiOiIxNTgiLCJBIjozOCwiUiI6OTEsIkciOjE1NSwiQiI6MjEzfX0sIklzVmlzaWJsZSI6dHJ1ZSwiV2lkdGgiOjAuMCwiSGVpZ2h0IjowLjAsIkJvcmRlclN0eWxlIjp7IiRpZCI6IjE1OSIsIkxpbmVDb2xvciI6eyIkaWQiOiIxNjAiLCIkdHlwZSI6Ik5MUkUuQ29tbW9uLkRvbS5Tb2xpZENvbG9yQnJ1c2gsIE5MUkUuQ29tbW9uIiwiQ29sb3IiOnsiJGlkIjoiMTYxIiwiQSI6MjU1LCJSIjoyNTUsIkciOjAsIkIiOjB9fSwiTGluZVdlaWdodCI6MC4wLCJMaW5lVHlwZSI6MCwiUGFyZW50U3R5bGUiOm51bGx9LCJQYXJlbnRTdHlsZSI6bnVsbH0sIklzQWJvdmVUaW1lYmFuZCI6ZmFsc2UsIk1hcmdpbiI6eyIkaWQiOiIxNjIiLCJUb3AiOjAsIkxlZnQiOjAsIlJpZ2h0IjowLCJCb3R0b20iOjB9LCJQYWRkaW5nIjp7IiRpZCI6IjE2MyIsIlRvcCI6MCwiTGVmdCI6MCwiUmlnaHQiOjAsIkJvdHRvbSI6MH0sIklzVmlzaWJsZSI6dHJ1ZSwiV2lkdGgiOjAuMCwiSGVpZ2h0IjowLjAsIkJvcmRlclN0eWxlIjpudWxsLCJQYXJlbnRTdHlsZSI6bnVsbH19LCJTY2FsZSI6eyIkaWQiOiIxNjQiLCJTdGFydERhdGUiOiIwMDAxLTAxLTAxVDAwOjAwOjAwIiwiRW5kRGF0ZSI6IjIwMjEtMDQtMDNUMjM6NTk6MDAiLCJGb3JtYXQiOiJkIiwiVHlwZSI6MCwiQXV0b0RhdGVSYW5nZSI6dHJ1ZSwiV29ya2luZ0RheXMiOjMxLCJGaXNjYWxZZWFyIjp7IiRpZCI6IjE2NSIsIlN0YXJ0TW9udGgiOjEsIlVzZVN0YXJ0aW5nWWVhckZvck51bWJlcmluZyI6dHJ1ZSwiU2hvd0Zpc2NhbFllYXJMYWJlbCI6dHJ1ZX0sIlRvZGF5TWFya2VyVGV4dCI6IlRvZGF5IiwiQXV0b1NjYWxlVHlwZSI6dHJ1ZX0sIk1pbGVzdG9uZXMiOlt7IiRpZCI6IjE2NiIsIkRhdGUiOiIyMDIxLTA0LTAxVDIzOjU5OjAwWiIsIlN0eWxlIjp7IiRpZCI6IjE2NyIsIlNoYXBlIjo3LCJDb25uZWN0b3JNYXJnaW4iOnsiJHJlZiI6IjU0In0sIkNvbm5lY3RvclN0eWxlIjp7IiRpZCI6IjE2OCIsIkxpbmVDb2xvciI6eyIkaWQiOiIxNjkiLCIkdHlwZSI6Ik5MUkUuQ29tbW9uLkRvbS5Tb2xpZENvbG9yQnJ1c2gsIE5MUkUuQ29tbW9uIiwiQ29sb3IiOnsiJGlkIjoiMTcwIiwiQSI6MTI3LCJSIjozMSwiRyI6NzMsIkIiOjEyNn19LCJMaW5lV2VpZ2h0IjoxLjAsIkxpbmVUeXBlIjowLCJQYXJlbnRTdHlsZSI6bnVsbH0sIklzQmVsb3dUaW1lYmFuZCI6ZmFsc2UsIlBvc2l0aW9uT25UYXNrIjowLCJIaWRlRGF0ZSI6ZmFsc2UsIlNoYXBlU2l6ZSI6MSwiU3BhY2luZyI6Mi4wLCJQYWRkaW5nIjp7IiRyZWYiOiI1OCJ9LCJTaGFwZVN0eWxlIjp7IiRpZCI6IjE3MSIsIk1hcmdpbiI6eyIkcmVmIjoiNjAifSwiUGFkZGluZyI6eyIkcmVmIjoiNjEifSwiQmFja2dyb3VuZCI6eyIkaWQiOiIxNzIiLCJDb2xvciI6eyIkaWQiOiIxNzMiLCJBIjoyNTUsIlIiOjkxLCJHIjoxNTUsIkIiOjIxM319LCJJc1Zpc2libGUiOnRydWUsIldpZHRoIjoxOC4wLCJIZWlnaHQiOjIwLjAsIkJvcmRlclN0eWxlIjp7IiRpZCI6IjE3NCIsIkxpbmVDb2xvciI6eyIkcmVmIjoiNjUifSwiTGluZVdlaWdodCI6MC4wLCJMaW5lVHlwZSI6MCwiUGFyZW50U3R5bGUiOm51bGx9LCJQYXJlbnRTdHlsZSI6bnVsbH0sIlRpdGxlU3R5bGUiOnsiJGlkIjoiMTc1IiwiRm9udFNldHRpbmdzIjp7IiRpZCI6IjE3NiIsIkZvbnRTaXplIjoxMSwiRm9udE5hbWUiOiJDYWxpYnJpIiwiSXNCb2xkIjp0cnVlLCJJc0l0YWxpYyI6ZmFsc2UsIklzVW5kZXJsaW5lZCI6ZmFsc2UsIlBhcmVudFN0eWxlIjpudWxsfSwiQXV0b1NpemUiOjIsIkZvcmVncm91bmQiOnsiJGlkIjoiMTc3IiwiQ29sb3IiOnsiJGlkIjoiMTc4IiwiQSI6MjU1LCJSIjowLCJHIjowLCJCIjowfX0sIk1heFdpZHRoIjo4Ni4wLCJNYXhIZWlnaHQiOiJJbmZpbml0eSIsIlNtYXJ0Rm9yZWdyb3VuZElzQWN0aXZlIjpmYWxzZSwiSG9yaXpvbnRhbEFsaWdubWVudCI6MSwiVmVydGljYWxBbGlnbm1lbnQiOjAsIlNtYXJ0Rm9yZWdyb3VuZCI6bnVsbCwiQmFja2dyb3VuZEZpbGxUeXBlIjowLCJNYXJnaW4iOnsiJHJlZiI6IjcxIn0sIlBhZGRpbmciOnsiJHJlZiI6IjcyIn0sIkJhY2tncm91bmQiOnsiJGlkIjoiMTc5IiwiQ29sb3IiOnsiJGlkIjoiMTgwIiwiQSI6MCwiUiI6MjU1LCJHIjoyNTUsIkIiOjI1NX19LCJJc1Zpc2libGUiOnRydWUsIldpZHRoIjowLjAsIkhlaWdodCI6MC4wLCJCb3JkZXJTdHlsZSI6eyIkaWQiOiIxODEiLCJMaW5lQ29sb3IiOm51bGwsIkxpbmVXZWlnaHQiOjAuMCwiTGluZVR5cGUiOjAsIlBhcmVudFN0eWxlIjpudWxsfSwiUGFyZW50U3R5bGUiOm51bGx9LCJEYXRlU3R5bGUiOnsiJGlkIjoiMTgyIiwiRm9udFNldHRpbmdzIjp7IiRpZCI6IjE4MyIsIkZvbnRTaXplIjoxMCwiRm9udE5hbWUiOiJDYWxpYnJpIiwiSXNCb2xkIjpmYWxzZSwiSXNJdGFsaWMiOmZhbHNlLCJJc1VuZGVybGluZWQiOmZhbHNlLCJQYXJlbnRTdHlsZSI6bnVsbH0sIkF1dG9TaXplIjowLCJGb3JlZ3JvdW5kIjp7IiRpZCI6IjE4NCIsIkNvbG9yIjp7IiRpZCI6IjE4NSIsIkEiOjI1NSwiUiI6NjgsIkciOjg0LCJCIjoxMDZ9fSwiTWF4V2lkdGgiOjIwMC4wLCJNYXhIZWlnaHQiOiJJbmZpbml0eSIsIlNtYXJ0Rm9yZWdyb3VuZElzQWN0aXZlIjpmYWxzZSwiSG9yaXpvbnRhbEFsaWdubWVudCI6MSwiVmVydGljYWxBbGlnbm1lbnQiOjAsIlNtYXJ0Rm9yZWdyb3VuZCI6bnVsbCwiQmFja2dyb3VuZEZpbGxUeXBlIjowLCJNYXJnaW4iOnsiJHJlZiI6Ijc4In0sIlBhZGRpbmciOnsiJHJlZiI6Ijc5In0sIkJhY2tncm91bmQiOnsiJGlkIjoiMTg2IiwiQ29sb3IiOnsiJGlkIjoiMTg3IiwiQSI6MCwiUiI6MjU1LCJHIjoyNTUsIkIiOjI1NX19LCJJc1Zpc2libGUiOnRydWUsIldpZHRoIjowLjAsIkhlaWdodCI6MC4wLCJCb3JkZXJTdHlsZSI6eyIkaWQiOiIxODgiLCJMaW5lQ29sb3IiOm51bGwsIkxpbmVXZWlnaHQiOjAuMCwiTGluZVR5cGUiOjAsIlBhcmVudFN0eWxlIjpudWxsfSwiUGFyZW50U3R5bGUiOm51bGx9LCJEYXRlRm9ybWF0Ijp7IiRpZCI6IjE4OSIsIkZvcm1hdFN0cmluZyI6Ik1NTSBkIiwiU2VwYXJhdG9yIjoiLyIsIlVzZUludGVybmF0aW9uYWxEYXRlRm9ybWF0IjpmYWxzZSwiRGF0ZUlzVmlzaWJsZSI6dHJ1ZSwiVGltZUlzVmlzaWJsZSI6ZmFsc2UsIkhvdXJEaWdpdHMiOjEsIkFtUG1EZXNpZ25hdG9yIjoyLCJUcmltMDBNaW51dGVzIjpmYWxzZSwiTGFzdEtub3duVmlzaWJpbGl0eVN0YXRlIjpudWxsfSwiV2Vla051bWJlcmluZyI6eyIkaWQiOiIxOTAiLCJGb3JtYXQiOjAsIklzVmlzaWJsZSI6ZmFsc2UsIkxhc3RLbm93blZpc2liaWxpdHlTdGF0ZSI6ZmFsc2V9LCJJc1Zpc2libGUiOnRydWUsIlBhcmVudFN0eWxlIjpudWxsfSwiSW5kZXgiOjEsIlBlcmNlbnRhZ2VDb21wbGV0ZSI6bnVsbCwiUG9zaXRpb24iOnsiUmF0aW8iOjAuMCwiSXNDdXN0b20iOmZhbHNlfSwiRGF0ZUZvcm1hdCI6eyIkcmVmIjoiMTg5In0sIldlZWtOdW1iZXJpbmciOnsiJGlkIjoiMTkxIiwiRm9ybWF0IjowLCJJc1Zpc2libGUiOmZhbHNlLCJMYXN0S25vd25WaXNpYmlsaXR5U3RhdGUiOmZhbHNlfSwiUmVsYXRlZFRhc2tJZCI6IjAwMDAwMDAwLTAwMDAtMDAwMC0wMDAwLTAwMDAwMDAwMDAwMCIsIklkIjoiNzNiY2IyYjgtNWFlNi00MjRkLTkyOTctOWI5ZDUzMmYwYzg3IiwiSW1wb3J0SWQiOm51bGwsIlRpdGxlIjoiUHJvamVjdCBUZXN0aW5nIiwiTm90ZSI6bnVsbCwiSHlwZXJsaW5rIjp7IiRpZCI6IjE5MiIsIkFkZHJlc3MiOm51bGwsIlN1YkFkZHJlc3MiOm51bGx9LCJJc0NoYW5nZWQiOmZhbHNlLCJJc05ldyI6ZmFsc2V9XSwiVGFza3MiOlt7IiRpZCI6IjE5MyIsIkdyb3VwTmFtZSI6bnVsbCwiU3RhcnREYXRlIjoiMjAyMS0wMy0yN1QwMDowMDowMFoiLCJFbmREYXRlIjoiMjAyMS0wMy0yN1QyMzo1OTowMFoiLCJQZXJjZW50YWdlQ29tcGxldGUiOm51bGwsIlN0eWxlIjp7IiRpZCI6IjE5NCIsIlNoYXBlIjozLCJTaGFwZVRoaWNrbmVzcyI6MiwiRHVyYXRpb25Gb3JtYXQiOjAsIkluY2x1ZGVOb25Xb3JraW5nRGF5c0luRHVyYXRpb24iOmZhbHNlLCJQZXJjZW50YWdlQ29tcGxldGVTdHlsZSI6eyIkaWQiOiIxOTUiLCJGb250U2V0dGluZ3MiOnsiJGlkIjoiMTk2IiwiRm9udFNpemUiOjEwLCJGb250TmFtZSI6IkNhbGlicmkiLCJJc0JvbGQiOmZhbHNlLCJJc0l0YWxpYyI6ZmFsc2UsIklzVW5kZXJsaW5lZCI6ZmFsc2UsIlBhcmVudFN0eWxlIjpudWxsfSwiQXV0b1NpemUiOjAsIkZvcmVncm91bmQiOnsiJHJlZiI6Ijg2In0sIk1heFdpZHRoIjoyMDAuMCwiTWF4SGVpZ2h0IjoiSW5maW5pdHkiLCJTbWFydEZvcmVncm91bmRJc0FjdGl2ZSI6ZmFsc2UsIkhvcml6b250YWxBbGlnbm1lbnQiOjAsIlZlcnRpY2FsQWxpZ25tZW50IjowLCJTbWFydEZvcmVncm91bmQiOm51bGwsIkJhY2tncm91bmRGaWxsVHlwZSI6MCwiTWFyZ2luIjp7IiRpZCI6IjE5NyIsIlRvcCI6MCwiTGVmdCI6MCwiUmlnaHQiOjAsIkJvdHRvbSI6MH0sIlBhZGRpbmciOnsiJGlkIjoiMTk4IiwiVG9wIjowLCJMZWZ0IjowLCJSaWdodCI6MCwiQm90dG9tIjowfSwiQmFja2dyb3VuZCI6eyIkaWQiOiIxOTkiLCJDb2xvciI6eyIkaWQiOiIyMDAiLCJBIjo4OSwiUiI6MCwiRyI6MCwiQiI6MH19LCJJc1Zpc2libGUiOnRydWUsIldpZHRoIjowLjAsIkhlaWdodCI6MC4wLCJCb3JkZXJTdHlsZSI6eyIkaWQiOiIyMDEiLCJMaW5lQ29sb3IiOm51bGwsIkxpbmVXZWlnaHQiOjAuMCwiTGluZVR5cGUiOjAsIlBhcmVudFN0eWxlIjpudWxsfSwiUGFyZW50U3R5bGUiOm51bGx9LCJEdXJhdGlvblN0eWxlIjp7IiRpZCI6IjIwMiIsIkZvbnRTZXR0aW5ncyI6eyIkaWQiOiIyMDMiLCJGb250U2l6ZSI6MTAsIkZvbnROYW1lIjoiQ2FsaWJyaSIsIklzQm9sZCI6ZmFsc2UsIklzSXRhbGljIjpmYWxzZSwiSXNVbmRlcmxpbmVkIjpmYWxzZSwiUGFyZW50U3R5bGUiOm51bGx9LCJBdXRvU2l6ZSI6MCwiRm9yZWdyb3VuZCI6eyIkaWQiOiIyMDQiLCJDb2xvciI6eyIkaWQiOiIyMDUiLCJBIjoyNTUsIlIiOjIzNywiRyI6MTI1LCJCIjo0OX19LCJNYXhXaWR0aCI6MjAwLjAsIk1heEhlaWdodCI6IkluZmluaXR5IiwiU21hcnRGb3JlZ3JvdW5kSXNBY3RpdmUiOmZhbHNlLCJIb3Jpem9udGFsQWxpZ25tZW50IjowLCJWZXJ0aWNhbEFsaWdubWVudCI6MCwiU21hcnRGb3JlZ3JvdW5kIjpudWxsLCJCYWNrZ3JvdW5kRmlsbFR5cGUiOjAsIk1hcmdpbiI6eyIkaWQiOiIyMDYiLCJUb3AiOjAsIkxlZnQiOjAsIlJpZ2h0IjowLCJCb3R0b20iOjB9LCJQYWRkaW5nIjp7IiRpZCI6IjIwNyIsIlRvcCI6MCwiTGVmdCI6MCwiUmlnaHQiOjAsIkJvdHRvbSI6MH0sIkJhY2tncm91bmQiOnsiJGlkIjoiMjA4IiwiQ29sb3IiOnsiJHJlZiI6IjIwMCJ9fSwiSXNWaXNpYmxlIjp0cnVlLCJXaWR0aCI6MC4wLCJIZWlnaHQiOjAuMCwiQm9yZGVyU3R5bGUiOnsiJGlkIjoiMjA5IiwiTGluZUNvbG9yIjpudWxsLCJMaW5lV2VpZ2h0IjowLjAsIkxpbmVUeXBlIjowLCJQYXJlbnRTdHlsZSI6bnVsbH0sIlBhcmVudFN0eWxlIjpudWxsfSwiSG9yaXpvbnRhbENvbm5lY3RvclN0eWxlIjp7IiRpZCI6IjIxMCIsIkxpbmVDb2xvciI6eyIkaWQiOiIyMTEiLCIkdHlwZSI6Ik5MUkUuQ29tbW9uLkRvbS5Tb2xpZENvbG9yQnJ1c2gsIE5MUkUuQ29tbW9uIiwiQ29sb3IiOnsiJGlkIjoiMjEyIiwiQSI6MjU1LCJSIjoyMDQsIkciOjIwNCwiQiI6MjA0fX0sIkxpbmVXZWlnaHQiOjEuMCwiTGluZVR5cGUiOjAsIlBhcmVudFN0eWxlIjpudWxsfSwiVmVydGljYWxDb25uZWN0b3JTdHlsZSI6eyIkaWQiOiIyMTMiLCJMaW5lQ29sb3IiOnsiJGlkIjoiMjE0IiwiJHR5cGUiOiJOTFJFLkNvbW1vbi5Eb20uU29saWRDb2xvckJydXNoLCBOTFJFLkNvbW1vbiIsIkNvbG9yIjp7IiRpZCI6IjIxNSIsIkEiOjI1NSwiUiI6MjA0LCJHIjoyMDQsIkIiOjIwNH19LCJMaW5lV2VpZ2h0IjoxLjAsIkxpbmVUeXBlIjowLCJQYXJlbnRTdHlsZSI6bnVsbH0sIk1hcmdpbiI6bnVsbCwiU3RhcnREYXRlUG9zaXRpb24iOjQsIkVuZERhdGVQb3NpdGlvbiI6NCwiRGF0ZUlzVmlzaWJsZSI6dHJ1ZSwiVGl0bGVQb3NpdGlvbiI6MiwiRHVyYXRpb25Qb3NpdGlvbiI6NiwiUGVyY2VudGFnZUNvbXBsZXRlZFBvc2l0aW9uIjo2LCJTcGFjaW5nIjo1LCJJc0JlbG93VGltZWJhbmQiOmZhbHNlLCJQZXJjZW50YWdlQ29tcGxldGVTaGFwZU9wYWNpdHkiOjM1LCJTaGFwZVN0eWxlIjp7IiRpZCI6IjIxNiIsIk1hcmdpbiI6eyIkaWQiOiIyMTciLCJUb3AiOjAsIkxlZnQiOjQsIlJpZ2h0Ijo0LCJCb3R0b20iOjB9LCJQYWRkaW5nIjp7IiRpZCI6IjIxOCIsIlRvcCI6MCwiTGVmdCI6MCwiUmlnaHQiOjAsIkJvdHRvbSI6MH0sIkJhY2tncm91bmQiOnsiJGlkIjoiMjE5IiwiQ29sb3IiOnsiJGlkIjoiMjIwIiwiQSI6MjU1LCJSIjo5MSwiRyI6MTU1LCJCIjoyMTN9fSwiSXNWaXNpYmxlIjp0cnVlLCJXaWR0aCI6MC4wLCJIZWlnaHQiOjIyLjAsIkJvcmRlclN0eWxlIjp7IiRpZCI6IjIyMSIsIkxpbmVDb2xvciI6eyIkaWQiOiIyMjIiLCIkdHlwZSI6Ik5MUkUuQ29tbW9uLkRvbS5Tb2xpZENvbG9yQnJ1c2gsIE5MUkUuQ29tbW9uIiwiQ29sb3IiOnsiJGlkIjoiMjIzIiwiQSI6MjU1LCJSIjoyNTUsIkciOjAsIkIiOjB9fSwiTGluZVdlaWdodCI6MC4wLCJMaW5lVHlwZSI6MCwiUGFyZW50U3R5bGUiOm51bGx9LCJQYXJlbnRTdHlsZSI6bnVsbH0sIlRpdGxlU3R5bGUiOnsiJGlkIjoiMjI0IiwiRm9udFNldHRpbmdzIjp7IiRpZCI6IjIyNSIsIkZvbnRTaXplIjoxMSwiRm9udE5hbWUiOiJDYWxpYnJpIiwiSXNCb2xkIjp0cnVlLCJJc0l0YWxpYyI6ZmFsc2UsIklzVW5kZXJsaW5lZCI6ZmFsc2UsIlBhcmVudFN0eWxlIjpudWxsfSwiQXV0b1NpemUiOjAsIkZvcmVncm91bmQiOnsiJGlkIjoiMjI2IiwiQ29sb3IiOnsiJGlkIjoiMjI3IiwiQSI6MjU1LCJSIjowLCJHIjowLCJCIjowfX0sIk1heFdpZHRoIjo3MjAuMCwiTWF4SGVpZ2h0IjoiSW5maW5pdHkiLCJTbWFydEZvcmVncm91bmRJc0FjdGl2ZSI6ZmFsc2UsIkhvcml6b250YWxBbGlnbm1lbnQiOjEsIlZlcnRpY2FsQWxpZ25tZW50IjowLCJTbWFydEZvcmVncm91bmQiOm51bGwsIkJhY2tncm91bmRGaWxsVHlwZSI6MCwiTWFyZ2luIjp7IiRpZCI6IjIyOCIsIlRvcCI6MCwiTGVmdCI6MCwiUmlnaHQiOjAsIkJvdHRvbSI6MH0sIlBhZGRpbmciOnsiJGlkIjoiMjI5IiwiVG9wIjowLCJMZWZ0IjowLCJSaWdodCI6MCwiQm90dG9tIjowfSwiQmFja2dyb3VuZCI6eyIkaWQiOiIyMzAiLCJDb2xvciI6eyIkaWQiOiIyMzEiLCJBIjowLCJSIjoyNTUsIkciOjI1NSwiQiI6MjU1fX0sIklzVmlzaWJsZSI6dHJ1ZSwiV2lkdGgiOjAuMCwiSGVpZ2h0IjowLjAsIkJvcmRlclN0eWxlIjp7IiRpZCI6IjIzMiIsIkxpbmVDb2xvciI6bnVsbCwiTGluZVdlaWdodCI6MC4wLCJMaW5lVHlwZSI6MCwiUGFyZW50U3R5bGUiOm51bGx9LCJQYXJlbnRTdHlsZSI6bnVsbH0sIkRhdGVTdHlsZSI6eyIkaWQiOiIyMzMiLCJGb250U2V0dGluZ3MiOnsiJGlkIjoiMjM0IiwiRm9udFNpemUiOjEwLCJGb250TmFtZSI6IkNhbGlicmkiLCJJc0JvbGQiOmZhbHNlLCJJc0l0YWxpYyI6ZmFsc2UsIklzVW5kZXJsaW5lZCI6ZmFsc2UsIlBhcmVudFN0eWxlIjpudWxsfSwiQXV0b1NpemUiOjAsIkZvcmVncm91bmQiOnsiJGlkIjoiMjM1IiwiQ29sb3IiOnsiJGlkIjoiMjM2IiwiQSI6MjU1LCJSIjo2OCwiRyI6ODQsIkIiOjEwNn19LCJNYXhXaWR0aCI6MjAwLjAsIk1heEhlaWdodCI6IkluZmluaXR5IiwiU21hcnRGb3JlZ3JvdW5kSXNBY3RpdmUiOmZhbHNlLCJIb3Jpem9udGFsQWxpZ25tZW50IjowLCJWZXJ0aWNhbEFsaWdubWVudCI6MCwiU21hcnRGb3JlZ3JvdW5kIjpudWxsLCJCYWNrZ3JvdW5kRmlsbFR5cGUiOjAsIk1hcmdpbiI6eyIkaWQiOiIyMzciLCJUb3AiOjAsIkxlZnQiOjAsIlJpZ2h0IjowLCJCb3R0b20iOjB9LCJQYWRkaW5nIjp7IiRpZCI6IjIzOCIsIlRvcCI6MCwiTGVmdCI6MCwiUmlnaHQiOjAsIkJvdHRvbSI6MH0sIkJhY2tncm91bmQiOnsiJGlkIjoiMjM5IiwiQ29sb3IiOnsiJGlkIjoiMjQwIiwiQSI6MCwiUiI6MjU1LCJHIjoyNTUsIkIiOjI1NX19LCJJc1Zpc2libGUiOnRydWUsIldpZHRoIjowLjAsIkhlaWdodCI6MC4wLCJCb3JkZXJTdHlsZSI6eyIkaWQiOiIyNDEiLCJMaW5lQ29sb3IiOm51bGwsIkxpbmVXZWlnaHQiOjAuMCwiTGluZVR5cGUiOjAsIlBhcmVudFN0eWxlIjpudWxsfSwiUGFyZW50U3R5bGUiOm51bGx9LCJEYXRlRm9ybWF0Ijp7IiRpZCI6IjI0MiIsIkZvcm1hdFN0cmluZyI6Ik1NTSBkIiwiU2VwYXJhdG9yIjoiLyIsIlVzZUludGVybmF0aW9uYWxEYXRlRm9ybWF0IjpmYWxzZSwiRGF0ZUlzVmlzaWJsZSI6dHJ1ZSwiVGltZUlzVmlzaWJsZSI6ZmFsc2UsIkhvdXJEaWdpdHMiOjEsIkFtUG1EZXNpZ25hdG9yIjoyLCJUcmltMDBNaW51dGVzIjpmYWxzZSwiTGFzdEtub3duVmlzaWJpbGl0eVN0YXRlIjpudWxsfSwiV2Vla051bWJlcmluZyI6eyIkaWQiOiIyNDMiLCJGb3JtYXQiOjAsIklzVmlzaWJsZSI6ZmFsc2UsIkxhc3RLbm93blZpc2liaWxpdHlTdGF0ZSI6ZmFsc2V9LCJJc1Zpc2libGUiOnRydWUsIlBhcmVudFN0eWxlIjpudWxsfSwiSW5kZXgiOjAsIlNtYXJ0RHVyYXRpb25BY3RpdmF0ZWQiOmZhbHNlLCJEYXRlRm9ybWF0Ijp7IiRyZWYiOiIyNDIifSwiV2Vla051bWJlcmluZyI6eyIkaWQiOiIyNDQiLCJGb3JtYXQiOjAsIklzVmlzaWJsZSI6ZmFsc2UsIkxhc3RLbm93blZpc2liaWxpdHlTdGF0ZSI6ZmFsc2V9LCJJZCI6IjZiNjE0ZTE0LTYwZmYtNGQ5Mi04MzIxLTZjMTU4M2M1ZjA4ZiIsIkltcG9ydElkIjpudWxsLCJUaXRsZSI6IlJlcXVpcmVtZW50IEFuYWx5c2lzIiwiTm90ZSI6bnVsbCwiSHlwZXJsaW5rIjp7IiRpZCI6IjI0NSIsIkFkZHJlc3MiOm51bGwsIlN1YkFkZHJlc3MiOm51bGx9LCJJc0NoYW5nZWQiOmZhbHNlLCJJc05ldyI6ZmFsc2V9LHsiJGlkIjoiMjQ2IiwiR3JvdXBOYW1lIjpudWxsLCJTdGFydERhdGUiOiIyMDIxLTAzLTI3VDAwOjAwOjAwWiIsIkVuZERhdGUiOiIyMDIxLTAzLTI3VDIzOjU5OjAwWiIsIlBlcmNlbnRhZ2VDb21wbGV0ZSI6bnVsbCwiU3R5bGUiOnsiJGlkIjoiMjQ3IiwiU2hhcGUiOjMsIlNoYXBlVGhpY2tuZXNzIjoyLCJEdXJhdGlvbkZvcm1hdCI6MCwiSW5jbHVkZU5vbldvcmtpbmdEYXlzSW5EdXJhdGlvbiI6ZmFsc2UsIlBlcmNlbnRhZ2VDb21wbGV0ZVN0eWxlIjp7IiRpZCI6IjI0OCIsIkZvbnRTZXR0aW5ncyI6eyIkaWQiOiIyNDkiLCJGb250U2l6ZSI6MTAsIkZvbnROYW1lIjoiQ2FsaWJyaSIsIklzQm9sZCI6ZmFsc2UsIklzSXRhbGljIjpmYWxzZSwiSXNVbmRlcmxpbmVkIjpmYWxzZSwiUGFyZW50U3R5bGUiOm51bGx9LCJBdXRvU2l6ZSI6MCwiRm9yZWdyb3VuZCI6eyIkcmVmIjoiODYifSwiTWF4V2lkdGgiOjIwMC4wLCJNYXhIZWlnaHQiOiJJbmZpbml0eSIsIlNtYXJ0Rm9yZWdyb3VuZElzQWN0aXZlIjpmYWxzZSwiSG9yaXpvbnRhbEFsaWdubWVudCI6MCwiVmVydGljYWxBbGlnbm1lbnQiOjAsIlNtYXJ0Rm9yZWdyb3VuZCI6bnVsbCwiQmFja2dyb3VuZEZpbGxUeXBlIjowLCJNYXJnaW4iOnsiJHJlZiI6Ijg4In0sIlBhZGRpbmciOnsiJHJlZiI6Ijg5In0sIkJhY2tncm91bmQiOnsiJHJlZiI6IjkwIn0sIklzVmlzaWJsZSI6dHJ1ZSwiV2lkdGgiOjAuMCwiSGVpZ2h0IjowLjAsIkJvcmRlclN0eWxlIjp7IiRpZCI6IjI1MCIsIkxpbmVDb2xvciI6bnVsbCwiTGluZVdlaWdodCI6MC4wLCJMaW5lVHlwZSI6MCwiUGFyZW50U3R5bGUiOm51bGx9LCJQYXJlbnRTdHlsZSI6bnVsbH0sIkR1cmF0aW9uU3R5bGUiOnsiJGlkIjoiMjUxIiwiRm9udFNldHRpbmdzIjp7IiRpZCI6IjI1MiIsIkZvbnRTaXplIjoxMCwiRm9udE5hbWUiOiJDYWxpYnJpIiwiSXNCb2xkIjpmYWxzZSwiSXNJdGFsaWMiOmZhbHNlLCJJc1VuZGVybGluZWQiOmZhbHNlLCJQYXJlbnRTdHlsZSI6bnVsbH0sIkF1dG9TaXplIjowLCJGb3JlZ3JvdW5kIjp7IiRyZWYiOiI5MyJ9LCJNYXhXaWR0aCI6MjAwLjAsIk1heEhlaWdodCI6IkluZmluaXR5IiwiU21hcnRGb3JlZ3JvdW5kSXNBY3RpdmUiOmZhbHNlLCJIb3Jpem9udGFsQWxpZ25tZW50IjowLCJWZXJ0aWNhbEFsaWdubWVudCI6MCwiU21hcnRGb3JlZ3JvdW5kIjpudWxsLCJCYWNrZ3JvdW5kRmlsbFR5cGUiOjAsIk1hcmdpbiI6eyIkcmVmIjoiOTUifSwiUGFkZGluZyI6eyIkcmVmIjoiOTYifSwiQmFja2dyb3VuZCI6eyIkcmVmIjoiOTcifSwiSXNWaXNpYmxlIjp0cnVlLCJXaWR0aCI6MC4wLCJIZWlnaHQiOjAuMCwiQm9yZGVyU3R5bGUiOnsiJGlkIjoiMjUzIiwiTGluZUNvbG9yIjpudWxsLCJMaW5lV2VpZ2h0IjowLjAsIkxpbmVUeXBlIjowLCJQYXJlbnRTdHlsZSI6bnVsbH0sIlBhcmVudFN0eWxlIjpudWxsfSwiSG9yaXpvbnRhbENvbm5lY3RvclN0eWxlIjp7IiRpZCI6IjI1NCIsIkxpbmVDb2xvciI6eyIkaWQiOiIyNTUiLCIkdHlwZSI6Ik5MUkUuQ29tbW9uLkRvbS5Tb2xpZENvbG9yQnJ1c2gsIE5MUkUuQ29tbW9uIiwiQ29sb3IiOnsiJGlkIjoiMjU2IiwiQSI6MjU1LCJSIjoyMDQsIkciOjIwNCwiQiI6MjA0fX0sIkxpbmVXZWlnaHQiOjEuMCwiTGluZVR5cGUiOjAsIlBhcmVudFN0eWxlIjpudWxsfSwiVmVydGljYWxDb25uZWN0b3JTdHlsZSI6eyIkaWQiOiIyNTciLCJMaW5lQ29sb3IiOnsiJHJlZiI6IjEwMiJ9LCJMaW5lV2VpZ2h0IjoxLjAsIkxpbmVUeXBlIjowLCJQYXJlbnRTdHlsZSI6bnVsbH0sIk1hcmdpbiI6bnVsbCwiU3RhcnREYXRlUG9zaXRpb24iOjQsIkVuZERhdGVQb3NpdGlvbiI6NCwiRGF0ZUlzVmlzaWJsZSI6dHJ1ZSwiVGl0bGVQb3NpdGlvbiI6MiwiRHVyYXRpb25Qb3NpdGlvbiI6NiwiUGVyY2VudGFnZUNvbXBsZXRlZFBvc2l0aW9uIjo2LCJTcGFjaW5nIjo1LCJJc0JlbG93VGltZWJhbmQiOmZhbHNlLCJQZXJjZW50YWdlQ29tcGxldGVTaGFwZU9wYWNpdHkiOjM1LCJTaGFwZVN0eWxlIjp7IiRpZCI6IjI1OCIsIk1hcmdpbiI6eyIkcmVmIjoiMTA1In0sIlBhZGRpbmciOnsiJHJlZiI6IjEwNiJ9LCJCYWNrZ3JvdW5kIjp7IiRpZCI6IjI1OSIsIkNvbG9yIjp7IiRpZCI6IjI2MCIsIkEiOjI1NSwiUiI6OTEsIkciOjE1NSwiQiI6MjEzfX0sIklzVmlzaWJsZSI6dHJ1ZSwiV2lkdGgiOjAuMCwiSGVpZ2h0IjoyMi4wLCJCb3JkZXJTdHlsZSI6eyIkaWQiOiIyNjEiLCJMaW5lQ29sb3IiOnsiJGlkIjoiMjYyIiwiJHR5cGUiOiJOTFJFLkNvbW1vbi5Eb20uU29saWRDb2xvckJydXNoLCBOTFJFLkNvbW1vbiIsIkNvbG9yIjp7IiRpZCI6IjI2MyIsIkEiOjI1NSwiUiI6MjU1LCJHIjowLCJCIjowfX0sIkxpbmVXZWlnaHQiOjAuMCwiTGluZVR5cGUiOjAsIlBhcmVudFN0eWxlIjpudWxsfSwiUGFyZW50U3R5bGUiOm51bGx9LCJUaXRsZVN0eWxlIjp7IiRpZCI6IjI2NCIsIkZvbnRTZXR0aW5ncyI6eyIkaWQiOiIyNjUiLCJGb250U2l6ZSI6MTEsIkZvbnROYW1lIjoiQ2FsaWJyaSIsIklzQm9sZCI6dHJ1ZSwiSXNJdGFsaWMiOmZhbHNlLCJJc1VuZGVybGluZWQiOmZhbHNlLCJQYXJlbnRTdHlsZSI6bnVsbH0sIkF1dG9TaXplIjoyLCJGb3JlZ3JvdW5kIjp7IiRpZCI6IjI2NiIsIkNvbG9yIjp7IiRpZCI6IjI2NyIsIkEiOjI1NSwiUiI6MCwiRyI6MCwiQiI6MH19LCJNYXhXaWR0aCI6ODIuMjYwMTU0NzI0MTIxMSwiTWF4SGVpZ2h0IjoiSW5maW5pdHkiLCJTbWFydEZvcmVncm91bmRJc0FjdGl2ZSI6ZmFsc2UsIkhvcml6b250YWxBbGlnbm1lbnQiOjAsIlZlcnRpY2FsQWxpZ25tZW50IjowLCJTbWFydEZvcmVncm91bmQiOm51bGwsIkJhY2tncm91bmRGaWxsVHlwZSI6MCwiTWFyZ2luIjp7IiRyZWYiOiIxMTYifSwiUGFkZGluZyI6eyIkcmVmIjoiMTE3In0sIkJhY2tncm91bmQiOnsiJGlkIjoiMjY4IiwiQ29sb3IiOnsiJGlkIjoiMjY5IiwiQSI6MCwiUiI6MjU1LCJHIjoyNTUsIkIiOjI1NX19LCJJc1Zpc2libGUiOnRydWUsIldpZHRoIjowLjAsIkhlaWdodCI6MC4wLCJCb3JkZXJTdHlsZSI6eyIkaWQiOiIyNzAiLCJMaW5lQ29sb3IiOm51bGwsIkxpbmVXZWlnaHQiOjAuMCwiTGluZVR5cGUiOjAsIlBhcmVudFN0eWxlIjpudWxsfSwiUGFyZW50U3R5bGUiOm51bGx9LCJEYXRlU3R5bGUiOnsiJGlkIjoiMjcxIiwiRm9udFNldHRpbmdzIjp7IiRpZCI6IjI3MiIsIkZvbnRTaXplIjoxMCwiRm9udE5hbWUiOiJDYWxpYnJpIiwiSXNCb2xkIjpmYWxzZSwiSXNJdGFsaWMiOmZhbHNlLCJJc1VuZGVybGluZWQiOmZhbHNlLCJQYXJlbnRTdHlsZSI6bnVsbH0sIkF1dG9TaXplIjowLCJGb3JlZ3JvdW5kIjp7IiRpZCI6IjI3MyIsIkNvbG9yIjp7IiRpZCI6IjI3NCIsIkEiOjI1NSwiUiI6NjgsIkciOjg0LCJCIjoxMDZ9fSwiTWF4V2lkdGgiOjIwMC4wLCJNYXhIZWlnaHQiOiJJbmZpbml0eSIsIlNtYXJ0Rm9yZWdyb3VuZElzQWN0aXZlIjpmYWxzZSwiSG9yaXpvbnRhbEFsaWdubWVudCI6MCwiVmVydGljYWxBbGlnbm1lbnQiOjAsIlNtYXJ0Rm9yZWdyb3VuZCI6bnVsbCwiQmFja2dyb3VuZEZpbGxUeXBlIjowLCJNYXJnaW4iOnsiJHJlZiI6IjEyMyJ9LCJQYWRkaW5nIjp7IiRyZWYiOiIxMjQifSwiQmFja2dyb3VuZCI6eyIkaWQiOiIyNzUiLCJDb2xvciI6eyIkaWQiOiIyNzYiLCJBIjowLCJSIjoyNTUsIkciOjI1NSwiQiI6MjU1fX0sIklzVmlzaWJsZSI6dHJ1ZSwiV2lkdGgiOjAuMCwiSGVpZ2h0IjowLjAsIkJvcmRlclN0eWxlIjp7IiRpZCI6IjI3NyIsIkxpbmVDb2xvciI6bnVsbCwiTGluZVdlaWdodCI6MC4wLCJMaW5lVHlwZSI6MCwiUGFyZW50U3R5bGUiOm51bGx9LCJQYXJlbnRTdHlsZSI6bnVsbH0sIkRhdGVGb3JtYXQiOnsiJGlkIjoiMjc4IiwiRm9ybWF0U3RyaW5nIjoiTU1NIGQiLCJTZXBhcmF0b3IiOiIvIiwiVXNlSW50ZXJuYXRpb25hbERhdGVGb3JtYXQiOmZhbHNlLCJEYXRlSXNWaXNpYmxlIjp0cnVlLCJUaW1lSXNWaXNpYmxlIjpmYWxzZSwiSG91ckRpZ2l0cyI6MSwiQW1QbURlc2lnbmF0b3IiOjIsIlRyaW0wME1pbnV0ZXMiOmZhbHNlLCJMYXN0S25vd25WaXNpYmlsaXR5U3RhdGUiOm51bGx9LCJXZWVrTnVtYmVyaW5nIjp7IiRpZCI6IjI3OSIsIkZvcm1hdCI6MCwiSXNWaXNpYmxlIjpmYWxzZSwiTGFzdEtub3duVmlzaWJpbGl0eVN0YXRlIjpmYWxzZX0sIklzVmlzaWJsZSI6dHJ1ZSwiUGFyZW50U3R5bGUiOm51bGx9LCJJbmRleCI6MiwiU21hcnREdXJhdGlvbkFjdGl2YXRlZCI6ZmFsc2UsIkRhdGVGb3JtYXQiOnsiJHJlZiI6IjI3OCJ9LCJXZWVrTnVtYmVyaW5nIjp7IiRpZCI6IjI4MCIsIkZvcm1hdCI6MCwiSXNWaXNpYmxlIjpmYWxzZSwiTGFzdEtub3duVmlzaWJpbGl0eVN0YXRlIjpmYWxzZX0sIklkIjoiM2FmYTU4MzEtOWYzOC00ZjNhLTgxOTUtMDQwYmViYzFlNTZjIiwiSW1wb3J0SWQiOm51bGwsIlRpdGxlIjoiRG9jdW1lbnRhdGlvbiBRdWljayBQbGFuIiwiTm90ZSI6bnVsbCwiSHlwZXJsaW5rIjp7IiRpZCI6IjI4MSIsIkFkZHJlc3MiOm51bGwsIlN1YkFkZHJlc3MiOm51bGx9LCJJc0NoYW5nZWQiOmZhbHNlLCJJc05ldyI6ZmFsc2V9LHsiJGlkIjoiMjgyIiwiR3JvdXBOYW1lIjpudWxsLCJTdGFydERhdGUiOiIyMDIxLTAzLTI3VDAwOjAwOjAwWiIsIkVuZERhdGUiOiIyMDIxLTAzLTI3VDIzOjU5OjAwWiIsIlBlcmNlbnRhZ2VDb21wbGV0ZSI6bnVsbCwiU3R5bGUiOnsiJGlkIjoiMjgzIiwiU2hhcGUiOjMsIlNoYXBlVGhpY2tuZXNzIjoyLCJEdXJhdGlvbkZvcm1hdCI6MCwiSW5jbHVkZU5vbldvcmtpbmdEYXlzSW5EdXJhdGlvbiI6ZmFsc2UsIlBlcmNlbnRhZ2VDb21wbGV0ZVN0eWxlIjp7IiRpZCI6IjI4NCIsIkZvbnRTZXR0aW5ncyI6eyIkaWQiOiIyODUiLCJGb250U2l6ZSI6MTAsIkZvbnROYW1lIjoiQ2FsaWJyaSIsIklzQm9sZCI6ZmFsc2UsIklzSXRhbGljIjpmYWxzZSwiSXNVbmRlcmxpbmVkIjpmYWxzZSwiUGFyZW50U3R5bGUiOm51bGx9LCJBdXRvU2l6ZSI6MCwiRm9yZWdyb3VuZCI6eyIkcmVmIjoiODYifSwiTWF4V2lkdGgiOjIwMC4wLCJNYXhIZWlnaHQiOiJJbmZpbml0eSIsIlNtYXJ0Rm9yZWdyb3VuZElzQWN0aXZlIjpmYWxzZSwiSG9yaXpvbnRhbEFsaWdubWVudCI6MCwiVmVydGljYWxBbGlnbm1lbnQiOjAsIlNtYXJ0Rm9yZWdyb3VuZCI6bnVsbCwiQmFja2dyb3VuZEZpbGxUeXBlIjowLCJNYXJnaW4iOnsiJHJlZiI6Ijg4In0sIlBhZGRpbmciOnsiJHJlZiI6Ijg5In0sIkJhY2tncm91bmQiOnsiJHJlZiI6IjkwIn0sIklzVmlzaWJsZSI6dHJ1ZSwiV2lkdGgiOjAuMCwiSGVpZ2h0IjowLjAsIkJvcmRlclN0eWxlIjp7IiRpZCI6IjI4NiIsIkxpbmVDb2xvciI6bnVsbCwiTGluZVdlaWdodCI6MC4wLCJMaW5lVHlwZSI6MCwiUGFyZW50U3R5bGUiOm51bGx9LCJQYXJlbnRTdHlsZSI6bnVsbH0sIkR1cmF0aW9uU3R5bGUiOnsiJGlkIjoiMjg3IiwiRm9udFNldHRpbmdzIjp7IiRpZCI6IjI4OCIsIkZvbnRTaXplIjoxMCwiRm9udE5hbWUiOiJDYWxpYnJpIiwiSXNCb2xkIjpmYWxzZSwiSXNJdGFsaWMiOmZhbHNlLCJJc1VuZGVybGluZWQiOmZhbHNlLCJQYXJlbnRTdHlsZSI6bnVsbH0sIkF1dG9TaXplIjowLCJGb3JlZ3JvdW5kIjp7IiRyZWYiOiI5MyJ9LCJNYXhXaWR0aCI6MjAwLjAsIk1heEhlaWdodCI6IkluZmluaXR5IiwiU21hcnRGb3JlZ3JvdW5kSXNBY3RpdmUiOmZhbHNlLCJIb3Jpem9udGFsQWxpZ25tZW50IjowLCJWZXJ0aWNhbEFsaWdubWVudCI6MCwiU21hcnRGb3JlZ3JvdW5kIjpudWxsLCJCYWNrZ3JvdW5kRmlsbFR5cGUiOjAsIk1hcmdpbiI6eyIkcmVmIjoiOTUifSwiUGFkZGluZyI6eyIkcmVmIjoiOTYifSwiQmFja2dyb3VuZCI6eyIkcmVmIjoiOTcifSwiSXNWaXNpYmxlIjp0cnVlLCJXaWR0aCI6MC4wLCJIZWlnaHQiOjAuMCwiQm9yZGVyU3R5bGUiOnsiJGlkIjoiMjg5IiwiTGluZUNvbG9yIjpudWxsLCJMaW5lV2VpZ2h0IjowLjAsIkxpbmVUeXBlIjowLCJQYXJlbnRTdHlsZSI6bnVsbH0sIlBhcmVudFN0eWxlIjpudWxsfSwiSG9yaXpvbnRhbENvbm5lY3RvclN0eWxlIjp7IiRpZCI6IjI5MCIsIkxpbmVDb2xvciI6eyIkcmVmIjoiOTkifSwiTGluZVdlaWdodCI6MS4wLCJMaW5lVHlwZSI6MCwiUGFyZW50U3R5bGUiOm51bGx9LCJWZXJ0aWNhbENvbm5lY3RvclN0eWxlIjp7IiRpZCI6IjI5MSIsIkxpbmVDb2xvciI6eyIkcmVmIjoiMTAyIn0sIkxpbmVXZWlnaHQiOjEuMCwiTGluZVR5cGUiOjAsIlBhcmVudFN0eWxlIjpudWxsfSwiTWFyZ2luIjpudWxsLCJTdGFydERhdGVQb3NpdGlvbiI6NCwiRW5kRGF0ZVBvc2l0aW9uIjo0LCJEYXRlSXNWaXNpYmxlIjp0cnVlLCJUaXRsZVBvc2l0aW9uIjoyLCJEdXJhdGlvblBvc2l0aW9uIjo2LCJQZXJjZW50YWdlQ29tcGxldGVkUG9zaXRpb24iOjYsIlNwYWNpbmciOjUsIklzQmVsb3dUaW1lYmFuZCI6ZmFsc2UsIlBlcmNlbnRhZ2VDb21wbGV0ZVNoYXBlT3BhY2l0eSI6MzUsIlNoYXBlU3R5bGUiOnsiJGlkIjoiMjkyIiwiTWFyZ2luIjp7IiRyZWYiOiIxMDUifSwiUGFkZGluZyI6eyIkcmVmIjoiMTA2In0sIkJhY2tncm91bmQiOnsiJGlkIjoiMjkzIiwiQ29sb3IiOnsiJGlkIjoiMjk0IiwiQSI6MjU1LCJSIjo5MSwiRyI6MTU1LCJCIjoyMTN9fSwiSXNWaXNpYmxlIjp0cnVlLCJXaWR0aCI6MC4wLCJIZWlnaHQiOjIyLjAsIkJvcmRlclN0eWxlIjp7IiRpZCI6IjI5NSIsIkxpbmVDb2xvciI6eyIkcmVmIjoiMjYyIn0sIkxpbmVXZWlnaHQiOjAuMCwiTGluZVR5cGUiOjAsIlBhcmVudFN0eWxlIjpudWxsfSwiUGFyZW50U3R5bGUiOm51bGx9LCJUaXRsZVN0eWxlIjp7IiRpZCI6IjI5NiIsIkZvbnRTZXR0aW5ncyI6eyIkaWQiOiIyOTciLCJGb250U2l6ZSI6MTEsIkZvbnROYW1lIjoiQ2FsaWJyaSIsIklzQm9sZCI6dHJ1ZSwiSXNJdGFsaWMiOmZhbHNlLCJJc1VuZGVybGluZWQiOmZhbHNlLCJQYXJlbnRTdHlsZSI6bnVsbH0sIkF1dG9TaXplIjowLCJGb3JlZ3JvdW5kIjp7IiRpZCI6IjI5OCIsIkNvbG9yIjp7IiRpZCI6IjI5OSIsIkEiOjI1NSwiUiI6MCwiRyI6MCwiQiI6MH19LCJNYXhXaWR0aCI6NzIwLjAsIk1heEhlaWdodCI6IkluZmluaXR5IiwiU21hcnRGb3JlZ3JvdW5kSXNBY3RpdmUiOmZhbHNlLCJIb3Jpem9udGFsQWxpZ25tZW50IjoxLCJWZXJ0aWNhbEFsaWdubWVudCI6MCwiU21hcnRGb3JlZ3JvdW5kIjpudWxsLCJCYWNrZ3JvdW5kRmlsbFR5cGUiOjAsIk1hcmdpbiI6eyIkcmVmIjoiMTE2In0sIlBhZGRpbmciOnsiJHJlZiI6IjExNyJ9LCJCYWNrZ3JvdW5kIjp7IiRpZCI6IjMwMCIsIkNvbG9yIjp7IiRpZCI6IjMwMSIsIkEiOjAsIlIiOjI1NSwiRyI6MjU1LCJCIjoyNTV9fSwiSXNWaXNpYmxlIjp0cnVlLCJXaWR0aCI6MC4wLCJIZWlnaHQiOjAuMCwiQm9yZGVyU3R5bGUiOnsiJGlkIjoiMzAyIiwiTGluZUNvbG9yIjpudWxsLCJMaW5lV2VpZ2h0IjowLjAsIkxpbmVUeXBlIjowLCJQYXJlbnRTdHlsZSI6bnVsbH0sIlBhcmVudFN0eWxlIjpudWxsfSwiRGF0ZVN0eWxlIjp7IiRpZCI6IjMwMyIsIkZvbnRTZXR0aW5ncyI6eyIkaWQiOiIzMDQiLCJGb250U2l6ZSI6MTAsIkZvbnROYW1lIjoiQ2FsaWJyaSIsIklzQm9sZCI6ZmFsc2UsIklzSXRhbGljIjpmYWxzZSwiSXNVbmRlcmxpbmVkIjpmYWxzZSwiUGFyZW50U3R5bGUiOm51bGx9LCJBdXRvU2l6ZSI6MCwiRm9yZWdyb3VuZCI6eyIkaWQiOiIzMDUiLCJDb2xvciI6eyIkaWQiOiIzMDYiLCJBIjoyNTUsIlIiOjY4LCJHIjo4NCwiQiI6MTA2fX0sIk1heFdpZHRoIjoyMDAuMCwiTWF4SGVpZ2h0IjoiSW5maW5pdHkiLCJTbWFydEZvcmVncm91bmRJc0FjdGl2ZSI6ZmFsc2UsIkhvcml6b250YWxBbGlnbm1lbnQiOjAsIlZlcnRpY2FsQWxpZ25tZW50IjowLCJTbWFydEZvcmVncm91bmQiOm51bGwsIkJhY2tncm91bmRGaWxsVHlwZSI6MCwiTWFyZ2luIjp7IiRyZWYiOiIxMjMifSwiUGFkZGluZyI6eyIkcmVmIjoiMTI0In0sIkJhY2tncm91bmQiOnsiJGlkIjoiMzA3IiwiQ29sb3IiOnsiJGlkIjoiMzA4IiwiQSI6MCwiUiI6MjU1LCJHIjoyNTUsIkIiOjI1NX19LCJJc1Zpc2libGUiOnRydWUsIldpZHRoIjowLjAsIkhlaWdodCI6MC4wLCJCb3JkZXJTdHlsZSI6eyIkaWQiOiIzMDkiLCJMaW5lQ29sb3IiOm51bGwsIkxpbmVXZWlnaHQiOjAuMCwiTGluZVR5cGUiOjAsIlBhcmVudFN0eWxlIjpudWxsfSwiUGFyZW50U3R5bGUiOm51bGx9LCJEYXRlRm9ybWF0Ijp7IiRyZWYiOiIyNzgifSwiV2Vla051bWJlcmluZyI6eyIkaWQiOiIzMTAiLCJGb3JtYXQiOjAsIklzVmlzaWJsZSI6ZmFsc2UsIkxhc3RLbm93blZpc2liaWxpdHlTdGF0ZSI6ZmFsc2V9LCJJc1Zpc2libGUiOnRydWUsIlBhcmVudFN0eWxlIjpudWxsfSwiSW5kZXgiOjMsIlNtYXJ0RHVyYXRpb25BY3RpdmF0ZWQiOmZhbHNlLCJEYXRlRm9ybWF0Ijp7IiRyZWYiOiIyNzgifSwiV2Vla051bWJlcmluZyI6eyIkaWQiOiIzMTEiLCJGb3JtYXQiOjAsIklzVmlzaWJsZSI6ZmFsc2UsIkxhc3RLbm93blZpc2liaWxpdHlTdGF0ZSI6ZmFsc2V9LCJJZCI6ImM2YWQ1ZDY3LTExYTEtNDYwNC1iZGNiLWM4MTkzYzI1OGJiMCIsIkltcG9ydElkIjpudWxsLCJUaXRsZSI6IkFzc2lnbiBSb2xlcyIsIk5vdGUiOm51bGwsIkh5cGVybGluayI6eyIkaWQiOiIzMTIiLCJBZGRyZXNzIjpudWxsLCJTdWJBZGRyZXNzIjpudWxsfSwiSXNDaGFuZ2VkIjpmYWxzZSwiSXNOZXciOmZhbHNlfSx7IiRpZCI6IjMxMyIsIkdyb3VwTmFtZSI6bnVsbCwiU3RhcnREYXRlIjoiMjAyMS0wMy0yOFQwMDowMDowMFoiLCJFbmREYXRlIjoiMjAyMS0wMy0yOFQyMzo1OTowMFoiLCJQZXJjZW50YWdlQ29tcGxldGUiOm51bGwsIlN0eWxlIjp7IiRpZCI6IjMxNCIsIlNoYXBlIjozLCJTaGFwZVRoaWNrbmVzcyI6MiwiRHVyYXRpb25Gb3JtYXQiOjAsIkluY2x1ZGVOb25Xb3JraW5nRGF5c0luRHVyYXRpb24iOmZhbHNlLCJQZXJjZW50YWdlQ29tcGxldGVTdHlsZSI6eyIkaWQiOiIzMTUiLCJGb250U2V0dGluZ3MiOnsiJGlkIjoiMzE2IiwiRm9udFNpemUiOjEwLCJGb250TmFtZSI6IkNhbGlicmkiLCJJc0JvbGQiOmZhbHNlLCJJc0l0YWxpYyI6ZmFsc2UsIklzVW5kZXJsaW5lZCI6ZmFsc2UsIlBhcmVudFN0eWxlIjpudWxsfSwiQXV0b1NpemUiOjAsIkZvcmVncm91bmQiOnsiJHJlZiI6Ijg2In0sIk1heFdpZHRoIjoyMDAuMCwiTWF4SGVpZ2h0IjoiSW5maW5pdHkiLCJTbWFydEZvcmVncm91bmRJc0FjdGl2ZSI6ZmFsc2UsIkhvcml6b250YWxBbGlnbm1lbnQiOjAsIlZlcnRpY2FsQWxpZ25tZW50IjowLCJTbWFydEZvcmVncm91bmQiOm51bGwsIkJhY2tncm91bmRGaWxsVHlwZSI6MCwiTWFyZ2luIjp7IiRyZWYiOiI4OCJ9LCJQYWRkaW5nIjp7IiRyZWYiOiI4OSJ9LCJCYWNrZ3JvdW5kIjp7IiRyZWYiOiI5MCJ9LCJJc1Zpc2libGUiOnRydWUsIldpZHRoIjowLjAsIkhlaWdodCI6MC4wLCJCb3JkZXJTdHlsZSI6eyIkaWQiOiIzMTciLCJMaW5lQ29sb3IiOm51bGwsIkxpbmVXZWlnaHQiOjAuMCwiTGluZVR5cGUiOjAsIlBhcmVudFN0eWxlIjpudWxsfSwiUGFyZW50U3R5bGUiOm51bGx9LCJEdXJhdGlvblN0eWxlIjp7IiRpZCI6IjMxOCIsIkZvbnRTZXR0aW5ncyI6eyIkaWQiOiIzMTkiLCJGb250U2l6ZSI6MTAsIkZvbnROYW1lIjoiQ2FsaWJyaSIsIklzQm9sZCI6ZmFsc2UsIklzSXRhbGljIjpmYWxzZSwiSXNVbmRlcmxpbmVkIjpmYWxzZSwiUGFyZW50U3R5bGUiOm51bGx9LCJBdXRvU2l6ZSI6MCwiRm9yZWdyb3VuZCI6eyIkcmVmIjoiOTMifSwiTWF4V2lkdGgiOjIwMC4wLCJNYXhIZWlnaHQiOiJJbmZpbml0eSIsIlNtYXJ0Rm9yZWdyb3VuZElzQWN0aXZlIjpmYWxzZSwiSG9yaXpvbnRhbEFsaWdubWVudCI6MCwiVmVydGljYWxBbGlnbm1lbnQiOjAsIlNtYXJ0Rm9yZWdyb3VuZCI6bnVsbCwiQmFja2dyb3VuZEZpbGxUeXBlIjowLCJNYXJnaW4iOnsiJHJlZiI6Ijk1In0sIlBhZGRpbmciOnsiJHJlZiI6Ijk2In0sIkJhY2tncm91bmQiOnsiJHJlZiI6Ijk3In0sIklzVmlzaWJsZSI6dHJ1ZSwiV2lkdGgiOjAuMCwiSGVpZ2h0IjowLjAsIkJvcmRlclN0eWxlIjp7IiRpZCI6IjMyMCIsIkxpbmVDb2xvciI6bnVsbCwiTGluZVdlaWdodCI6MC4wLCJMaW5lVHlwZSI6MCwiUGFyZW50U3R5bGUiOm51bGx9LCJQYXJlbnRTdHlsZSI6bnVsbH0sIkhvcml6b250YWxDb25uZWN0b3JTdHlsZSI6eyIkaWQiOiIzMjEiLCJMaW5lQ29sb3IiOnsiJHJlZiI6Ijk5In0sIkxpbmVXZWlnaHQiOjEuMCwiTGluZVR5cGUiOjAsIlBhcmVudFN0eWxlIjpudWxsfSwiVmVydGljYWxDb25uZWN0b3JTdHlsZSI6eyIkaWQiOiIzMjIiLCJMaW5lQ29sb3IiOnsiJHJlZiI6IjEwMiJ9LCJMaW5lV2VpZ2h0IjoxLjAsIkxpbmVUeXBlIjowLCJQYXJlbnRTdHlsZSI6bnVsbH0sIk1hcmdpbiI6bnVsbCwiU3RhcnREYXRlUG9zaXRpb24iOjQsIkVuZERhdGVQb3NpdGlvbiI6NCwiRGF0ZUlzVmlzaWJsZSI6dHJ1ZSwiVGl0bGVQb3NpdGlvbiI6MiwiRHVyYXRpb25Qb3NpdGlvbiI6NiwiUGVyY2VudGFnZUNvbXBsZXRlZFBvc2l0aW9uIjo2LCJTcGFjaW5nIjo1LCJJc0JlbG93VGltZWJhbmQiOmZhbHNlLCJQZXJjZW50YWdlQ29tcGxldGVTaGFwZU9wYWNpdHkiOjM1LCJTaGFwZVN0eWxlIjp7IiRpZCI6IjMyMyIsIk1hcmdpbiI6eyIkcmVmIjoiMTA1In0sIlBhZGRpbmciOnsiJHJlZiI6IjEwNiJ9LCJCYWNrZ3JvdW5kIjp7IiRpZCI6IjMyNCIsIkNvbG9yIjp7IiRpZCI6IjMyNSIsIkEiOjI1NSwiUiI6OTEsIkciOjE1NSwiQiI6MjEzfX0sIklzVmlzaWJsZSI6dHJ1ZSwiV2lkdGgiOjAuMCwiSGVpZ2h0IjoyMi4wLCJCb3JkZXJTdHlsZSI6eyIkaWQiOiIzMjYiLCJMaW5lQ29sb3IiOnsiJHJlZiI6IjI2MiJ9LCJMaW5lV2VpZ2h0IjowLjAsIkxpbmVUeXBlIjowLCJQYXJlbnRTdHlsZSI6bnVsbH0sIlBhcmVudFN0eWxlIjpudWxsfSwiVGl0bGVTdHlsZSI6eyIkaWQiOiIzMjciLCJGb250U2V0dGluZ3MiOnsiJGlkIjoiMzI4IiwiRm9udFNpemUiOjExLCJGb250TmFtZSI6IkNhbGlicmkiLCJJc0JvbGQiOnRydWUsIklzSXRhbGljIjpmYWxzZSwiSXNVbmRlcmxpbmVkIjpmYWxzZSwiUGFyZW50U3R5bGUiOm51bGx9LCJBdXRvU2l6ZSI6MCwiRm9yZWdyb3VuZCI6eyIkaWQiOiIzMjkiLCJDb2xvciI6eyIkaWQiOiIzMzAiLCJBIjoyNTUsIlIiOjAsIkciOjAsIkIiOjB9fSwiTWF4V2lkdGgiOjcyMC4wLCJNYXhIZWlnaHQiOiJJbmZpbml0eSIsIlNtYXJ0Rm9yZWdyb3VuZElzQWN0aXZlIjpmYWxzZSwiSG9yaXpvbnRhbEFsaWdubWVudCI6MSwiVmVydGljYWxBbGlnbm1lbnQiOjAsIlNtYXJ0Rm9yZWdyb3VuZCI6bnVsbCwiQmFja2dyb3VuZEZpbGxUeXBlIjowLCJNYXJnaW4iOnsiJHJlZiI6IjExNiJ9LCJQYWRkaW5nIjp7IiRyZWYiOiIxMTcifSwiQmFja2dyb3VuZCI6eyIkaWQiOiIzMzEiLCJDb2xvciI6eyIkaWQiOiIzMzIiLCJBIjowLCJSIjoyNTUsIkciOjI1NSwiQiI6MjU1fX0sIklzVmlzaWJsZSI6dHJ1ZSwiV2lkdGgiOjAuMCwiSGVpZ2h0IjowLjAsIkJvcmRlclN0eWxlIjp7IiRpZCI6IjMzMyIsIkxpbmVDb2xvciI6bnVsbCwiTGluZVdlaWdodCI6MC4wLCJMaW5lVHlwZSI6MCwiUGFyZW50U3R5bGUiOm51bGx9LCJQYXJlbnRTdHlsZSI6bnVsbH0sIkRhdGVTdHlsZSI6eyIkaWQiOiIzMzQiLCJGb250U2V0dGluZ3MiOnsiJGlkIjoiMzM1IiwiRm9udFNpemUiOjEwLCJGb250TmFtZSI6IkNhbGlicmkiLCJJc0JvbGQiOmZhbHNlLCJJc0l0YWxpYyI6ZmFsc2UsIklzVW5kZXJsaW5lZCI6ZmFsc2UsIlBhcmVudFN0eWxlIjpudWxsfSwiQXV0b1NpemUiOjAsIkZvcmVncm91bmQiOnsiJGlkIjoiMzM2IiwiQ29sb3IiOnsiJGlkIjoiMzM3IiwiQSI6MjU1LCJSIjo2OCwiRyI6ODQsIkIiOjEwNn19LCJNYXhXaWR0aCI6MjAwLjAsIk1heEhlaWdodCI6IkluZmluaXR5IiwiU21hcnRGb3JlZ3JvdW5kSXNBY3RpdmUiOmZhbHNlLCJIb3Jpem9udGFsQWxpZ25tZW50IjowLCJWZXJ0aWNhbEFsaWdubWVudCI6MCwiU21hcnRGb3JlZ3JvdW5kIjpudWxsLCJCYWNrZ3JvdW5kRmlsbFR5cGUiOjAsIk1hcmdpbiI6eyIkcmVmIjoiMTIzIn0sIlBhZGRpbmciOnsiJHJlZiI6IjEyNCJ9LCJCYWNrZ3JvdW5kIjp7IiRpZCI6IjMzOCIsIkNvbG9yIjp7IiRpZCI6IjMzOSIsIkEiOjAsIlIiOjI1NSwiRyI6MjU1LCJCIjoyNTV9fSwiSXNWaXNpYmxlIjp0cnVlLCJXaWR0aCI6MC4wLCJIZWlnaHQiOjAuMCwiQm9yZGVyU3R5bGUiOnsiJGlkIjoiMzQwIiwiTGluZUNvbG9yIjpudWxsLCJMaW5lV2VpZ2h0IjowLjAsIkxpbmVUeXBlIjowLCJQYXJlbnRTdHlsZSI6bnVsbH0sIlBhcmVudFN0eWxlIjpudWxsfSwiRGF0ZUZvcm1hdCI6eyIkcmVmIjoiMjc4In0sIldlZWtOdW1iZXJpbmciOnsiJGlkIjoiMzQxIiwiRm9ybWF0IjowLCJJc1Zpc2libGUiOmZhbHNlLCJMYXN0S25vd25WaXNpYmlsaXR5U3RhdGUiOmZhbHNlfSwiSXNWaXNpYmxlIjp0cnVlLCJQYXJlbnRTdHlsZSI6bnVsbH0sIkluZGV4Ijo0LCJTbWFydER1cmF0aW9uQWN0aXZhdGVkIjpmYWxzZSwiRGF0ZUZvcm1hdCI6eyIkcmVmIjoiMjc4In0sIldlZWtOdW1iZXJpbmciOnsiJGlkIjoiMzQyIiwiRm9ybWF0IjowLCJJc1Zpc2libGUiOmZhbHNlLCJMYXN0S25vd25WaXNpYmlsaXR5U3RhdGUiOmZhbHNlfSwiSWQiOiJjZTEyNWQ2Mi03NDM5LTRiZTQtOWVkYi0wMzE2OGYxOTU2ZmMiLCJJbXBvcnRJZCI6bnVsbCwiVGl0bGUiOiJEZXZlbG9wIFdpcmVmcmFtZXMiLCJOb3RlIjpudWxsLCJIeXBlcmxpbmsiOnsiJGlkIjoiMzQzIiwiQWRkcmVzcyI6bnVsbCwiU3ViQWRkcmVzcyI6bnVsbH0sIklzQ2hhbmdlZCI6ZmFsc2UsIklzTmV3IjpmYWxzZX0seyIkaWQiOiIzNDQiLCJHcm91cE5hbWUiOm51bGwsIlN0YXJ0RGF0ZSI6IjIwMjEtMDMtMjhUMDA6MDA6MDBaIiwiRW5kRGF0ZSI6IjIwMjEtMDMtMzBUMjM6NTk6MDBaIiwiUGVyY2VudGFnZUNvbXBsZXRlIjpudWxsLCJTdHlsZSI6eyIkaWQiOiIzNDUiLCJTaGFwZSI6MywiU2hhcGVUaGlja25lc3MiOjIsIkR1cmF0aW9uRm9ybWF0IjowLCJJbmNsdWRlTm9uV29ya2luZ0RheXNJbkR1cmF0aW9uIjpmYWxzZSwiUGVyY2VudGFnZUNvbXBsZXRlU3R5bGUiOnsiJGlkIjoiMzQ2IiwiRm9udFNldHRpbmdzIjp7IiRpZCI6IjM0NyIsIkZvbnRTaXplIjoxMCwiRm9udE5hbWUiOiJDYWxpYnJpIiwiSXNCb2xkIjpmYWxzZSwiSXNJdGFsaWMiOmZhbHNlLCJJc1VuZGVybGluZWQiOmZhbHNlLCJQYXJlbnRTdHlsZSI6bnVsbH0sIkF1dG9TaXplIjowLCJGb3JlZ3JvdW5kIjp7IiRyZWYiOiI4NiJ9LCJNYXhXaWR0aCI6MjAwLjAsIk1heEhlaWdodCI6IkluZmluaXR5IiwiU21hcnRGb3JlZ3JvdW5kSXNBY3RpdmUiOmZhbHNlLCJIb3Jpem9udGFsQWxpZ25tZW50IjowLCJWZXJ0aWNhbEFsaWdubWVudCI6MCwiU21hcnRGb3JlZ3JvdW5kIjpudWxsLCJCYWNrZ3JvdW5kRmlsbFR5cGUiOjAsIk1hcmdpbiI6eyIkcmVmIjoiODgifSwiUGFkZGluZyI6eyIkcmVmIjoiODkifSwiQmFja2dyb3VuZCI6eyIkcmVmIjoiOTAifSwiSXNWaXNpYmxlIjp0cnVlLCJXaWR0aCI6MC4wLCJIZWlnaHQiOjAuMCwiQm9yZGVyU3R5bGUiOnsiJGlkIjoiMzQ4IiwiTGluZUNvbG9yIjpudWxsLCJMaW5lV2VpZ2h0IjowLjAsIkxpbmVUeXBlIjowLCJQYXJlbnRTdHlsZSI6bnVsbH0sIlBhcmVudFN0eWxlIjpudWxsfSwiRHVyYXRpb25TdHlsZSI6eyIkaWQiOiIzNDkiLCJGb250U2V0dGluZ3MiOnsiJGlkIjoiMzUwIiwiRm9udFNpemUiOjEwLCJGb250TmFtZSI6IkNhbGlicmkiLCJJc0JvbGQiOmZhbHNlLCJJc0l0YWxpYyI6ZmFsc2UsIklzVW5kZXJsaW5lZCI6ZmFsc2UsIlBhcmVudFN0eWxlIjpudWxsfSwiQXV0b1NpemUiOjAsIkZvcmVncm91bmQiOnsiJHJlZiI6IjkzIn0sIk1heFdpZHRoIjoyMDAuMCwiTWF4SGVpZ2h0IjoiSW5maW5pdHkiLCJTbWFydEZvcmVncm91bmRJc0FjdGl2ZSI6ZmFsc2UsIkhvcml6b250YWxBbGlnbm1lbnQiOjAsIlZlcnRpY2FsQWxpZ25tZW50IjowLCJTbWFydEZvcmVncm91bmQiOm51bGwsIkJhY2tncm91bmRGaWxsVHlwZSI6MCwiTWFyZ2luIjp7IiRyZWYiOiI5NSJ9LCJQYWRkaW5nIjp7IiRyZWYiOiI5NiJ9LCJCYWNrZ3JvdW5kIjp7IiRyZWYiOiI5NyJ9LCJJc1Zpc2libGUiOnRydWUsIldpZHRoIjowLjAsIkhlaWdodCI6MC4wLCJCb3JkZXJTdHlsZSI6eyIkaWQiOiIzNTEiLCJMaW5lQ29sb3IiOm51bGwsIkxpbmVXZWlnaHQiOjAuMCwiTGluZVR5cGUiOjAsIlBhcmVudFN0eWxlIjpudWxsfSwiUGFyZW50U3R5bGUiOm51bGx9LCJIb3Jpem9udGFsQ29ubmVjdG9yU3R5bGUiOnsiJGlkIjoiMzUyIiwiTGluZUNvbG9yIjp7IiRyZWYiOiI5OSJ9LCJMaW5lV2VpZ2h0IjoxLjAsIkxpbmVUeXBlIjowLCJQYXJlbnRTdHlsZSI6bnVsbH0sIlZlcnRpY2FsQ29ubmVjdG9yU3R5bGUiOnsiJGlkIjoiMzUzIiwiTGluZUNvbG9yIjp7IiRyZWYiOiIxMDIifSwiTGluZVdlaWdodCI6MS4wLCJMaW5lVHlwZSI6MCwiUGFyZW50U3R5bGUiOm51bGx9LCJNYXJnaW4iOm51bGwsIlN0YXJ0RGF0ZVBvc2l0aW9uIjo0LCJFbmREYXRlUG9zaXRpb24iOjQsIkRhdGVJc1Zpc2libGUiOnRydWUsIlRpdGxlUG9zaXRpb24iOjIsIkR1cmF0aW9uUG9zaXRpb24iOjYsIlBlcmNlbnRhZ2VDb21wbGV0ZWRQb3NpdGlvbiI6NiwiU3BhY2luZyI6NSwiSXNCZWxvd1RpbWViYW5kIjpmYWxzZSwiUGVyY2VudGFnZUNvbXBsZXRlU2hhcGVPcGFjaXR5IjozNSwiU2hhcGVTdHlsZSI6eyIkaWQiOiIzNTQiLCJNYXJnaW4iOnsiJHJlZiI6IjEwNSJ9LCJQYWRkaW5nIjp7IiRyZWYiOiIxMDYifSwiQmFja2dyb3VuZCI6eyIkaWQiOiIzNTUiLCJDb2xvciI6eyIkaWQiOiIzNTYiLCJBIjoyNTUsIlIiOjkxLCJHIjoxNTUsIkIiOjIxM319LCJJc1Zpc2libGUiOnRydWUsIldpZHRoIjowLjAsIkhlaWdodCI6MjIuMCwiQm9yZGVyU3R5bGUiOnsiJGlkIjoiMzU3IiwiTGluZUNvbG9yIjp7IiRyZWYiOiIyNjIifSwiTGluZVdlaWdodCI6MC4wLCJMaW5lVHlwZSI6MCwiUGFyZW50U3R5bGUiOm51bGx9LCJQYXJlbnRTdHlsZSI6bnVsbH0sIlRpdGxlU3R5bGUiOnsiJGlkIjoiMzU4IiwiRm9udFNldHRpbmdzIjp7IiRpZCI6IjM1OSIsIkZvbnRTaXplIjoxMSwiRm9udE5hbWUiOiJDYWxpYnJpIiwiSXNCb2xkIjp0cnVlLCJJc0l0YWxpYyI6ZmFsc2UsIklzVW5kZXJsaW5lZCI6ZmFsc2UsIlBhcmVudFN0eWxlIjpudWxsfSwiQXV0b1NpemUiOjAsIkZvcmVncm91bmQiOnsiJGlkIjoiMzYwIiwiQ29sb3IiOnsiJGlkIjoiMzYxIiwiQSI6MjU1LCJSIjowLCJHIjowLCJCIjowfX0sIk1heFdpZHRoIjo3MjAuMCwiTWF4SGVpZ2h0IjoiSW5maW5pdHkiLCJTbWFydEZvcmVncm91bmRJc0FjdGl2ZSI6ZmFsc2UsIkhvcml6b250YWxBbGlnbm1lbnQiOjEsIlZlcnRpY2FsQWxpZ25tZW50IjowLCJTbWFydEZvcmVncm91bmQiOm51bGwsIkJhY2tncm91bmRGaWxsVHlwZSI6MCwiTWFyZ2luIjp7IiRyZWYiOiIxMTYifSwiUGFkZGluZyI6eyIkcmVmIjoiMTE3In0sIkJhY2tncm91bmQiOnsiJGlkIjoiMzYyIiwiQ29sb3IiOnsiJGlkIjoiMzYzIiwiQSI6MCwiUiI6MjU1LCJHIjoyNTUsIkIiOjI1NX19LCJJc1Zpc2libGUiOnRydWUsIldpZHRoIjowLjAsIkhlaWdodCI6MC4wLCJCb3JkZXJTdHlsZSI6eyIkaWQiOiIzNjQiLCJMaW5lQ29sb3IiOm51bGwsIkxpbmVXZWlnaHQiOjAuMCwiTGluZVR5cGUiOjAsIlBhcmVudFN0eWxlIjpudWxsfSwiUGFyZW50U3R5bGUiOm51bGx9LCJEYXRlU3R5bGUiOnsiJGlkIjoiMzY1IiwiRm9udFNldHRpbmdzIjp7IiRpZCI6IjM2NiIsIkZvbnRTaXplIjoxMCwiRm9udE5hbWUiOiJDYWxpYnJpIiwiSXNCb2xkIjpmYWxzZSwiSXNJdGFsaWMiOmZhbHNlLCJJc1VuZGVybGluZWQiOmZhbHNlLCJQYXJlbnRTdHlsZSI6bnVsbH0sIkF1dG9TaXplIjowLCJGb3JlZ3JvdW5kIjp7IiRpZCI6IjM2NyIsIkNvbG9yIjp7IiRpZCI6IjM2OCIsIkEiOjI1NSwiUiI6NjgsIkciOjg0LCJCIjoxMDZ9fSwiTWF4V2lkdGgiOjIwMC4wLCJNYXhIZWlnaHQiOiJJbmZpbml0eSIsIlNtYXJ0Rm9yZWdyb3VuZElzQWN0aXZlIjpmYWxzZSwiSG9yaXpvbnRhbEFsaWdubWVudCI6MCwiVmVydGljYWxBbGlnbm1lbnQiOjAsIlNtYXJ0Rm9yZWdyb3VuZCI6bnVsbCwiQmFja2dyb3VuZEZpbGxUeXBlIjowLCJNYXJnaW4iOnsiJHJlZiI6IjEyMyJ9LCJQYWRkaW5nIjp7IiRyZWYiOiIxMjQifSwiQmFja2dyb3VuZCI6eyIkaWQiOiIzNjkiLCJDb2xvciI6eyIkaWQiOiIzNzAiLCJBIjowLCJSIjoyNTUsIkciOjI1NSwiQiI6MjU1fX0sIklzVmlzaWJsZSI6dHJ1ZSwiV2lkdGgiOjAuMCwiSGVpZ2h0IjowLjAsIkJvcmRlclN0eWxlIjp7IiRpZCI6IjM3MSIsIkxpbmVDb2xvciI6bnVsbCwiTGluZVdlaWdodCI6MC4wLCJMaW5lVHlwZSI6MCwiUGFyZW50U3R5bGUiOm51bGx9LCJQYXJlbnRTdHlsZSI6bnVsbH0sIkRhdGVGb3JtYXQiOnsiJHJlZiI6IjI3OCJ9LCJXZWVrTnVtYmVyaW5nIjp7IiRpZCI6IjM3MiIsIkZvcm1hdCI6MCwiSXNWaXNpYmxlIjpmYWxzZSwiTGFzdEtub3duVmlzaWJpbGl0eVN0YXRlIjpmYWxzZX0sIklzVmlzaWJsZSI6dHJ1ZSwiUGFyZW50U3R5bGUiOm51bGx9LCJJbmRleCI6NSwiU21hcnREdXJhdGlvbkFjdGl2YXRlZCI6ZmFsc2UsIkRhdGVGb3JtYXQiOnsiJHJlZiI6IjI3OCJ9LCJXZWVrTnVtYmVyaW5nIjp7IiRpZCI6IjM3MyIsIkZvcm1hdCI6MCwiSXNWaXNpYmxlIjpmYWxzZSwiTGFzdEtub3duVmlzaWJpbGl0eVN0YXRlIjpmYWxzZX0sIklkIjoiYzNlODMzNjEtZWM2Ni00NjE1LTg3YjMtNmIxNDBjZTU0OTQ3IiwiSW1wb3J0SWQiOm51bGwsIlRpdGxlIjoiRGV2ZWxvcCBTb2xpZGl0eSBGaWxlcyIsIk5vdGUiOm51bGwsIkh5cGVybGluayI6eyIkaWQiOiIzNzQiLCJBZGRyZXNzIjpudWxsLCJTdWJBZGRyZXNzIjpudWxsfSwiSXNDaGFuZ2VkIjpmYWxzZSwiSXNOZXciOmZhbHNlfSx7IiRpZCI6IjM3NSIsIkdyb3VwTmFtZSI6bnVsbCwiU3RhcnREYXRlIjoiMjAyMS0wMy0yOVQwMDowMDowMFoiLCJFbmREYXRlIjoiMjAyMS0wMy0zMVQyMzo1OTowMFoiLCJQZXJjZW50YWdlQ29tcGxldGUiOm51bGwsIlN0eWxlIjp7IiRpZCI6IjM3NiIsIlNoYXBlIjozLCJTaGFwZVRoaWNrbmVzcyI6MywiRHVyYXRpb25Gb3JtYXQiOjAsIkluY2x1ZGVOb25Xb3JraW5nRGF5c0luRHVyYXRpb24iOmZhbHNlLCJQZXJjZW50YWdlQ29tcGxldGVTdHlsZSI6eyIkaWQiOiIzNzciLCJGb250U2V0dGluZ3MiOnsiJGlkIjoiMzc4IiwiRm9udFNpemUiOjEwLCJGb250TmFtZSI6IkNhbGlicmkiLCJJc0JvbGQiOmZhbHNlLCJJc0l0YWxpYyI6ZmFsc2UsIklzVW5kZXJsaW5lZCI6ZmFsc2UsIlBhcmVudFN0eWxlIjpudWxsfSwiQXV0b1NpemUiOjAsIkZvcmVncm91bmQiOnsiJHJlZiI6Ijg2In0sIk1heFdpZHRoIjoyMDAuMCwiTWF4SGVpZ2h0IjoiSW5maW5pdHkiLCJTbWFydEZvcmVncm91bmRJc0FjdGl2ZSI6ZmFsc2UsIkhvcml6b250YWxBbGlnbm1lbnQiOjAsIlZlcnRpY2FsQWxpZ25tZW50IjowLCJTbWFydEZvcmVncm91bmQiOm51bGwsIkJhY2tncm91bmRGaWxsVHlwZSI6MCwiTWFyZ2luIjp7IiRyZWYiOiI4OCJ9LCJQYWRkaW5nIjp7IiRyZWYiOiI4OSJ9LCJCYWNrZ3JvdW5kIjp7IiRyZWYiOiI5MCJ9LCJJc1Zpc2libGUiOnRydWUsIldpZHRoIjowLjAsIkhlaWdodCI6MC4wLCJCb3JkZXJTdHlsZSI6eyIkaWQiOiIzNzkiLCJMaW5lQ29sb3IiOm51bGwsIkxpbmVXZWlnaHQiOjAuMCwiTGluZVR5cGUiOjAsIlBhcmVudFN0eWxlIjpudWxsfSwiUGFyZW50U3R5bGUiOm51bGx9LCJEdXJhdGlvblN0eWxlIjp7IiRpZCI6IjM4MCIsIkZvbnRTZXR0aW5ncyI6eyIkaWQiOiIzODEiLCJGb250U2l6ZSI6MTAsIkZvbnROYW1lIjoiQ2FsaWJyaSIsIklzQm9sZCI6ZmFsc2UsIklzSXRhbGljIjpmYWxzZSwiSXNVbmRlcmxpbmVkIjpmYWxzZSwiUGFyZW50U3R5bGUiOm51bGx9LCJBdXRvU2l6ZSI6MCwiRm9yZWdyb3VuZCI6eyIkcmVmIjoiOTMifSwiTWF4V2lkdGgiOjIwMC4wLCJNYXhIZWlnaHQiOiJJbmZpbml0eSIsIlNtYXJ0Rm9yZWdyb3VuZElzQWN0aXZlIjpmYWxzZSwiSG9yaXpvbnRhbEFsaWdubWVudCI6MCwiVmVydGljYWxBbGlnbm1lbnQiOjAsIlNtYXJ0Rm9yZWdyb3VuZCI6bnVsbCwiQmFja2dyb3VuZEZpbGxUeXBlIjowLCJNYXJnaW4iOnsiJHJlZiI6Ijk1In0sIlBhZGRpbmciOnsiJHJlZiI6Ijk2In0sIkJhY2tncm91bmQiOnsiJHJlZiI6Ijk3In0sIklzVmlzaWJsZSI6dHJ1ZSwiV2lkdGgiOjAuMCwiSGVpZ2h0IjowLjAsIkJvcmRlclN0eWxlIjp7IiRpZCI6IjM4MiIsIkxpbmVDb2xvciI6bnVsbCwiTGluZVdlaWdodCI6MC4wLCJMaW5lVHlwZSI6MCwiUGFyZW50U3R5bGUiOm51bGx9LCJQYXJlbnRTdHlsZSI6bnVsbH0sIkhvcml6b250YWxDb25uZWN0b3JTdHlsZSI6eyIkaWQiOiIzODMiLCJMaW5lQ29sb3IiOnsiJHJlZiI6Ijk5In0sIkxpbmVXZWlnaHQiOjEuMCwiTGluZVR5cGUiOjAsIlBhcmVudFN0eWxlIjpudWxsfSwiVmVydGljYWxDb25uZWN0b3JTdHlsZSI6eyIkaWQiOiIzODQiLCJMaW5lQ29sb3IiOnsiJGlkIjoiMzg1IiwiJHR5cGUiOiJOTFJFLkNvbW1vbi5Eb20uU29saWRDb2xvckJydXNoLCBOTFJFLkNvbW1vbiIsIkNvbG9yIjp7IiRpZCI6IjM4NiIsIkEiOjI1NSwiUiI6OTEsIkciOjE1NSwiQiI6MjEzfX0sIkxpbmVXZWlnaHQiOjAuODMzMzMzMywiTGluZVR5cGUiOjAsIlBhcmVudFN0eWxlIjpudWxsfSwiTWFyZ2luIjpudWxsLCJTdGFydERhdGVQb3NpdGlvbiI6NCwiRW5kRGF0ZVBvc2l0aW9uIjo0LCJEYXRlSXNWaXNpYmxlIjp0cnVlLCJUaXRsZVBvc2l0aW9uIjoyLCJEdXJhdGlvblBvc2l0aW9uIjo2LCJQZXJjZW50YWdlQ29tcGxldGVkUG9zaXRpb24iOjYsIlNwYWNpbmciOjUsIklzQmVsb3dUaW1lYmFuZCI6ZmFsc2UsIlBlcmNlbnRhZ2VDb21wbGV0ZVNoYXBlT3BhY2l0eSI6MzUsIlNoYXBlU3R5bGUiOnsiJGlkIjoiMzg3IiwiTWFyZ2luIjp7IiRyZWYiOiIxMDUifSwiUGFkZGluZyI6eyIkcmVmIjoiMTA2In0sIkJhY2tncm91bmQiOnsiJGlkIjoiMzg4IiwiQ29sb3IiOnsiJGlkIjoiMzg5IiwiQSI6MjU1LCJSIjo5MSwiRyI6MTU1LCJCIjoyMTN9fSwiSXNWaXNpYmxlIjp0cnVlLCJXaWR0aCI6MzE1LjEyOTc2MDc0MjE4NzUsIkhlaWdodCI6MjMuMzg5MjExNjU0NjYzMDg2LCJCb3JkZXJTdHlsZSI6eyIkaWQiOiIzOTAiLCJMaW5lQ29sb3IiOnsiJHJlZiI6IjI2MiJ9LCJMaW5lV2VpZ2h0IjowLjAsIkxpbmVUeXBlIjowLCJQYXJlbnRTdHlsZSI6bnVsbH0sIlBhcmVudFN0eWxlIjpudWxsfSwiVGl0bGVTdHlsZSI6eyIkaWQiOiIzOTEiLCJGb250U2V0dGluZ3MiOnsiJGlkIjoiMzkyIiwiRm9udFNpemUiOjExLCJGb250TmFtZSI6IkNhbGlicmkiLCJJc0JvbGQiOnRydWUsIklzSXRhbGljIjpmYWxzZSwiSXNVbmRlcmxpbmVkIjpmYWxzZSwiUGFyZW50U3R5bGUiOm51bGx9LCJBdXRvU2l6ZSI6MCwiRm9yZWdyb3VuZCI6eyIkaWQiOiIzOTMiLCJDb2xvciI6eyIkaWQiOiIzOTQiLCJBIjoyNTUsIlIiOjAsIkciOjAsIkIiOjB9fSwiTWF4V2lkdGgiOjcyMC4wLCJNYXhIZWlnaHQiOiJJbmZpbml0eSIsIlNtYXJ0Rm9yZWdyb3VuZElzQWN0aXZlIjpmYWxzZSwiSG9yaXpvbnRhbEFsaWdubWVudCI6MSwiVmVydGljYWxBbGlnbm1lbnQiOjAsIlNtYXJ0Rm9yZWdyb3VuZCI6bnVsbCwiQmFja2dyb3VuZEZpbGxUeXBlIjowLCJNYXJnaW4iOnsiJHJlZiI6IjExNiJ9LCJQYWRkaW5nIjp7IiRyZWYiOiIxMTcifSwiQmFja2dyb3VuZCI6eyIkaWQiOiIzOTUiLCJDb2xvciI6eyIkaWQiOiIzOTYiLCJBIjowLCJSIjoyNTUsIkciOjI1NSwiQiI6MjU1fX0sIklzVmlzaWJsZSI6dHJ1ZSwiV2lkdGgiOjAuMCwiSGVpZ2h0IjowLjAsIkJvcmRlclN0eWxlIjp7IiRpZCI6IjM5NyIsIkxpbmVDb2xvciI6bnVsbCwiTGluZVdlaWdodCI6MC4wLCJMaW5lVHlwZSI6MCwiUGFyZW50U3R5bGUiOm51bGx9LCJQYXJlbnRTdHlsZSI6bnVsbH0sIkRhdGVTdHlsZSI6eyIkaWQiOiIzOTgiLCJGb250U2V0dGluZ3MiOnsiJGlkIjoiMzk5IiwiRm9udFNpemUiOjEwLCJGb250TmFtZSI6IkNhbGlicmkiLCJJc0JvbGQiOmZhbHNlLCJJc0l0YWxpYyI6ZmFsc2UsIklzVW5kZXJsaW5lZCI6ZmFsc2UsIlBhcmVudFN0eWxlIjpudWxsfSwiQXV0b1NpemUiOjAsIkZvcmVncm91bmQiOnsiJGlkIjoiNDAwIiwiQ29sb3IiOnsiJGlkIjoiNDAxIiwiQSI6MjU1LCJSIjo2OCwiRyI6ODQsIkIiOjEwNn19LCJNYXhXaWR0aCI6MjAwLjAsIk1heEhlaWdodCI6IkluZmluaXR5IiwiU21hcnRGb3JlZ3JvdW5kSXNBY3RpdmUiOmZhbHNlLCJIb3Jpem9udGFsQWxpZ25tZW50IjowLCJWZXJ0aWNhbEFsaWdubWVudCI6MCwiU21hcnRGb3JlZ3JvdW5kIjpudWxsLCJCYWNrZ3JvdW5kRmlsbFR5cGUiOjAsIk1hcmdpbiI6eyIkcmVmIjoiMTIzIn0sIlBhZGRpbmciOnsiJHJlZiI6IjEyNCJ9LCJCYWNrZ3JvdW5kIjp7IiRpZCI6IjQwMiIsIkNvbG9yIjp7IiRpZCI6IjQwMyIsIkEiOjAsIlIiOjI1NSwiRyI6MjU1LCJCIjoyNTV9fSwiSXNWaXNpYmxlIjp0cnVlLCJXaWR0aCI6MC4wLCJIZWlnaHQiOjAuMCwiQm9yZGVyU3R5bGUiOnsiJGlkIjoiNDA0IiwiTGluZUNvbG9yIjpudWxsLCJMaW5lV2VpZ2h0IjowLjAsIkxpbmVUeXBlIjowLCJQYXJlbnRTdHlsZSI6bnVsbH0sIlBhcmVudFN0eWxlIjpudWxsfSwiRGF0ZUZvcm1hdCI6eyIkcmVmIjoiMjc4In0sIldlZWtOdW1iZXJpbmciOnsiJGlkIjoiNDA1IiwiRm9ybWF0IjowLCJJc1Zpc2libGUiOmZhbHNlLCJMYXN0S25vd25WaXNpYmlsaXR5U3RhdGUiOmZhbHNlfSwiSXNWaXNpYmxlIjp0cnVlLCJQYXJlbnRTdHlsZSI6bnVsbH0sIkluZGV4Ijo2LCJTbWFydER1cmF0aW9uQWN0aXZhdGVkIjpmYWxzZSwiRGF0ZUZvcm1hdCI6eyIkcmVmIjoiMjc4In0sIldlZWtOdW1iZXJpbmciOnsiJGlkIjoiNDA2IiwiRm9ybWF0IjowLCJJc1Zpc2libGUiOmZhbHNlLCJMYXN0S25vd25WaXNpYmlsaXR5U3RhdGUiOmZhbHNlfSwiSWQiOiI1ZmEwYTJkZS00MTQyLTQ3MzQtODQ4ZC0wYjRhNmZiZmY3NDgiLCJJbXBvcnRJZCI6bnVsbCwiVGl0bGUiOiJEZXZlbG9wIFVzZXIgSW50ZXJmYWNlIiwiTm90ZSI6bnVsbCwiSHlwZXJsaW5rIjp7IiRpZCI6IjQwNyIsIkFkZHJlc3MiOm51bGwsIlN1YkFkZHJlc3MiOm51bGx9LCJJc0NoYW5nZWQiOmZhbHNlLCJJc05ldyI6ZmFsc2V9LHsiJGlkIjoiNDA4IiwiR3JvdXBOYW1lIjpudWxsLCJTdGFydERhdGUiOiIyMDIxLTAzLTMwVDAwOjAwOjAwWiIsIkVuZERhdGUiOiIyMDIxLTA0LTAxVDIzOjU5OjAwWiIsIlBlcmNlbnRhZ2VDb21wbGV0ZSI6bnVsbCwiU3R5bGUiOnsiJGlkIjoiNDA5IiwiU2hhcGUiOjMsIlNoYXBlVGhpY2tuZXNzIjoyLCJEdXJhdGlvbkZvcm1hdCI6MCwiSW5jbHVkZU5vbldvcmtpbmdEYXlzSW5EdXJhdGlvbiI6ZmFsc2UsIlBlcmNlbnRhZ2VDb21wbGV0ZVN0eWxlIjp7IiRpZCI6IjQxMCIsIkZvbnRTZXR0aW5ncyI6eyIkaWQiOiI0MTEiLCJGb250U2l6ZSI6MTAsIkZvbnROYW1lIjoiQ2FsaWJyaSIsIklzQm9sZCI6ZmFsc2UsIklzSXRhbGljIjpmYWxzZSwiSXNVbmRlcmxpbmVkIjpmYWxzZSwiUGFyZW50U3R5bGUiOm51bGx9LCJBdXRvU2l6ZSI6MCwiRm9yZWdyb3VuZCI6eyIkcmVmIjoiODYifSwiTWF4V2lkdGgiOjIwMC4wLCJNYXhIZWlnaHQiOiJJbmZpbml0eSIsIlNtYXJ0Rm9yZWdyb3VuZElzQWN0aXZlIjpmYWxzZSwiSG9yaXpvbnRhbEFsaWdubWVudCI6MCwiVmVydGljYWxBbGlnbm1lbnQiOjAsIlNtYXJ0Rm9yZWdyb3VuZCI6bnVsbCwiQmFja2dyb3VuZEZpbGxUeXBlIjowLCJNYXJnaW4iOnsiJHJlZiI6Ijg4In0sIlBhZGRpbmciOnsiJHJlZiI6Ijg5In0sIkJhY2tncm91bmQiOnsiJHJlZiI6IjkwIn0sIklzVmlzaWJsZSI6dHJ1ZSwiV2lkdGgiOjAuMCwiSGVpZ2h0IjowLjAsIkJvcmRlclN0eWxlIjp7IiRpZCI6IjQxMiIsIkxpbmVDb2xvciI6bnVsbCwiTGluZVdlaWdodCI6MC4wLCJMaW5lVHlwZSI6MCwiUGFyZW50U3R5bGUiOm51bGx9LCJQYXJlbnRTdHlsZSI6bnVsbH0sIkR1cmF0aW9uU3R5bGUiOnsiJGlkIjoiNDEzIiwiRm9udFNldHRpbmdzIjp7IiRpZCI6IjQxNCIsIkZvbnRTaXplIjoxMCwiRm9udE5hbWUiOiJDYWxpYnJpIiwiSXNCb2xkIjpmYWxzZSwiSXNJdGFsaWMiOmZhbHNlLCJJc1VuZGVybGluZWQiOmZhbHNlLCJQYXJlbnRTdHlsZSI6bnVsbH0sIkF1dG9TaXplIjowLCJGb3JlZ3JvdW5kIjp7IiRyZWYiOiI5MyJ9LCJNYXhXaWR0aCI6MjAwLjAsIk1heEhlaWdodCI6IkluZmluaXR5IiwiU21hcnRGb3JlZ3JvdW5kSXNBY3RpdmUiOmZhbHNlLCJIb3Jpem9udGFsQWxpZ25tZW50IjowLCJWZXJ0aWNhbEFsaWdubWVudCI6MCwiU21hcnRGb3JlZ3JvdW5kIjpudWxsLCJCYWNrZ3JvdW5kRmlsbFR5cGUiOjAsIk1hcmdpbiI6eyIkcmVmIjoiOTUifSwiUGFkZGluZyI6eyIkcmVmIjoiOTYifSwiQmFja2dyb3VuZCI6eyIkcmVmIjoiOTcifSwiSXNWaXNpYmxlIjp0cnVlLCJXaWR0aCI6MC4wLCJIZWlnaHQiOjAuMCwiQm9yZGVyU3R5bGUiOnsiJGlkIjoiNDE1IiwiTGluZUNvbG9yIjpudWxsLCJMaW5lV2VpZ2h0IjowLjAsIkxpbmVUeXBlIjowLCJQYXJlbnRTdHlsZSI6bnVsbH0sIlBhcmVudFN0eWxlIjpudWxsfSwiSG9yaXpvbnRhbENvbm5lY3RvclN0eWxlIjp7IiRpZCI6IjQxNiIsIkxpbmVDb2xvciI6eyIkcmVmIjoiOTkifSwiTGluZVdlaWdodCI6MS4wLCJMaW5lVHlwZSI6MCwiUGFyZW50U3R5bGUiOm51bGx9LCJWZXJ0aWNhbENvbm5lY3RvclN0eWxlIjp7IiRpZCI6IjQxNyIsIkxpbmVDb2xvciI6eyIkcmVmIjoiMTAyIn0sIkxpbmVXZWlnaHQiOjEuMCwiTGluZVR5cGUiOjAsIlBhcmVudFN0eWxlIjpudWxsfSwiTWFyZ2luIjpudWxsLCJTdGFydERhdGVQb3NpdGlvbiI6NCwiRW5kRGF0ZVBvc2l0aW9uIjo0LCJEYXRlSXNWaXNpYmxlIjp0cnVlLCJUaXRsZVBvc2l0aW9uIjoyLCJEdXJhdGlvblBvc2l0aW9uIjo2LCJQZXJjZW50YWdlQ29tcGxldGVkUG9zaXRpb24iOjYsIlNwYWNpbmciOjUsIklzQmVsb3dUaW1lYmFuZCI6ZmFsc2UsIlBlcmNlbnRhZ2VDb21wbGV0ZVNoYXBlT3BhY2l0eSI6MzUsIlNoYXBlU3R5bGUiOnsiJGlkIjoiNDE4IiwiTWFyZ2luIjp7IiRyZWYiOiIxMDUifSwiUGFkZGluZyI6eyIkcmVmIjoiMTA2In0sIkJhY2tncm91bmQiOnsiJGlkIjoiNDE5IiwiQ29sb3IiOnsiJGlkIjoiNDIwIiwiQSI6MjU1LCJSIjo5MSwiRyI6MTU1LCJCIjoyMTN9fSwiSXNWaXNpYmxlIjp0cnVlLCJXaWR0aCI6MC4wLCJIZWlnaHQiOjIyLjAsIkJvcmRlclN0eWxlIjp7IiRpZCI6IjQyMSIsIkxpbmVDb2xvciI6eyIkcmVmIjoiMjYyIn0sIkxpbmVXZWlnaHQiOjAuMCwiTGluZVR5cGUiOjAsIlBhcmVudFN0eWxlIjpudWxsfSwiUGFyZW50U3R5bGUiOm51bGx9LCJUaXRsZVN0eWxlIjp7IiRpZCI6IjQyMiIsIkZvbnRTZXR0aW5ncyI6eyIkaWQiOiI0MjMiLCJGb250U2l6ZSI6MTEsIkZvbnROYW1lIjoiQ2FsaWJyaSIsIklzQm9sZCI6dHJ1ZSwiSXNJdGFsaWMiOmZhbHNlLCJJc1VuZGVybGluZWQiOmZhbHNlLCJQYXJlbnRTdHlsZSI6bnVsbH0sIkF1dG9TaXplIjowLCJGb3JlZ3JvdW5kIjp7IiRpZCI6IjQyNCIsIkNvbG9yIjp7IiRpZCI6IjQyNSIsIkEiOjI1NSwiUiI6MCwiRyI6MCwiQiI6MH19LCJNYXhXaWR0aCI6NzIwLjAsIk1heEhlaWdodCI6IkluZmluaXR5IiwiU21hcnRGb3JlZ3JvdW5kSXNBY3RpdmUiOmZhbHNlLCJIb3Jpem9udGFsQWxpZ25tZW50IjoxLCJWZXJ0aWNhbEFsaWdubWVudCI6MCwiU21hcnRGb3JlZ3JvdW5kIjpudWxsLCJCYWNrZ3JvdW5kRmlsbFR5cGUiOjAsIk1hcmdpbiI6eyIkcmVmIjoiMTE2In0sIlBhZGRpbmciOnsiJHJlZiI6IjExNyJ9LCJCYWNrZ3JvdW5kIjp7IiRpZCI6IjQyNiIsIkNvbG9yIjp7IiRpZCI6IjQyNyIsIkEiOjAsIlIiOjI1NSwiRyI6MjU1LCJCIjoyNTV9fSwiSXNWaXNpYmxlIjp0cnVlLCJXaWR0aCI6MC4wLCJIZWlnaHQiOjAuMCwiQm9yZGVyU3R5bGUiOnsiJGlkIjoiNDI4IiwiTGluZUNvbG9yIjpudWxsLCJMaW5lV2VpZ2h0IjowLjAsIkxpbmVUeXBlIjowLCJQYXJlbnRTdHlsZSI6bnVsbH0sIlBhcmVudFN0eWxlIjpudWxsfSwiRGF0ZVN0eWxlIjp7IiRpZCI6IjQyOSIsIkZvbnRTZXR0aW5ncyI6eyIkaWQiOiI0MzAiLCJGb250U2l6ZSI6MTAsIkZvbnROYW1lIjoiQ2FsaWJyaSIsIklzQm9sZCI6ZmFsc2UsIklzSXRhbGljIjpmYWxzZSwiSXNVbmRlcmxpbmVkIjpmYWxzZSwiUGFyZW50U3R5bGUiOm51bGx9LCJBdXRvU2l6ZSI6MCwiRm9yZWdyb3VuZCI6eyIkaWQiOiI0MzEiLCJDb2xvciI6eyIkaWQiOiI0MzIiLCJBIjoyNTUsIlIiOjY4LCJHIjo4NCwiQiI6MTA2fX0sIk1heFdpZHRoIjoyMDAuMCwiTWF4SGVpZ2h0IjoiSW5maW5pdHkiLCJTbWFydEZvcmVncm91bmRJc0FjdGl2ZSI6ZmFsc2UsIkhvcml6b250YWxBbGlnbm1lbnQiOjAsIlZlcnRpY2FsQWxpZ25tZW50IjowLCJTbWFydEZvcmVncm91bmQiOm51bGwsIkJhY2tncm91bmRGaWxsVHlwZSI6MCwiTWFyZ2luIjp7IiRyZWYiOiIxMjMifSwiUGFkZGluZyI6eyIkcmVmIjoiMTI0In0sIkJhY2tncm91bmQiOnsiJGlkIjoiNDMzIiwiQ29sb3IiOnsiJGlkIjoiNDM0IiwiQSI6MCwiUiI6MjU1LCJHIjoyNTUsIkIiOjI1NX19LCJJc1Zpc2libGUiOnRydWUsIldpZHRoIjowLjAsIkhlaWdodCI6MC4wLCJCb3JkZXJTdHlsZSI6eyIkaWQiOiI0MzUiLCJMaW5lQ29sb3IiOm51bGwsIkxpbmVXZWlnaHQiOjAuMCwiTGluZVR5cGUiOjAsIlBhcmVudFN0eWxlIjpudWxsfSwiUGFyZW50U3R5bGUiOm51bGx9LCJEYXRlRm9ybWF0Ijp7IiRyZWYiOiIyNzgifSwiV2Vla051bWJlcmluZyI6eyIkaWQiOiI0MzYiLCJGb3JtYXQiOjAsIklzVmlzaWJsZSI6ZmFsc2UsIkxhc3RLbm93blZpc2liaWxpdHlTdGF0ZSI6ZmFsc2V9LCJJc1Zpc2libGUiOnRydWUsIlBhcmVudFN0eWxlIjpudWxsfSwiSW5kZXgiOjcsIlNtYXJ0RHVyYXRpb25BY3RpdmF0ZWQiOmZhbHNlLCJEYXRlRm9ybWF0Ijp7IiRyZWYiOiIyNzgifSwiV2Vla051bWJlcmluZyI6eyIkaWQiOiI0MzciLCJGb3JtYXQiOjAsIklzVmlzaWJsZSI6ZmFsc2UsIkxhc3RLbm93blZpc2liaWxpdHlTdGF0ZSI6ZmFsc2V9LCJJZCI6ImU1OTU4ZWVmLTIxOWEtNDc0OC05OTBkLTNmMWY1ZDNkYzM5MiIsIkltcG9ydElkIjpudWxsLCJUaXRsZSI6IkludGVncmF0aW9uIiwiTm90ZSI6bnVsbCwiSHlwZXJsaW5rIjp7IiRpZCI6IjQzOCIsIkFkZHJlc3MiOm51bGwsIlN1YkFkZHJlc3MiOm51bGx9LCJJc0NoYW5nZWQiOmZhbHNlLCJJc05ldyI6ZmFsc2V9LHsiJGlkIjoiNDM5IiwiR3JvdXBOYW1lIjpudWxsLCJTdGFydERhdGUiOiIyMDIxLTA0LTAxVDAwOjAwOjAwWiIsIkVuZERhdGUiOiIyMDIxLTA0LTAyVDIzOjU5OjAwWiIsIlBlcmNlbnRhZ2VDb21wbGV0ZSI6bnVsbCwiU3R5bGUiOnsiJGlkIjoiNDQwIiwiU2hhcGUiOjMsIlNoYXBlVGhpY2tuZXNzIjoyLCJEdXJhdGlvbkZvcm1hdCI6MCwiSW5jbHVkZU5vbldvcmtpbmdEYXlzSW5EdXJhdGlvbiI6ZmFsc2UsIlBlcmNlbnRhZ2VDb21wbGV0ZVN0eWxlIjp7IiRpZCI6IjQ0MSIsIkZvbnRTZXR0aW5ncyI6eyIkaWQiOiI0NDIiLCJGb250U2l6ZSI6MTAsIkZvbnROYW1lIjoiQ2FsaWJyaSIsIklzQm9sZCI6ZmFsc2UsIklzSXRhbGljIjpmYWxzZSwiSXNVbmRlcmxpbmVkIjpmYWxzZSwiUGFyZW50U3R5bGUiOm51bGx9LCJBdXRvU2l6ZSI6MCwiRm9yZWdyb3VuZCI6eyIkcmVmIjoiODYifSwiTWF4V2lkdGgiOjIwMC4wLCJNYXhIZWlnaHQiOiJJbmZpbml0eSIsIlNtYXJ0Rm9yZWdyb3VuZElzQWN0aXZlIjpmYWxzZSwiSG9yaXpvbnRhbEFsaWdubWVudCI6MCwiVmVydGljYWxBbGlnbm1lbnQiOjAsIlNtYXJ0Rm9yZWdyb3VuZCI6bnVsbCwiQmFja2dyb3VuZEZpbGxUeXBlIjowLCJNYXJnaW4iOnsiJHJlZiI6Ijg4In0sIlBhZGRpbmciOnsiJHJlZiI6Ijg5In0sIkJhY2tncm91bmQiOnsiJHJlZiI6IjkwIn0sIklzVmlzaWJsZSI6dHJ1ZSwiV2lkdGgiOjAuMCwiSGVpZ2h0IjowLjAsIkJvcmRlclN0eWxlIjp7IiRpZCI6IjQ0MyIsIkxpbmVDb2xvciI6bnVsbCwiTGluZVdlaWdodCI6MC4wLCJMaW5lVHlwZSI6MCwiUGFyZW50U3R5bGUiOm51bGx9LCJQYXJlbnRTdHlsZSI6bnVsbH0sIkR1cmF0aW9uU3R5bGUiOnsiJGlkIjoiNDQ0IiwiRm9udFNldHRpbmdzIjp7IiRpZCI6IjQ0NSIsIkZvbnRTaXplIjoxMCwiRm9udE5hbWUiOiJDYWxpYnJpIiwiSXNCb2xkIjpmYWxzZSwiSXNJdGFsaWMiOmZhbHNlLCJJc1VuZGVybGluZWQiOmZhbHNlLCJQYXJlbnRTdHlsZSI6bnVsbH0sIkF1dG9TaXplIjowLCJGb3JlZ3JvdW5kIjp7IiRyZWYiOiI5MyJ9LCJNYXhXaWR0aCI6MjAwLjAsIk1heEhlaWdodCI6IkluZmluaXR5IiwiU21hcnRGb3JlZ3JvdW5kSXNBY3RpdmUiOmZhbHNlLCJIb3Jpem9udGFsQWxpZ25tZW50IjowLCJWZXJ0aWNhbEFsaWdubWVudCI6MCwiU21hcnRGb3JlZ3JvdW5kIjpudWxsLCJCYWNrZ3JvdW5kRmlsbFR5cGUiOjAsIk1hcmdpbiI6eyIkcmVmIjoiOTUifSwiUGFkZGluZyI6eyIkcmVmIjoiOTYifSwiQmFja2dyb3VuZCI6eyIkcmVmIjoiOTcifSwiSXNWaXNpYmxlIjp0cnVlLCJXaWR0aCI6MC4wLCJIZWlnaHQiOjAuMCwiQm9yZGVyU3R5bGUiOnsiJGlkIjoiNDQ2IiwiTGluZUNvbG9yIjpudWxsLCJMaW5lV2VpZ2h0IjowLjAsIkxpbmVUeXBlIjowLCJQYXJlbnRTdHlsZSI6bnVsbH0sIlBhcmVudFN0eWxlIjpudWxsfSwiSG9yaXpvbnRhbENvbm5lY3RvclN0eWxlIjp7IiRpZCI6IjQ0NyIsIkxpbmVDb2xvciI6eyIkcmVmIjoiOTkifSwiTGluZVdlaWdodCI6MS4wLCJMaW5lVHlwZSI6MCwiUGFyZW50U3R5bGUiOm51bGx9LCJWZXJ0aWNhbENvbm5lY3RvclN0eWxlIjp7IiRpZCI6IjQ0OCIsIkxpbmVDb2xvciI6eyIkcmVmIjoiMTAyIn0sIkxpbmVXZWlnaHQiOjEuMCwiTGluZVR5cGUiOjAsIlBhcmVudFN0eWxlIjpudWxsfSwiTWFyZ2luIjpudWxsLCJTdGFydERhdGVQb3NpdGlvbiI6NCwiRW5kRGF0ZVBvc2l0aW9uIjo0LCJEYXRlSXNWaXNpYmxlIjp0cnVlLCJUaXRsZVBvc2l0aW9uIjoyLCJEdXJhdGlvblBvc2l0aW9uIjo2LCJQZXJjZW50YWdlQ29tcGxldGVkUG9zaXRpb24iOjYsIlNwYWNpbmciOjUsIklzQmVsb3dUaW1lYmFuZCI6ZmFsc2UsIlBlcmNlbnRhZ2VDb21wbGV0ZVNoYXBlT3BhY2l0eSI6MzUsIlNoYXBlU3R5bGUiOnsiJGlkIjoiNDQ5IiwiTWFyZ2luIjp7IiRyZWYiOiIxMDUifSwiUGFkZGluZyI6eyIkcmVmIjoiMTA2In0sIkJhY2tncm91bmQiOnsiJGlkIjoiNDUwIiwiQ29sb3IiOnsiJGlkIjoiNDUxIiwiQSI6MjU1LCJSIjo5MSwiRyI6MTU1LCJCIjoyMTN9fSwiSXNWaXNpYmxlIjp0cnVlLCJXaWR0aCI6MC4wLCJIZWlnaHQiOjIyLjAsIkJvcmRlclN0eWxlIjp7IiRpZCI6IjQ1MiIsIkxpbmVDb2xvciI6eyIkcmVmIjoiMjYyIn0sIkxpbmVXZWlnaHQiOjAuMCwiTGluZVR5cGUiOjAsIlBhcmVudFN0eWxlIjpudWxsfSwiUGFyZW50U3R5bGUiOm51bGx9LCJUaXRsZVN0eWxlIjp7IiRpZCI6IjQ1MyIsIkZvbnRTZXR0aW5ncyI6eyIkaWQiOiI0NTQiLCJGb250U2l6ZSI6MTEsIkZvbnROYW1lIjoiQ2FsaWJyaSIsIklzQm9sZCI6dHJ1ZSwiSXNJdGFsaWMiOmZhbHNlLCJJc1VuZGVybGluZWQiOmZhbHNlLCJQYXJlbnRTdHlsZSI6bnVsbH0sIkF1dG9TaXplIjowLCJGb3JlZ3JvdW5kIjp7IiRpZCI6IjQ1NSIsIkNvbG9yIjp7IiRpZCI6IjQ1NiIsIkEiOjI1NSwiUiI6MCwiRyI6MCwiQiI6MH19LCJNYXhXaWR0aCI6NzIwLjAsIk1heEhlaWdodCI6IkluZmluaXR5IiwiU21hcnRGb3JlZ3JvdW5kSXNBY3RpdmUiOmZhbHNlLCJIb3Jpem9udGFsQWxpZ25tZW50IjoxLCJWZXJ0aWNhbEFsaWdubWVudCI6MCwiU21hcnRGb3JlZ3JvdW5kIjpudWxsLCJCYWNrZ3JvdW5kRmlsbFR5cGUiOjAsIk1hcmdpbiI6eyIkcmVmIjoiMTE2In0sIlBhZGRpbmciOnsiJHJlZiI6IjExNyJ9LCJCYWNrZ3JvdW5kIjp7IiRpZCI6IjQ1NyIsIkNvbG9yIjp7IiRpZCI6IjQ1OCIsIkEiOjAsIlIiOjI1NSwiRyI6MjU1LCJCIjoyNTV9fSwiSXNWaXNpYmxlIjp0cnVlLCJXaWR0aCI6MC4wLCJIZWlnaHQiOjAuMCwiQm9yZGVyU3R5bGUiOnsiJGlkIjoiNDU5IiwiTGluZUNvbG9yIjpudWxsLCJMaW5lV2VpZ2h0IjowLjAsIkxpbmVUeXBlIjowLCJQYXJlbnRTdHlsZSI6bnVsbH0sIlBhcmVudFN0eWxlIjpudWxsfSwiRGF0ZVN0eWxlIjp7IiRpZCI6IjQ2MCIsIkZvbnRTZXR0aW5ncyI6eyIkaWQiOiI0NjEiLCJGb250U2l6ZSI6MTAsIkZvbnROYW1lIjoiQ2FsaWJyaSIsIklzQm9sZCI6ZmFsc2UsIklzSXRhbGljIjpmYWxzZSwiSXNVbmRlcmxpbmVkIjpmYWxzZSwiUGFyZW50U3R5bGUiOm51bGx9LCJBdXRvU2l6ZSI6MCwiRm9yZWdyb3VuZCI6eyIkaWQiOiI0NjIiLCJDb2xvciI6eyIkaWQiOiI0NjMiLCJBIjoyNTUsIlIiOjY4LCJHIjo4NCwiQiI6MTA2fX0sIk1heFdpZHRoIjoyMDAuMCwiTWF4SGVpZ2h0IjoiSW5maW5pdHkiLCJTbWFydEZvcmVncm91bmRJc0FjdGl2ZSI6ZmFsc2UsIkhvcml6b250YWxBbGlnbm1lbnQiOjAsIlZlcnRpY2FsQWxpZ25tZW50IjowLCJTbWFydEZvcmVncm91bmQiOm51bGwsIkJhY2tncm91bmRGaWxsVHlwZSI6MCwiTWFyZ2luIjp7IiRyZWYiOiIxMjMifSwiUGFkZGluZyI6eyIkcmVmIjoiMTI0In0sIkJhY2tncm91bmQiOnsiJGlkIjoiNDY0IiwiQ29sb3IiOnsiJGlkIjoiNDY1IiwiQSI6MCwiUiI6MjU1LCJHIjoyNTUsIkIiOjI1NX19LCJJc1Zpc2libGUiOnRydWUsIldpZHRoIjowLjAsIkhlaWdodCI6MC4wLCJCb3JkZXJTdHlsZSI6eyIkaWQiOiI0NjYiLCJMaW5lQ29sb3IiOm51bGwsIkxpbmVXZWlnaHQiOjAuMCwiTGluZVR5cGUiOjAsIlBhcmVudFN0eWxlIjpudWxsfSwiUGFyZW50U3R5bGUiOm51bGx9LCJEYXRlRm9ybWF0Ijp7IiRyZWYiOiIyNzgifSwiV2Vla051bWJlcmluZyI6eyIkaWQiOiI0NjciLCJGb3JtYXQiOjAsIklzVmlzaWJsZSI6ZmFsc2UsIkxhc3RLbm93blZpc2liaWxpdHlTdGF0ZSI6ZmFsc2V9LCJJc1Zpc2libGUiOnRydWUsIlBhcmVudFN0eWxlIjpudWxsfSwiSW5kZXgiOjgsIlNtYXJ0RHVyYXRpb25BY3RpdmF0ZWQiOmZhbHNlLCJEYXRlRm9ybWF0Ijp7IiRyZWYiOiIyNzgifSwiV2Vla051bWJlcmluZyI6eyIkaWQiOiI0NjgiLCJGb3JtYXQiOjAsIklzVmlzaWJsZSI6ZmFsc2UsIkxhc3RLbm93blZpc2liaWxpdHlTdGF0ZSI6ZmFsc2V9LCJJZCI6ImNkNDRiM2RkLWViMWUtNDhmNy05MDJjLTA0Y2FjMzhkNmY0MyIsIkltcG9ydElkIjpudWxsLCJUaXRsZSI6IlRlc3RpbmciLCJOb3RlIjpudWxsLCJIeXBlcmxpbmsiOnsiJGlkIjoiNDY5IiwiQWRkcmVzcyI6bnVsbCwiU3ViQWRkcmVzcyI6bnVsbH0sIklzQ2hhbmdlZCI6ZmFsc2UsIklzTmV3IjpmYWxzZX0seyIkaWQiOiI0NzAiLCJHcm91cE5hbWUiOm51bGwsIlN0YXJ0RGF0ZSI6IjIwMjEtMDQtMDNUMDA6MDA6MDBaIiwiRW5kRGF0ZSI6IjIwMjEtMDQtMDNUMjM6NTk6MDBaIiwiUGVyY2VudGFnZUNvbXBsZXRlIjpudWxsLCJTdHlsZSI6eyIkaWQiOiI0NzEiLCJTaGFwZSI6MywiU2hhcGVUaGlja25lc3MiOjIsIkR1cmF0aW9uRm9ybWF0IjowLCJJbmNsdWRlTm9uV29ya2luZ0RheXNJbkR1cmF0aW9uIjpmYWxzZSwiUGVyY2VudGFnZUNvbXBsZXRlU3R5bGUiOnsiJGlkIjoiNDcyIiwiRm9udFNldHRpbmdzIjp7IiRpZCI6IjQ3MyIsIkZvbnRTaXplIjoxMCwiRm9udE5hbWUiOiJDYWxpYnJpIiwiSXNCb2xkIjpmYWxzZSwiSXNJdGFsaWMiOmZhbHNlLCJJc1VuZGVybGluZWQiOmZhbHNlLCJQYXJlbnRTdHlsZSI6bnVsbH0sIkF1dG9TaXplIjowLCJGb3JlZ3JvdW5kIjp7IiRyZWYiOiI4NiJ9LCJNYXhXaWR0aCI6MjAwLjAsIk1heEhlaWdodCI6IkluZmluaXR5IiwiU21hcnRGb3JlZ3JvdW5kSXNBY3RpdmUiOmZhbHNlLCJIb3Jpem9udGFsQWxpZ25tZW50IjowLCJWZXJ0aWNhbEFsaWdubWVudCI6MCwiU21hcnRGb3JlZ3JvdW5kIjpudWxsLCJCYWNrZ3JvdW5kRmlsbFR5cGUiOjAsIk1hcmdpbiI6eyIkcmVmIjoiODgifSwiUGFkZGluZyI6eyIkcmVmIjoiODkifSwiQmFja2dyb3VuZCI6eyIkcmVmIjoiOTAifSwiSXNWaXNpYmxlIjp0cnVlLCJXaWR0aCI6MC4wLCJIZWlnaHQiOjAuMCwiQm9yZGVyU3R5bGUiOnsiJGlkIjoiNDc0IiwiTGluZUNvbG9yIjpudWxsLCJMaW5lV2VpZ2h0IjowLjAsIkxpbmVUeXBlIjowLCJQYXJlbnRTdHlsZSI6bnVsbH0sIlBhcmVudFN0eWxlIjpudWxsfSwiRHVyYXRpb25TdHlsZSI6eyIkaWQiOiI0NzUiLCJGb250U2V0dGluZ3MiOnsiJGlkIjoiNDc2IiwiRm9udFNpemUiOjEwLCJGb250TmFtZSI6IkNhbGlicmkiLCJJc0JvbGQiOmZhbHNlLCJJc0l0YWxpYyI6ZmFsc2UsIklzVW5kZXJsaW5lZCI6ZmFsc2UsIlBhcmVudFN0eWxlIjpudWxsfSwiQXV0b1NpemUiOjAsIkZvcmVncm91bmQiOnsiJHJlZiI6IjkzIn0sIk1heFdpZHRoIjoyMDAuMCwiTWF4SGVpZ2h0IjoiSW5maW5pdHkiLCJTbWFydEZvcmVncm91bmRJc0FjdGl2ZSI6ZmFsc2UsIkhvcml6b250YWxBbGlnbm1lbnQiOjAsIlZlcnRpY2FsQWxpZ25tZW50IjowLCJTbWFydEZvcmVncm91bmQiOm51bGwsIkJhY2tncm91bmRGaWxsVHlwZSI6MCwiTWFyZ2luIjp7IiRyZWYiOiI5NSJ9LCJQYWRkaW5nIjp7IiRyZWYiOiI5NiJ9LCJCYWNrZ3JvdW5kIjp7IiRyZWYiOiI5NyJ9LCJJc1Zpc2libGUiOnRydWUsIldpZHRoIjowLjAsIkhlaWdodCI6MC4wLCJCb3JkZXJTdHlsZSI6eyIkaWQiOiI0NzciLCJMaW5lQ29sb3IiOm51bGwsIkxpbmVXZWlnaHQiOjAuMCwiTGluZVR5cGUiOjAsIlBhcmVudFN0eWxlIjpudWxsfSwiUGFyZW50U3R5bGUiOm51bGx9LCJIb3Jpem9udGFsQ29ubmVjdG9yU3R5bGUiOnsiJGlkIjoiNDc4IiwiTGluZUNvbG9yIjp7IiRyZWYiOiI5OSJ9LCJMaW5lV2VpZ2h0IjoxLjAsIkxpbmVUeXBlIjowLCJQYXJlbnRTdHlsZSI6bnVsbH0sIlZlcnRpY2FsQ29ubmVjdG9yU3R5bGUiOnsiJGlkIjoiNDc5IiwiTGluZUNvbG9yIjp7IiRyZWYiOiIxMDIifSwiTGluZVdlaWdodCI6MS4wLCJMaW5lVHlwZSI6MCwiUGFyZW50U3R5bGUiOm51bGx9LCJNYXJnaW4iOm51bGwsIlN0YXJ0RGF0ZVBvc2l0aW9uIjo0LCJFbmREYXRlUG9zaXRpb24iOjQsIkRhdGVJc1Zpc2libGUiOnRydWUsIlRpdGxlUG9zaXRpb24iOjIsIkR1cmF0aW9uUG9zaXRpb24iOjYsIlBlcmNlbnRhZ2VDb21wbGV0ZWRQb3NpdGlvbiI6NiwiU3BhY2luZyI6NSwiSXNCZWxvd1RpbWViYW5kIjpmYWxzZSwiUGVyY2VudGFnZUNvbXBsZXRlU2hhcGVPcGFjaXR5IjozNSwiU2hhcGVTdHlsZSI6eyIkaWQiOiI0ODAiLCJNYXJnaW4iOnsiJHJlZiI6IjEwNSJ9LCJQYWRkaW5nIjp7IiRyZWYiOiIxMDYifSwiQmFja2dyb3VuZCI6eyIkaWQiOiI0ODEiLCJDb2xvciI6eyIkaWQiOiI0ODIiLCJBIjoyNTUsIlIiOjkxLCJHIjoxNTUsIkIiOjIxM319LCJJc1Zpc2libGUiOnRydWUsIldpZHRoIjowLjAsIkhlaWdodCI6MjIuMCwiQm9yZGVyU3R5bGUiOnsiJGlkIjoiNDgzIiwiTGluZUNvbG9yIjp7IiRyZWYiOiIyNjIifSwiTGluZVdlaWdodCI6MC4wLCJMaW5lVHlwZSI6MCwiUGFyZW50U3R5bGUiOm51bGx9LCJQYXJlbnRTdHlsZSI6bnVsbH0sIlRpdGxlU3R5bGUiOnsiJGlkIjoiNDg0IiwiRm9udFNldHRpbmdzIjp7IiRpZCI6IjQ4NSIsIkZvbnRTaXplIjoxMSwiRm9udE5hbWUiOiJDYWxpYnJpIiwiSXNCb2xkIjp0cnVlLCJJc0l0YWxpYyI6ZmFsc2UsIklzVW5kZXJsaW5lZCI6ZmFsc2UsIlBhcmVudFN0eWxlIjpudWxsfSwiQXV0b1NpemUiOjAsIkZvcmVncm91bmQiOnsiJGlkIjoiNDg2IiwiQ29sb3IiOnsiJGlkIjoiNDg3IiwiQSI6MjU1LCJSIjowLCJHIjowLCJCIjowfX0sIk1heFdpZHRoIjo3MjAuMCwiTWF4SGVpZ2h0IjoiSW5maW5pdHkiLCJTbWFydEZvcmVncm91bmRJc0FjdGl2ZSI6ZmFsc2UsIkhvcml6b250YWxBbGlnbm1lbnQiOjEsIlZlcnRpY2FsQWxpZ25tZW50IjowLCJTbWFydEZvcmVncm91bmQiOm51bGwsIkJhY2tncm91bmRGaWxsVHlwZSI6MCwiTWFyZ2luIjp7IiRyZWYiOiIxMTYifSwiUGFkZGluZyI6eyIkcmVmIjoiMTE3In0sIkJhY2tncm91bmQiOnsiJGlkIjoiNDg4IiwiQ29sb3IiOnsiJGlkIjoiNDg5IiwiQSI6MCwiUiI6MjU1LCJHIjoyNTUsIkIiOjI1NX19LCJJc1Zpc2libGUiOnRydWUsIldpZHRoIjowLjAsIkhlaWdodCI6MC4wLCJCb3JkZXJTdHlsZSI6eyIkaWQiOiI0OTAiLCJMaW5lQ29sb3IiOm51bGwsIkxpbmVXZWlnaHQiOjAuMCwiTGluZVR5cGUiOjAsIlBhcmVudFN0eWxlIjpudWxsfSwiUGFyZW50U3R5bGUiOm51bGx9LCJEYXRlU3R5bGUiOnsiJGlkIjoiNDkxIiwiRm9udFNldHRpbmdzIjp7IiRpZCI6IjQ5MiIsIkZvbnRTaXplIjoxMCwiRm9udE5hbWUiOiJDYWxpYnJpIiwiSXNCb2xkIjpmYWxzZSwiSXNJdGFsaWMiOmZhbHNlLCJJc1VuZGVybGluZWQiOmZhbHNlLCJQYXJlbnRTdHlsZSI6bnVsbH0sIkF1dG9TaXplIjowLCJGb3JlZ3JvdW5kIjp7IiRpZCI6IjQ5MyIsIkNvbG9yIjp7IiRpZCI6IjQ5NCIsIkEiOjI1NSwiUiI6NjgsIkciOjg0LCJCIjoxMDZ9fSwiTWF4V2lkdGgiOjIwMC4wLCJNYXhIZWlnaHQiOiJJbmZpbml0eSIsIlNtYXJ0Rm9yZWdyb3VuZElzQWN0aXZlIjpmYWxzZSwiSG9yaXpvbnRhbEFsaWdubWVudCI6MCwiVmVydGljYWxBbGlnbm1lbnQiOjAsIlNtYXJ0Rm9yZWdyb3VuZCI6bnVsbCwiQmFja2dyb3VuZEZpbGxUeXBlIjowLCJNYXJnaW4iOnsiJHJlZiI6IjEyMyJ9LCJQYWRkaW5nIjp7IiRyZWYiOiIxMjQifSwiQmFja2dyb3VuZCI6eyIkaWQiOiI0OTUiLCJDb2xvciI6eyIkaWQiOiI0OTYiLCJBIjowLCJSIjoyNTUsIkciOjI1NSwiQiI6MjU1fX0sIklzVmlzaWJsZSI6dHJ1ZSwiV2lkdGgiOjAuMCwiSGVpZ2h0IjowLjAsIkJvcmRlclN0eWxlIjp7IiRpZCI6IjQ5NyIsIkxpbmVDb2xvciI6bnVsbCwiTGluZVdlaWdodCI6MC4wLCJMaW5lVHlwZSI6MCwiUGFyZW50U3R5bGUiOm51bGx9LCJQYXJlbnRTdHlsZSI6bnVsbH0sIkRhdGVGb3JtYXQiOnsiJHJlZiI6IjI3OCJ9LCJXZWVrTnVtYmVyaW5nIjp7IiRpZCI6IjQ5OCIsIkZvcm1hdCI6MCwiSXNWaXNpYmxlIjpmYWxzZSwiTGFzdEtub3duVmlzaWJpbGl0eVN0YXRlIjpmYWxzZX0sIklzVmlzaWJsZSI6dHJ1ZSwiUGFyZW50U3R5bGUiOm51bGx9LCJJbmRleCI6OSwiU21hcnREdXJhdGlvbkFjdGl2YXRlZCI6ZmFsc2UsIkRhdGVGb3JtYXQiOnsiJHJlZiI6IjI3OCJ9LCJXZWVrTnVtYmVyaW5nIjp7IiRpZCI6IjQ5OSIsIkZvcm1hdCI6MCwiSXNWaXNpYmxlIjpmYWxzZSwiTGFzdEtub3duVmlzaWJpbGl0eVN0YXRlIjpmYWxzZX0sIklkIjoiOTY4Y2M2ZWItMWQxNC00NzQ3LWFiM2QtNThjNWQ3YTA5YTA2IiwiSW1wb3J0SWQiOm51bGwsIlRpdGxlIjoiU3VibWlzc2lvbiIsIk5vdGUiOm51bGwsIkh5cGVybGluayI6eyIkaWQiOiI1MDAiLCJBZGRyZXNzIjpudWxsLCJTdWJBZGRyZXNzIjpudWxsfSwiSXNDaGFuZ2VkIjpmYWxzZSwiSXNOZXciOmZhbHNlfV0sIlN3aW1sYW5lcyI6W10sIk1zUHJvamVjdEl0ZW1zVHJlZSI6eyIkaWQiOiI1MDEiLCJSb290Ijp7IkltcG9ydElkIjpudWxsLCJJc0ltcG9ydGVkIjpmYWxzZSwiQ2hpbGRyZW4iOltdfX0sIk1ldGFkYXRhIjp7IiRpZCI6IjUwMiIsIlJlY2VudENvbG9yc0NvbGxlY3Rpb24iOiJbXSJ9LCJTZXR0aW5ncyI6eyIkaWQiOiI1MDMiLCJJbXBhT3B0aW9ucyI6eyIkaWQiOiI1MDQiLCJMZWZ0VG9SaWdodCI6ZmFsc2UsIlBheWxvYWRPcHRpb25zIjoyfSwiVXNlQ29tcHJlc3Npb24iOmZhbHNlLCJDb21wcmVzaW9uUGVyY2VudGFnZSI6NTAuMCwiSW5hY3RpdmVJbnRlcnZhbFdpZHRoVGhyZXNob2xkIjozMC4wLCJJbmFjdGl2ZUludGVydmFsV2lkdGgiOjEuMCwiU3BsaXRUYXNrcyI6ZmFsc2UsIlVzZUNsdXN0ZXIiOmZhbHNlLCJFcHNpbG9uIjo1LjAsIk1pblBvaW50c1RvRm9ybUFDbHVzdGVyIjoyLCJHZW5lcmF0ZUludmlzaWJsZVNoYXBlcyI6ZmFsc2UsIlNtYXJ0VGltZWxpbmVUYXNrUGVyY2VudGFnZUZpdCI6ZmFsc2V9LCJJc05ldyI6ZmFsc2UsIkltcG9ydFR5cGUiOjAsIkZpbGVQYXRoIjpudWxsLCJUaW1lQ29uZmlndXJhdGlvbiI6eyIkaWQiOiI1MDUiLCJVc2VUaW1lIjpmYWxzZSwiV29ya0RheVN0YXJ0IjoiMDA6MDA6MDAiLCJXb3JrRGF5RW5kIjoiMjM6NTk6MDAifSwiTGFzdFVzZWRUZW1wbGF0ZUlkIjoiOTVmYmYwZjctY2E2Yy00YmI5LWFlNzgtMWFhZjJjYTk2MGViIiwiRmlyc3RXZWVrT2ZZZWFyIjowfQ=="/>
+  <p:tag name="__PART_0" val="eyIkaWQiOiIxIiwiQ3VsdHVyZUluZm9OYW1lIjoiZW4tVVMiLCJTdHlsZU5hbWUiOm51bGwsIlZlcnNpb24iOnsiJGlkIjoiMiIsIlZlcnNpb24iOiIzLjMuMiIsIk9yaWdpbmFsQXNzZW1ibHlWZXJzaW9uIjoiNS4wMS4wMC4wMCIsIkVkaXRpb24iOiJGcmVlIiwiSXNQbHVzRWRpdGlvbiI6ZmFsc2UsIklzUHJvRWRpdGlvbiI6ZmFsc2V9LCJFZmZlY3QiOjEsIlN0eWxlIjp7IiRpZCI6IjMiLCJUaW1lYmFuZFN0eWxlIjp7IiRpZCI6IjQiLCJTY2FsZU1hcmtpbmciOjAsIlNoYXBlIjozLCJTaGFwZVN0eWxlIjp7IiRpZCI6IjUiLCJNYXJnaW4iOnsiJGlkIjoiNiIsIlRvcCI6MCwiTGVmdCI6MTAsIlJpZ2h0IjoxMCwiQm90dG9tIjowfSwiUGFkZGluZyI6eyIkaWQiOiI3IiwiVG9wIjozLCJMZWZ0IjowLCJSaWdodCI6MCwiQm90dG9tIjozfSwiQmFja2dyb3VuZCI6eyIkaWQiOiI4IiwiQ29sb3IiOnsiJGlkIjoiOSIsIkEiOjI1NSwiUiI6MTc4LCJHIjoxNzgsIkIiOjE3OH19LCJJc1Zpc2libGUiOnRydWUsIldpZHRoIjowLjAsIkhlaWdodCI6MzAuMCwiQm9yZGVyU3R5bGUiOnsiJGlkIjoiMTAiLCJMaW5lQ29sb3IiOnsiJGlkIjoiMTEiLCIkdHlwZSI6Ik5MUkUuQ29tbW9uLkRvbS5Tb2xpZENvbG9yQnJ1c2gsIE5MUkUuQ29tbW9uIiwiQ29sb3IiOnsiJGlkIjoiMTIiLCJBIjoyNTUsIlIiOjI1NSwiRyI6MCwiQiI6MH19LCJMaW5lV2VpZ2h0IjowLjAsIkxpbmVUeXBlIjowLCJQYXJlbnRTdHlsZSI6bnVsbH0sIlBhcmVudFN0eWxlIjpudWxsfSwiUmlnaHRFbmRDYXBzU3R5bGUiOnsiJGlkIjoiMTMiLCJGb250U2V0dGluZ3MiOnsiJGlkIjoiMTQiLCJGb250U2l6ZSI6MTgsIkZvbnROYW1lIjoiQ2FsaWJyaSIsIklzQm9sZCI6dHJ1ZSwiSXNJdGFsaWMiOmZhbHNlLCJJc1VuZGVybGluZWQiOmZhbHNlLCJQYXJlbnRTdHlsZSI6bnVsbH0sIkF1dG9TaXplIjowLCJGb3JlZ3JvdW5kIjp7IiRpZCI6IjE1IiwiQ29sb3IiOnsiJGlkIjoiMTYiLCJBIjoyNTUsIlIiOjIzNywiRyI6MTI1LCJCIjo0OX19LCJNYXhXaWR0aCI6IkluZmluaXR5IiwiTWF4SGVpZ2h0IjoiSW5maW5pdHkiLCJTbWFydEZvcmVncm91bmRJc0FjdGl2ZSI6ZmFsc2UsIkhvcml6b250YWxBbGlnbm1lbnQiOjAsIlZlcnRpY2FsQWxpZ25tZW50IjowLCJTbWFydEZvcmVncm91bmQiOm51bGwsIkJhY2tncm91bmRGaWxsVHlwZSI6MCwiTWFyZ2luIjp7IiRpZCI6IjE3IiwiVG9wIjowLCJMZWZ0IjowLCJSaWdodCI6MjAsIkJvdHRvbSI6MH0sIlBhZGRpbmciOnsiJGlkIjoiMTgiLCJUb3AiOjAsIkxlZnQiOjAsIlJpZ2h0IjowLCJCb3R0b20iOjB9LCJCYWNrZ3JvdW5kIjp7IiRpZCI6IjE5IiwiQ29sb3IiOnsiJGlkIjoiMjAiLCJBIjo4OSwiUiI6MCwiRyI6MCwiQiI6MH19LCJJc1Zpc2libGUiOnRydWUsIldpZHRoIjowLjAsIkhlaWdodCI6MC4wLCJCb3JkZXJTdHlsZSI6bnVsbCwiUGFyZW50U3R5bGUiOm51bGx9LCJMZWZ0RW5kQ2Fwc1N0eWxlIjp7IiRpZCI6IjIxIiwiRm9udFNldHRpbmdzIjp7IiRpZCI6IjIyIiwiRm9udFNpemUiOjE4LCJGb250TmFtZSI6IkNhbGlicmkiLCJJc0JvbGQiOnRydWUsIklzSXRhbGljIjpmYWxzZSwiSXNVbmRlcmxpbmVkIjpmYWxzZSwiUGFyZW50U3R5bGUiOm51bGx9LCJBdXRvU2l6ZSI6MCwiRm9yZWdyb3VuZCI6eyIkaWQiOiIyMyIsIkNvbG9yIjp7IiRpZCI6IjI0IiwiQSI6MjU1LCJSIjoyMzcsIkciOjEyNSwiQiI6NDl9fSwiTWF4V2lkdGgiOiJJbmZpbml0eSIsIk1heEhlaWdodCI6IkluZmluaXR5IiwiU21hcnRGb3JlZ3JvdW5kSXNBY3RpdmUiOmZhbHNlLCJIb3Jpem9udGFsQWxpZ25tZW50IjowLCJWZXJ0aWNhbEFsaWdubWVudCI6MCwiU21hcnRGb3JlZ3JvdW5kIjpudWxsLCJCYWNrZ3JvdW5kRmlsbFR5cGUiOjAsIk1hcmdpbiI6eyIkaWQiOiIyNSIsIlRvcCI6MCwiTGVmdCI6MjAsIlJpZ2h0IjowLCJCb3R0b20iOjB9LCJQYWRkaW5nIjp7IiRpZCI6IjI2IiwiVG9wIjowLCJMZWZ0IjowLCJSaWdodCI6MCwiQm90dG9tIjowfSwiQmFja2dyb3VuZCI6eyIkaWQiOiIyNyIsIkNvbG9yIjp7IiRyZWYiOiIyMCJ9fSwiSXNWaXNpYmxlIjpmYWxzZSwiV2lkdGgiOjAuMCwiSGVpZ2h0IjowLjAsIkJvcmRlclN0eWxlIjpudWxsLCJQYXJlbnRTdHlsZSI6bnVsbH0sIlRvZGF5VGV4dFN0eWxlIjp7IiRpZCI6IjI4IiwiRm9udFNldHRpbmdzIjp7IiRpZCI6IjI5IiwiRm9udFNpemUiOjEyLCJGb250TmFtZSI6IkNhbGlicmkiLCJJc0JvbGQiOmZhbHNlLCJJc0l0YWxpYyI6ZmFsc2UsIklzVW5kZXJsaW5lZCI6ZmFsc2UsIlBhcmVudFN0eWxlIjpudWxsfSwiQXV0b1NpemUiOjAsIkZvcmVncm91bmQiOnsiJGlkIjoiMzAiLCJDb2xvciI6eyIkaWQiOiIzMSIsIkEiOjI1NSwiUiI6MCwiRyI6MCwiQiI6MH19LCJNYXhXaWR0aCI6MjAwLjAsIk1heEhlaWdodCI6IkluZmluaXR5IiwiU21hcnRGb3JlZ3JvdW5kSXNBY3RpdmUiOmZhbHNlLCJIb3Jpem9udGFsQWxpZ25tZW50IjowLCJWZXJ0aWNhbEFsaWdubWVudCI6MCwiU21hcnRGb3JlZ3JvdW5kIjpudWxsLCJCYWNrZ3JvdW5kRmlsbFR5cGUiOjAsIk1hcmdpbiI6eyIkaWQiOiIzMiIsIlRvcCI6MCwiTGVmdCI6MCwiUmlnaHQiOjAsIkJvdHRvbSI6MH0sIlBhZGRpbmciOnsiJGlkIjoiMzMiLCJUb3AiOjAsIkxlZnQiOjAsIlJpZ2h0IjowLCJCb3R0b20iOjB9LCJCYWNrZ3JvdW5kIjp7IiRpZCI6IjM0IiwiQ29sb3IiOnsiJHJlZiI6IjIwIn19LCJJc1Zpc2libGUiOnRydWUsIldpZHRoIjowLjAsIkhlaWdodCI6MC4wLCJCb3JkZXJTdHlsZSI6bnVsbCwiUGFyZW50U3R5bGUiOm51bGx9LCJUb2RheU1hcmtlclN0eWxlIjp7IiRpZCI6IjM1IiwiTWFyZ2luIjp7IiRpZCI6IjM2IiwiVG9wIjowLCJMZWZ0IjowLCJSaWdodCI6MCwiQm90dG9tIjowfSwiUGFkZGluZyI6eyIkaWQiOiIzNyIsIlRvcCI6MCwiTGVmdCI6MCwiUmlnaHQiOjAsIkJvdHRvbSI6MH0sIkJhY2tncm91bmQiOnsiJGlkIjoiMzgiLCJDb2xvciI6eyIkaWQiOiIzOSIsIkEiOjI1NSwiUiI6MjU1LCJHIjowLCJCIjowfX0sIklzVmlzaWJsZSI6dHJ1ZSwiV2lkdGgiOjAuMCwiSGVpZ2h0IjowLjAsIkJvcmRlclN0eWxlIjpudWxsLCJQYXJlbnRTdHlsZSI6bnVsbH0sIlNjYWxlU3R5bGUiOnsiJGlkIjoiNDAiLCJTaG93U2VnbWVudFNlcGFyYXRvcnMiOmZhbHNlLCJTZWdtZW50U2VwYXJhdG9yT3BhY2l0eSI6MzAsIkZvbnRTZXR0aW5ncyI6eyIkaWQiOiI0MSIsIkZvbnRTaXplIjoxMiwiRm9udE5hbWUiOiJDYWxpYnJpIiwiSXNCb2xkIjpmYWxzZSwiSXNJdGFsaWMiOmZhbHNlLCJJc1VuZGVybGluZWQiOmZhbHNlLCJQYXJlbnRTdHlsZSI6bnVsbH0sIkF1dG9TaXplIjowLCJGb3JlZ3JvdW5kIjp7IiRpZCI6IjQyIiwiQ29sb3IiOnsiJGlkIjoiNDMiLCJBIjoyNTUsIlIiOjAsIkciOjAsIkIiOjB9fSwiTWF4V2lkdGgiOjIwMC4wLCJNYXhIZWlnaHQiOiJJbmZpbml0eSIsIlNtYXJ0Rm9yZWdyb3VuZElzQWN0aXZlIjpmYWxzZSwiSG9yaXpvbnRhbEFsaWdubWVudCI6MCwiVmVydGljYWxBbGlnbm1lbnQiOjEsIlNtYXJ0Rm9yZWdyb3VuZCI6bnVsbCwiQmFja2dyb3VuZEZpbGxUeXBlIjowLCJNYXJnaW4iOnsiJGlkIjoiNDQiLCJUb3AiOjAsIkxlZnQiOjUsIlJpZ2h0IjowLCJCb3R0b20iOjB9LCJQYWRkaW5nIjp7IiRpZCI6IjQ1IiwiVG9wIjowLCJMZWZ0IjowLCJSaWdodCI6MCwiQm90dG9tIjowfSwiQmFja2dyb3VuZCI6eyIkaWQiOiI0NiIsIkNvbG9yIjp7IiRyZWYiOiIyMCJ9fSwiSXNWaXNpYmxlIjp0cnVlLCJXaWR0aCI6MC4wLCJIZWlnaHQiOjAuMCwiQm9yZGVyU3R5bGUiOm51bGwsIlBhcmVudFN0eWxlIjpudWxsfSwiRWxhcHNlZFRpbWVCYWNrZ3JvdW5kIjp7IiRpZCI6IjQ3IiwiQ29sb3IiOnsiJGlkIjoiNDgiLCJBIjo3NywiUiI6MjU1LCJHIjoxOTIsIkIiOjB9fSwiQXBwZW5kWWVhck9uWWVhckNoYW5nZSI6dHJ1ZSwiRWxhcHNlZFRpbWVGb3JtYXQiOjEsIlRvZGF5TWFya2VyUG9zaXRpb24iOjMsIlF1aWNrUG9zaXRpb24iOjIsIkFic29sdXRlUG9zaXRpb24iOjQwNS4wLCJNYXJnaW4iOnsiJGlkIjoiNDkiLCJUb3AiOjAsIkxlZnQiOjEwLCJSaWdodCI6MTAsIkJvdHRvbSI6MH0sIlBhZGRpbmciOnsiJGlkIjoiNTAiLCJUb3AiOjAsIkxlZnQiOjAsIlJpZ2h0IjowLCJCb3R0b20iOjB9LCJCYWNrZ3JvdW5kIjp7IiRpZCI6IjUxIiwiQ29sb3IiOnsiJGlkIjoiNTIiLCJBIjoyNTUsIlIiOjE3OCwiRyI6MTc4LCJCIjoxNzh9fSwiSXNWaXNpYmxlIjp0cnVlLCJXaWR0aCI6MC4wLCJIZWlnaHQiOjAuMCwiQm9yZGVyU3R5bGUiOm51bGwsIlBhcmVudFN0eWxlIjpudWxsfSwiRGVmYXVsdE1pbGVzdG9uZVN0eWxlIjp7IiRpZCI6IjUzIiwiU2hhcGUiOjcsIkNvbm5lY3Rvck1hcmdpbiI6eyIkaWQiOiI1NCIsIlRvcCI6MCwiTGVmdCI6MiwiUmlnaHQiOjIsIkJvdHRvbSI6MH0sIkNvbm5lY3RvclN0eWxlIjp7IiRpZCI6IjU1IiwiTGluZUNvbG9yIjp7IiRpZCI6IjU2IiwiJHR5cGUiOiJOTFJFLkNvbW1vbi5Eb20uU29saWRDb2xvckJydXNoLCBOTFJFLkNvbW1vbiIsIkNvbG9yIjp7IiRpZCI6IjU3IiwiQSI6MTI3LCJSIjozMSwiRyI6NzMsIkIiOjEyNn19LCJMaW5lV2VpZ2h0IjoxLjAsIkxpbmVUeXBlIjowLCJQYXJlbnRTdHlsZSI6bnVsbH0sIklzQmVsb3dUaW1lYmFuZCI6ZmFsc2UsIlBvc2l0aW9uT25UYXNrIjowLCJIaWRlRGF0ZSI6ZmFsc2UsIlNoYXBlU2l6ZSI6MSwiU3BhY2luZyI6Mi4wLCJQYWRkaW5nIjp7IiRpZCI6IjU4IiwiVG9wIjo3LCJMZWZ0IjozLCJSaWdodCI6MCwiQm90dG9tIjoyfSwiU2hhcGVTdHlsZSI6eyIkaWQiOiI1OSIsIk1hcmdpbiI6eyIkaWQiOiI2MCIsIlRvcCI6MCwiTGVmdCI6MCwiUmlnaHQiOjAsIkJvdHRvbSI6MH0sIlBhZGRpbmciOnsiJGlkIjoiNjEiLCJUb3AiOjAsIkxlZnQiOjAsIlJpZ2h0IjowLCJCb3R0b20iOjB9LCJCYWNrZ3JvdW5kIjp7IiRpZCI6IjYyIiwiQ29sb3IiOnsiJGlkIjoiNjMiLCJBIjoyNTUsIlIiOjAsIkciOjExNCwiQiI6MTg4fX0sIklzVmlzaWJsZSI6dHJ1ZSwiV2lkdGgiOjE4LjAsIkhlaWdodCI6MjAuMCwiQm9yZGVyU3R5bGUiOnsiJGlkIjoiNjQiLCJMaW5lQ29sb3IiOnsiJGlkIjoiNjUiLCIkdHlwZSI6Ik5MUkUuQ29tbW9uLkRvbS5Tb2xpZENvbG9yQnJ1c2gsIE5MUkUuQ29tbW9uIiwiQ29sb3IiOnsiJGlkIjoiNjYiLCJBIjoyNTUsIlIiOjI1NSwiRyI6MCwiQiI6MH19LCJMaW5lV2VpZ2h0IjowLjAsIkxpbmVUeXBlIjowLCJQYXJlbnRTdHlsZSI6bnVsbH0sIlBhcmVudFN0eWxlIjpudWxsfSwiVGl0bGVTdHlsZSI6eyIkaWQiOiI2NyIsIkZvbnRTZXR0aW5ncyI6eyIkaWQiOiI2OCIsIkZvbnRTaXplIjoxMSwiRm9udE5hbWUiOiJDYWxpYnJpIiwiSXNCb2xkIjp0cnVlLCJJc0l0YWxpYyI6ZmFsc2UsIklzVW5kZXJsaW5lZCI6ZmFsc2UsIlBhcmVudFN0eWxlIjpudWxsfSwiQXV0b1NpemUiOjAsIkZvcmVncm91bmQiOnsiJGlkIjoiNjkiLCJDb2xvciI6eyIkaWQiOiI3MCIsIkEiOjI1NSwiUiI6MCwiRyI6MCwiQiI6MH19LCJNYXhXaWR0aCI6MjAwLjAsIk1heEhlaWdodCI6IkluZmluaXR5IiwiU21hcnRGb3JlZ3JvdW5kSXNBY3RpdmUiOmZhbHNlLCJIb3Jpem9udGFsQWxpZ25tZW50IjoxLCJWZXJ0aWNhbEFsaWdubWVudCI6MCwiU21hcnRGb3JlZ3JvdW5kIjpudWxsLCJCYWNrZ3JvdW5kRmlsbFR5cGUiOjAsIk1hcmdpbiI6eyIkaWQiOiI3MSIsIlRvcCI6MCwiTGVmdCI6MCwiUmlnaHQiOjAsIkJvdHRvbSI6MH0sIlBhZGRpbmciOnsiJGlkIjoiNzIiLCJUb3AiOjAsIkxlZnQiOjAsIlJpZ2h0IjowLCJCb3R0b20iOjB9LCJCYWNrZ3JvdW5kIjp7IiRpZCI6IjczIiwiQ29sb3IiOnsiJHJlZiI6IjIwIn19LCJJc1Zpc2libGUiOnRydWUsIldpZHRoIjowLjAsIkhlaWdodCI6MC4wLCJCb3JkZXJTdHlsZSI6bnVsbCwiUGFyZW50U3R5bGUiOm51bGx9LCJEYXRlU3R5bGUiOnsiJGlkIjoiNzQiLCJGb250U2V0dGluZ3MiOnsiJGlkIjoiNzUiLCJGb250U2l6ZSI6MTAsIkZvbnROYW1lIjoiQ2FsaWJyaSIsIklzQm9sZCI6ZmFsc2UsIklzSXRhbGljIjpmYWxzZSwiSXNVbmRlcmxpbmVkIjpmYWxzZSwiUGFyZW50U3R5bGUiOm51bGx9LCJBdXRvU2l6ZSI6MCwiRm9yZWdyb3VuZCI6eyIkaWQiOiI3NiIsIkNvbG9yIjp7IiRpZCI6Ijc3IiwiQSI6MjU1LCJSIjo2OCwiRyI6ODQsIkIiOjEwNn19LCJNYXhXaWR0aCI6MjAwLjAsIk1heEhlaWdodCI6IkluZmluaXR5IiwiU21hcnRGb3JlZ3JvdW5kSXNBY3RpdmUiOmZhbHNlLCJIb3Jpem9udGFsQWxpZ25tZW50IjowLCJWZXJ0aWNhbEFsaWdubWVudCI6MCwiU21hcnRGb3JlZ3JvdW5kIjpudWxsLCJCYWNrZ3JvdW5kRmlsbFR5cGUiOjAsIk1hcmdpbiI6eyIkaWQiOiI3OCIsIlRvcCI6MCwiTGVmdCI6MCwiUmlnaHQiOjAsIkJvdHRvbSI6MH0sIlBhZGRpbmciOnsiJGlkIjoiNzkiLCJUb3AiOjAsIkxlZnQiOjAsIlJpZ2h0IjowLCJCb3R0b20iOjB9LCJCYWNrZ3JvdW5kIjp7IiRpZCI6IjgwIiwiQ29sb3IiOnsiJHJlZiI6IjIwIn19LCJJc1Zpc2libGUiOnRydWUsIldpZHRoIjowLjAsIkhlaWdodCI6MC4wLCJCb3JkZXJTdHlsZSI6bnVsbCwiUGFyZW50U3R5bGUiOm51bGx9LCJEYXRlRm9ybWF0Ijp7IiRpZCI6IjgxIiwiRm9ybWF0U3RyaW5nIjoiTU1NIGQiLCJTZXBhcmF0b3IiOiIvIiwiVXNlSW50ZXJuYXRpb25hbERhdGVGb3JtYXQiOmZhbHNlLCJEYXRlSXNWaXNpYmxlIjp0cnVlLCJUaW1lSXNWaXNpYmxlIjpmYWxzZSwiSG91ckRpZ2l0cyI6MSwiQW1QbURlc2lnbmF0b3IiOjIsIlRyaW0wME1pbnV0ZXMiOmZhbHNlLCJMYXN0S25vd25WaXNpYmlsaXR5U3RhdGUiOm51bGx9LCJXZWVrTnVtYmVyaW5nIjp7IiRpZCI6IjgyIiwiRm9ybWF0IjowLCJJc1Zpc2libGUiOmZhbHNlLCJMYXN0S25vd25WaXNpYmlsaXR5U3RhdGUiOmZhbHNlfSwiSXNWaXNpYmxlIjp0cnVlLCJQYXJlbnRTdHlsZSI6bnVsbH0sIkRlZmF1bHRUYXNrU3R5bGUiOnsiJGlkIjoiODMiLCJTaGFwZSI6MCwiU2hhcGVUaGlja25lc3MiOjIsIkR1cmF0aW9uRm9ybWF0IjowLCJJbmNsdWRlTm9uV29ya2luZ0RheXNJbkR1cmF0aW9uIjpmYWxzZSwiUGVyY2VudGFnZUNvbXBsZXRlU3R5bGUiOnsiJGlkIjoiODQiLCJGb250U2V0dGluZ3MiOnsiJGlkIjoiODUiLCJGb250U2l6ZSI6MTAsIkZvbnROYW1lIjoiQ2FsaWJyaSIsIklzQm9sZCI6ZmFsc2UsIklzSXRhbGljIjpmYWxzZSwiSXNVbmRlcmxpbmVkIjpmYWxzZSwiUGFyZW50U3R5bGUiOm51bGx9LCJBdXRvU2l6ZSI6MCwiRm9yZWdyb3VuZCI6eyIkaWQiOiI4NiIsIkNvbG9yIjp7IiRpZCI6Ijg3IiwiQSI6MjU1LCJSIjoyMzcsIkciOjEyNSwiQiI6NDl9fSwiTWF4V2lkdGgiOjIwMC4wLCJNYXhIZWlnaHQiOiJJbmZpbml0eSIsIlNtYXJ0Rm9yZWdyb3VuZElzQWN0aXZlIjpmYWxzZSwiSG9yaXpvbnRhbEFsaWdubWVudCI6MCwiVmVydGljYWxBbGlnbm1lbnQiOjAsIlNtYXJ0Rm9yZWdyb3VuZCI6bnVsbCwiQmFja2dyb3VuZEZpbGxUeXBlIjowLCJNYXJnaW4iOnsiJGlkIjoiODgiLCJUb3AiOjAsIkxlZnQiOjAsIlJpZ2h0IjowLCJCb3R0b20iOjB9LCJQYWRkaW5nIjp7IiRpZCI6Ijg5IiwiVG9wIjowLCJMZWZ0IjowLCJSaWdodCI6MCwiQm90dG9tIjowfSwiQmFja2dyb3VuZCI6eyIkaWQiOiI5MCIsIkNvbG9yIjp7IiRyZWYiOiIyMCJ9fSwiSXNWaXNpYmxlIjp0cnVlLCJXaWR0aCI6MC4wLCJIZWlnaHQiOjAuMCwiQm9yZGVyU3R5bGUiOm51bGwsIlBhcmVudFN0eWxlIjpudWxsfSwiRHVyYXRpb25TdHlsZSI6eyIkaWQiOiI5MSIsIkZvbnRTZXR0aW5ncyI6eyIkaWQiOiI5MiIsIkZvbnRTaXplIjoxMCwiRm9udE5hbWUiOiJDYWxpYnJpIiwiSXNCb2xkIjpmYWxzZSwiSXNJdGFsaWMiOmZhbHNlLCJJc1VuZGVybGluZWQiOmZhbHNlLCJQYXJlbnRTdHlsZSI6bnVsbH0sIkF1dG9TaXplIjowLCJGb3JlZ3JvdW5kIjp7IiRpZCI6IjkzIiwiQ29sb3IiOnsiJGlkIjoiOTQiLCJBIjoyNTUsIlIiOjIzNywiRyI6MTI1LCJCIjo0OX19LCJNYXhXaWR0aCI6MjAwLjAsIk1heEhlaWdodCI6IkluZmluaXR5IiwiU21hcnRGb3JlZ3JvdW5kSXNBY3RpdmUiOmZhbHNlLCJIb3Jpem9udGFsQWxpZ25tZW50IjowLCJWZXJ0aWNhbEFsaWdubWVudCI6MCwiU21hcnRGb3JlZ3JvdW5kIjpudWxsLCJCYWNrZ3JvdW5kRmlsbFR5cGUiOjAsIk1hcmdpbiI6eyIkaWQiOiI5NSIsIlRvcCI6MCwiTGVmdCI6MCwiUmlnaHQiOjAsIkJvdHRvbSI6MH0sIlBhZGRpbmciOnsiJGlkIjoiOTYiLCJUb3AiOjAsIkxlZnQiOjAsIlJpZ2h0IjowLCJCb3R0b20iOjB9LCJCYWNrZ3JvdW5kIjp7IiRpZCI6Ijk3IiwiQ29sb3IiOnsiJHJlZiI6IjIwIn19LCJJc1Zpc2libGUiOnRydWUsIldpZHRoIjowLjAsIkhlaWdodCI6MC4wLCJCb3JkZXJTdHlsZSI6bnVsbCwiUGFyZW50U3R5bGUiOm51bGx9LCJIb3Jpem9udGFsQ29ubmVjdG9yU3R5bGUiOnsiJGlkIjoiOTgiLCJMaW5lQ29sb3IiOnsiJGlkIjoiOTkiLCIkdHlwZSI6Ik5MUkUuQ29tbW9uLkRvbS5Tb2xpZENvbG9yQnJ1c2gsIE5MUkUuQ29tbW9uIiwiQ29sb3IiOnsiJGlkIjoiMTAwIiwiQSI6MjU1LCJSIjoyMDQsIkciOjIwNCwiQiI6MjA0fX0sIkxpbmVXZWlnaHQiOjEuMCwiTGluZVR5cGUiOjAsIlBhcmVudFN0eWxlIjpudWxsfSwiVmVydGljYWxDb25uZWN0b3JTdHlsZSI6eyIkaWQiOiIxMDEiLCJMaW5lQ29sb3IiOnsiJGlkIjoiMTAyIiwiJHR5cGUiOiJOTFJFLkNvbW1vbi5Eb20uU29saWRDb2xvckJydXNoLCBOTFJFLkNvbW1vbiIsIkNvbG9yIjp7IiRpZCI6IjEwMyIsIkEiOjI1NSwiUiI6MjA0LCJHIjoyMDQsIkIiOjIwNH19LCJMaW5lV2VpZ2h0IjoxLjAsIkxpbmVUeXBlIjowLCJQYXJlbnRTdHlsZSI6bnVsbH0sIk1hcmdpbiI6bnVsbCwiU3RhcnREYXRlUG9zaXRpb24iOjQsIkVuZERhdGVQb3NpdGlvbiI6NCwiRGF0ZUlzVmlzaWJsZSI6dHJ1ZSwiVGl0bGVQb3NpdGlvbiI6MiwiRHVyYXRpb25Qb3NpdGlvbiI6NiwiUGVyY2VudGFnZUNvbXBsZXRlZFBvc2l0aW9uIjo2LCJTcGFjaW5nIjo1LCJJc0JlbG93VGltZWJhbmQiOmZhbHNlLCJQZXJjZW50YWdlQ29tcGxldGVTaGFwZU9wYWNpdHkiOjM1LCJTaGFwZVN0eWxlIjp7IiRpZCI6IjEwNCIsIk1hcmdpbiI6eyIkaWQiOiIxMDUiLCJUb3AiOjAsIkxlZnQiOjQsIlJpZ2h0Ijo0LCJCb3R0b20iOjB9LCJQYWRkaW5nIjp7IiRpZCI6IjEwNiIsIlRvcCI6MCwiTGVmdCI6MCwiUmlnaHQiOjAsIkJvdHRvbSI6MH0sIkJhY2tncm91bmQiOnsiJGlkIjoiMTA3IiwiQ29sb3IiOnsiJGlkIjoiMTA4IiwiQSI6MjU1LCJSIjowLCJHIjoxMTQsIkIiOjE4OH19LCJJc1Zpc2libGUiOnRydWUsIldpZHRoIjowLjAsIkhlaWdodCI6MjIuMCwiQm9yZGVyU3R5bGUiOnsiJGlkIjoiMTA5IiwiTGluZUNvbG9yIjp7IiRpZCI6IjExMCIsIiR0eXBlIjoiTkxSRS5Db21tb24uRG9tLlNvbGlkQ29sb3JCcnVzaCwgTkxSRS5Db21tb24iLCJDb2xvciI6eyIkaWQiOiIxMTEiLCJBIjoyNTUsIlIiOjI1NSwiRyI6MCwiQiI6MH19LCJMaW5lV2VpZ2h0IjowLjAsIkxpbmVUeXBlIjowLCJQYXJlbnRTdHlsZSI6bnVsbH0sIlBhcmVudFN0eWxlIjpudWxsfSwiVGl0bGVTdHlsZSI6eyIkaWQiOiIxMTIiLCJGb250U2V0dGluZ3MiOnsiJGlkIjoiMTEzIiwiRm9udFNpemUiOjExLCJGb250TmFtZSI6IkNhbGlicmkiLCJJc0JvbGQiOnRydWUsIklzSXRhbGljIjpmYWxzZSwiSXNVbmRlcmxpbmVkIjpmYWxzZSwiUGFyZW50U3R5bGUiOm51bGx9LCJBdXRvU2l6ZSI6MCwiRm9yZWdyb3VuZCI6eyIkaWQiOiIxMTQiLCJDb2xvciI6eyIkaWQiOiIxMTUiLCJBIjoyNTUsIlIiOjAsIkciOjAsIkIiOjB9fSwiTWF4V2lkdGgiOjk2MC4wLCJNYXhIZWlnaHQiOiJJbmZpbml0eSIsIlNtYXJ0Rm9yZWdyb3VuZElzQWN0aXZlIjpmYWxzZSwiSG9yaXpvbnRhbEFsaWdubWVudCI6MSwiVmVydGljYWxBbGlnbm1lbnQiOjAsIlNtYXJ0Rm9yZWdyb3VuZCI6bnVsbCwiQmFja2dyb3VuZEZpbGxUeXBlIjowLCJNYXJnaW4iOnsiJGlkIjoiMTE2IiwiVG9wIjowLCJMZWZ0IjowLCJSaWdodCI6MCwiQm90dG9tIjowfSwiUGFkZGluZyI6eyIkaWQiOiIxMTciLCJUb3AiOjAsIkxlZnQiOjAsIlJpZ2h0IjowLCJCb3R0b20iOjB9LCJCYWNrZ3JvdW5kIjp7IiRpZCI6IjExOCIsIkNvbG9yIjp7IiRyZWYiOiIyMCJ9fSwiSXNWaXNpYmxlIjp0cnVlLCJXaWR0aCI6MC4wLCJIZWlnaHQiOjAuMCwiQm9yZGVyU3R5bGUiOm51bGwsIlBhcmVudFN0eWxlIjpudWxsfSwiRGF0ZVN0eWxlIjp7IiRpZCI6IjExOSIsIkZvbnRTZXR0aW5ncyI6eyIkaWQiOiIxMjAiLCJGb250U2l6ZSI6MTAsIkZvbnROYW1lIjoiQ2FsaWJyaSIsIklzQm9sZCI6ZmFsc2UsIklzSXRhbGljIjpmYWxzZSwiSXNVbmRlcmxpbmVkIjpmYWxzZSwiUGFyZW50U3R5bGUiOm51bGx9LCJBdXRvU2l6ZSI6MCwiRm9yZWdyb3VuZCI6eyIkaWQiOiIxMjEiLCJDb2xvciI6eyIkaWQiOiIxMjIiLCJBIjoyNTUsIlIiOjY4LCJHIjo4NCwiQiI6MTA2fX0sIk1heFdpZHRoIjoyMDAuMCwiTWF4SGVpZ2h0IjoiSW5maW5pdHkiLCJTbWFydEZvcmVncm91bmRJc0FjdGl2ZSI6ZmFsc2UsIkhvcml6b250YWxBbGlnbm1lbnQiOjAsIlZlcnRpY2FsQWxpZ25tZW50IjowLCJTbWFydEZvcmVncm91bmQiOm51bGwsIkJhY2tncm91bmRGaWxsVHlwZSI6MCwiTWFyZ2luIjp7IiRpZCI6IjEyMyIsIlRvcCI6MCwiTGVmdCI6MCwiUmlnaHQiOjAsIkJvdHRvbSI6MH0sIlBhZGRpbmciOnsiJGlkIjoiMTI0IiwiVG9wIjowLCJMZWZ0IjowLCJSaWdodCI6MCwiQm90dG9tIjowfSwiQmFja2dyb3VuZCI6eyIkaWQiOiIxMjUiLCJDb2xvciI6eyIkcmVmIjoiMjAifX0sIklzVmlzaWJsZSI6dHJ1ZSwiV2lkdGgiOjAuMCwiSGVpZ2h0IjowLjAsIkJvcmRlclN0eWxlIjpudWxsLCJQYXJlbnRTdHlsZSI6bnVsbH0sIkRhdGVGb3JtYXQiOnsiJGlkIjoiMTI2IiwiRm9ybWF0U3RyaW5nIjoiTU1NIGQiLCJTZXBhcmF0b3IiOiIvIiwiVXNlSW50ZXJuYXRpb25hbERhdGVGb3JtYXQiOmZhbHNlLCJEYXRlSXNWaXNpYmxlIjp0cnVlLCJUaW1lSXNWaXNpYmxlIjpmYWxzZSwiSG91ckRpZ2l0cyI6MSwiQW1QbURlc2lnbmF0b3IiOjIsIlRyaW0wME1pbnV0ZXMiOmZhbHNlLCJMYXN0S25vd25WaXNpYmlsaXR5U3RhdGUiOm51bGx9LCJXZWVrTnVtYmVyaW5nIjp7IiRpZCI6IjEyNyIsIkZvcm1hdCI6MCwiSXNWaXNpYmxlIjpmYWxzZSwiTGFzdEtub3duVmlzaWJpbGl0eVN0YXRlIjpmYWxzZX0sIklzVmlzaWJsZSI6dHJ1ZSwiUGFyZW50U3R5bGUiOm51bGwsIl9leHBsaWNpdGx5U2V0Ijp7IiRpZCI6IjEyOCIsIlNoYXBlU3R5bGUiOmZhbHNlLCJUaXRsZVN0eWxlIjpmYWxzZSwiRGF0ZVN0eWxlIjpmYWxzZSwiSG9yaXpvbnRhbENvbm5lY3RvclN0eWxlIjpmYWxzZSwiVmVydGljYWxDb25uZWN0b3JTdHlsZSI6ZmFsc2UsIlBlcmNlbnRhZ2VDb21wbGV0ZVNoYXBlT3BhY2l0eSI6ZmFsc2UsIlNoYXBlIjpmYWxzZSwiU2hhcGVUaGlja25lc3MiOmZhbHNlLCJEdXJhdGlvbkZvcm1hdCI6ZmFsc2UsIkluY2x1ZGVOb25Xb3JraW5nRGF5c0luRHVyYXRpb24iOmZhbHNlLCJNYXJnaW4iOmZhbHNlLCJTdGFydERhdGVQb3NpdGlvbiI6ZmFsc2UsIkVuZERhdGVQb3NpdGlvbiI6ZmFsc2UsIlRpdGxlUG9zaXRpb24iOmZhbHNlLCJEdXJhdGlvblBvc2l0aW9uIjpmYWxzZSwiUGVyY2VudGFnZUNvbXBsZXRlZFBvc2l0aW9uIjpmYWxzZSwiU3BhY2luZyI6ZmFsc2UsIklzQmVsb3dUaW1lYmFuZCI6ZmFsc2UsIkRhdGVGb3JtYXQiOmZhbHNlLCJXZWVrTnVtYmVyaW5nIjpmYWxzZSwiSXNWaXNpYmxlIjpmYWxzZX19LCJHcmlkbGluZVBhbmVsU3R5bGUiOnsiJGlkIjoiMTI5IiwiR3JpZGxpbmVTdHlsZSI6eyIkaWQiOiIxMzAiLCJMaW5lQ29sb3IiOnsiJGlkIjoiMTMxIiwiJHR5cGUiOiJOTFJFLkNvbW1vbi5Eb20uU29saWRDb2xvckJydXNoLCBOTFJFLkNvbW1vbiIsIkNvbG9yIjp7IiRpZCI6IjEzMiIsIkEiOjM4LCJSIjo5MSwiRyI6MTU1LCJCIjoyMTN9fSwiTGluZVdlaWdodCI6MS4wLCJMaW5lVHlwZSI6MCwiUGFyZW50U3R5bGUiOm51bGx9LCJNYXJnaW4iOnsiJGlkIjoiMTMzIiwiVG9wIjowLCJMZWZ0IjowLCJSaWdodCI6MCwiQm90dG9tIjowfSwiUGFkZGluZyI6eyIkaWQiOiIxMzQiLCJUb3AiOjAsIkxlZnQiOjAsIlJpZ2h0IjowLCJCb3R0b20iOjB9LCJCYWNrZ3JvdW5kIjpudWxsLCJJc1Zpc2libGUiOnRydWUsIldpZHRoIjowLjAsIkhlaWdodCI6MC4wLCJCb3JkZXJTdHlsZSI6eyIkaWQiOiIxMzUiLCJMaW5lQ29sb3IiOm51bGwsIkxpbmVXZWlnaHQiOjAuMCwiTGluZVR5cGUiOjAsIlBhcmVudFN0eWxlIjpudWxsfSwiUGFyZW50U3R5bGUiOm51bGx9LCJTaG93RWxhcHNlZFRpbWVHcmFkaWVudFN0eWxlIjp0cnVlLCJEZWZhdWx0U3dpbWxhbmVTdHlsZSI6eyIkaWQiOiIxMzYiLCJIZWFkZXJTdHlsZSI6eyIkaWQiOiIxMzciLCJUZXh0U3R5bGUiOnsiJGlkIjoiMTM4IiwiRm9udFNldHRpbmdzIjp7IiRpZCI6IjEzOSIsIkZvbnRTaXplIjoxMiwiRm9udE5hbWUiOiJDYWxpYnJpIiwiSXNCb2xkIjpmYWxzZSwiSXNJdGFsaWMiOmZhbHNlLCJJc1VuZGVybGluZWQiOmZhbHNlLCJQYXJlbnRTdHlsZSI6bnVsbH0sIkF1dG9TaXplIjowLCJGb3JlZ3JvdW5kIjp7IiRpZCI6IjE0MCIsIkNvbG9yIjp7IiRpZCI6IjE0MSIsIkEiOjI1NSwiUiI6MzIsIkciOjU2LCJCIjoxMDB9fSwiTWF4V2lkdGgiOjAuMCwiTWF4SGVpZ2h0IjowLjAsIlNtYXJ0Rm9yZWdyb3VuZElzQWN0aXZlIjpmYWxzZSwiSG9yaXpvbnRhbEFsaWdubWVudCI6MCwiVmVydGljYWxBbGlnbm1lbnQiOjAsIlNtYXJ0Rm9yZWdyb3VuZCI6bnVsbCwiQmFja2dyb3VuZEZpbGxUeXBlIjowLCJNYXJnaW4iOnsiJGlkIjoiMTQyIiwiVG9wIjowLCJMZWZ0IjowLCJSaWdodCI6MCwiQm90dG9tIjowfSwiUGFkZGluZyI6eyIkaWQiOiIxNDMiLCJUb3AiOjAsIkxlZnQiOjAsIlJpZ2h0IjowLCJCb3R0b20iOjB9LCJCYWNrZ3JvdW5kIjpudWxsLCJJc1Zpc2libGUiOmZhbHNlLCJXaWR0aCI6MC4wLCJIZWlnaHQiOjAuMCwiQm9yZGVyU3R5bGUiOm51bGwsIlBhcmVudFN0eWxlIjpudWxsfSwiUmVjdGFuZ2xlU3R5bGUiOnsiJGlkIjoiMTQ0IiwiTWFyZ2luIjp7IiRpZCI6IjE0NSIsIlRvcCI6MCwiTGVmdCI6MCwiUmlnaHQiOjAsIkJvdHRvbSI6MH0sIlBhZGRpbmciOnsiJGlkIjoiMTQ2IiwiVG9wIjowLCJMZWZ0IjowLCJSaWdodCI6MCwiQm90dG9tIjowfSwiQmFja2dyb3VuZCI6eyIkaWQiOiIxNDciLCJDb2xvciI6eyIkaWQiOiIxNDgiLCJBIjoxMjcsIlIiOjkxLCJHIjoxNTUsIkIiOjIxM319LCJJc1Zpc2libGUiOmZhbHNlLCJXaWR0aCI6MC4wLCJIZWlnaHQiOjAuMCwiQm9yZGVyU3R5bGUiOnsiJGlkIjoiMTQ5IiwiTGluZUNvbG9yIjp7IiRpZCI6IjE1MCIsIiR0eXBlIjoiTkxSRS5Db21tb24uRG9tLlNvbGlkQ29sb3JCcnVzaCwgTkxSRS5Db21tb24iLCJDb2xvciI6eyIkaWQiOiIxNTEiLCJBIjoyNTUsIlIiOjI1NSwiRyI6MCwiQiI6MH19LCJMaW5lV2VpZ2h0IjowLjAsIkxpbmVUeXBlIjowLCJQYXJlbnRTdHlsZSI6bnVsbH0sIlBhcmVudFN0eWxlIjpudWxsfSwiTWFyZ2luIjp7IiRpZCI6IjE1MiIsIlRvcCI6MCwiTGVmdCI6MCwiUmlnaHQiOjAsIkJvdHRvbSI6MH0sIlBhZGRpbmciOnsiJGlkIjoiMTUzIiwiVG9wIjowLCJMZWZ0IjowLCJSaWdodCI6MCwiQm90dG9tIjowfSwiQmFja2dyb3VuZCI6bnVsbCwiSXNWaXNpYmxlIjp0cnVlLCJXaWR0aCI6MC4wLCJIZWlnaHQiOjAuMCwiQm9yZGVyU3R5bGUiOm51bGwsIlBhcmVudFN0eWxlIjpudWxsfSwiQmFja2dyb3VuZFN0eWxlIjp7IiRpZCI6IjE1NCIsIk1hcmdpbiI6eyIkaWQiOiIxNTUiLCJUb3AiOjAsIkxlZnQiOjAsIlJpZ2h0IjowLCJCb3R0b20iOjB9LCJQYWRkaW5nIjp7IiRpZCI6IjE1NiIsIlRvcCI6MCwiTGVmdCI6MCwiUmlnaHQiOjAsIkJvdHRvbSI6MH0sIkJhY2tncm91bmQiOnsiJGlkIjoiMTU3IiwiQ29sb3IiOnsiJGlkIjoiMTU4IiwiQSI6MzgsIlIiOjkxLCJHIjoxNTUsIkIiOjIxM319LCJJc1Zpc2libGUiOnRydWUsIldpZHRoIjowLjAsIkhlaWdodCI6MC4wLCJCb3JkZXJTdHlsZSI6eyIkaWQiOiIxNTkiLCJMaW5lQ29sb3IiOnsiJGlkIjoiMTYwIiwiJHR5cGUiOiJOTFJFLkNvbW1vbi5Eb20uU29saWRDb2xvckJydXNoLCBOTFJFLkNvbW1vbiIsIkNvbG9yIjp7IiRpZCI6IjE2MSIsIkEiOjI1NSwiUiI6MjU1LCJHIjowLCJCIjowfX0sIkxpbmVXZWlnaHQiOjAuMCwiTGluZVR5cGUiOjAsIlBhcmVudFN0eWxlIjpudWxsfSwiUGFyZW50U3R5bGUiOm51bGx9LCJJc0Fib3ZlVGltZWJhbmQiOmZhbHNlLCJNYXJnaW4iOnsiJGlkIjoiMTYyIiwiVG9wIjowLCJMZWZ0IjowLCJSaWdodCI6MCwiQm90dG9tIjowfSwiUGFkZGluZyI6eyIkaWQiOiIxNjMiLCJUb3AiOjAsIkxlZnQiOjAsIlJpZ2h0IjowLCJCb3R0b20iOjB9LCJJc1Zpc2libGUiOnRydWUsIldpZHRoIjowLjAsIkhlaWdodCI6MC4wLCJCb3JkZXJTdHlsZSI6bnVsbCwiUGFyZW50U3R5bGUiOm51bGx9fSwiU2NhbGUiOnsiJGlkIjoiMTY0IiwiU3RhcnREYXRlIjoiMDAwMS0wMS0wMVQwMDowMDowMCIsIkVuZERhdGUiOiIyMDIxLTA0LTAzVDIzOjU5OjAwIiwiRm9ybWF0IjoiZCIsIlR5cGUiOjAsIkF1dG9EYXRlUmFuZ2UiOnRydWUsIldvcmtpbmdEYXlzIjozMSwiRmlzY2FsWWVhciI6eyIkaWQiOiIxNjUiLCJTdGFydE1vbnRoIjoxLCJVc2VTdGFydGluZ1llYXJGb3JOdW1iZXJpbmciOnRydWUsIlNob3dGaXNjYWxZZWFyTGFiZWwiOnRydWV9LCJUb2RheU1hcmtlclRleHQiOiJUb2RheSIsIkF1dG9TY2FsZVR5cGUiOnRydWV9LCJNaWxlc3RvbmVzIjpbeyIkaWQiOiIxNjYiLCJEYXRlIjoiMjAyMS0wNC0wMVQyMzo1OTowMFoiLCJTdHlsZSI6eyIkaWQiOiIxNjciLCJTaGFwZSI6NywiQ29ubmVjdG9yTWFyZ2luIjp7IiRyZWYiOiI1NCJ9LCJDb25uZWN0b3JTdHlsZSI6eyIkaWQiOiIxNjgiLCJMaW5lQ29sb3IiOnsiJGlkIjoiMTY5IiwiJHR5cGUiOiJOTFJFLkNvbW1vbi5Eb20uU29saWRDb2xvckJydXNoLCBOTFJFLkNvbW1vbiIsIkNvbG9yIjp7IiRpZCI6IjE3MCIsIkEiOjEyNywiUiI6MzEsIkciOjczLCJCIjoxMjZ9fSwiTGluZVdlaWdodCI6MS4wLCJMaW5lVHlwZSI6MCwiUGFyZW50U3R5bGUiOm51bGx9LCJJc0JlbG93VGltZWJhbmQiOmZhbHNlLCJQb3NpdGlvbk9uVGFzayI6MCwiSGlkZURhdGUiOmZhbHNlLCJTaGFwZVNpemUiOjEsIlNwYWNpbmciOjIuMCwiUGFkZGluZyI6eyIkcmVmIjoiNTgifSwiU2hhcGVTdHlsZSI6eyIkaWQiOiIxNzEiLCJNYXJnaW4iOnsiJHJlZiI6IjYwIn0sIlBhZGRpbmciOnsiJHJlZiI6IjYxIn0sIkJhY2tncm91bmQiOnsiJGlkIjoiMTcyIiwiQ29sb3IiOnsiJGlkIjoiMTczIiwiQSI6MjU1LCJSIjo5MSwiRyI6MTU1LCJCIjoyMTN9fSwiSXNWaXNpYmxlIjp0cnVlLCJXaWR0aCI6MTguMCwiSGVpZ2h0IjoyMC4wLCJCb3JkZXJTdHlsZSI6eyIkaWQiOiIxNzQiLCJMaW5lQ29sb3IiOnsiJHJlZiI6IjY1In0sIkxpbmVXZWlnaHQiOjAuMCwiTGluZVR5cGUiOjAsIlBhcmVudFN0eWxlIjpudWxsfSwiUGFyZW50U3R5bGUiOm51bGx9LCJUaXRsZVN0eWxlIjp7IiRpZCI6IjE3NSIsIkZvbnRTZXR0aW5ncyI6eyIkaWQiOiIxNzYiLCJGb250U2l6ZSI6MTEsIkZvbnROYW1lIjoiQ2FsaWJyaSIsIklzQm9sZCI6dHJ1ZSwiSXNJdGFsaWMiOmZhbHNlLCJJc1VuZGVybGluZWQiOmZhbHNlLCJQYXJlbnRTdHlsZSI6bnVsbH0sIkF1dG9TaXplIjoyLCJGb3JlZ3JvdW5kIjp7IiRpZCI6IjE3NyIsIkNvbG9yIjp7IiRpZCI6IjE3OCIsIkEiOjI1NSwiUiI6MCwiRyI6MCwiQiI6MH19LCJNYXhXaWR0aCI6ODYuMCwiTWF4SGVpZ2h0IjoiSW5maW5pdHkiLCJTbWFydEZvcmVncm91bmRJc0FjdGl2ZSI6ZmFsc2UsIkhvcml6b250YWxBbGlnbm1lbnQiOjEsIlZlcnRpY2FsQWxpZ25tZW50IjowLCJTbWFydEZvcmVncm91bmQiOm51bGwsIkJhY2tncm91bmRGaWxsVHlwZSI6MCwiTWFyZ2luIjp7IiRyZWYiOiI3MSJ9LCJQYWRkaW5nIjp7IiRyZWYiOiI3MiJ9LCJCYWNrZ3JvdW5kIjp7IiRpZCI6IjE3OSIsIkNvbG9yIjp7IiRpZCI6IjE4MCIsIkEiOjAsIlIiOjI1NSwiRyI6MjU1LCJCIjoyNTV9fSwiSXNWaXNpYmxlIjp0cnVlLCJXaWR0aCI6MC4wLCJIZWlnaHQiOjAuMCwiQm9yZGVyU3R5bGUiOnsiJGlkIjoiMTgxIiwiTGluZUNvbG9yIjpudWxsLCJMaW5lV2VpZ2h0IjowLjAsIkxpbmVUeXBlIjowLCJQYXJlbnRTdHlsZSI6bnVsbH0sIlBhcmVudFN0eWxlIjpudWxsfSwiRGF0ZVN0eWxlIjp7IiRpZCI6IjE4MiIsIkZvbnRTZXR0aW5ncyI6eyIkaWQiOiIxODMiLCJGb250U2l6ZSI6MTAsIkZvbnROYW1lIjoiQ2FsaWJyaSIsIklzQm9sZCI6ZmFsc2UsIklzSXRhbGljIjpmYWxzZSwiSXNVbmRlcmxpbmVkIjpmYWxzZSwiUGFyZW50U3R5bGUiOm51bGx9LCJBdXRvU2l6ZSI6MCwiRm9yZWdyb3VuZCI6eyIkaWQiOiIxODQiLCJDb2xvciI6eyIkaWQiOiIxODUiLCJBIjoyNTUsIlIiOjY4LCJHIjo4NCwiQiI6MTA2fX0sIk1heFdpZHRoIjoyMDAuMCwiTWF4SGVpZ2h0IjoiSW5maW5pdHkiLCJTbWFydEZvcmVncm91bmRJc0FjdGl2ZSI6ZmFsc2UsIkhvcml6b250YWxBbGlnbm1lbnQiOjEsIlZlcnRpY2FsQWxpZ25tZW50IjowLCJTbWFydEZvcmVncm91bmQiOm51bGwsIkJhY2tncm91bmRGaWxsVHlwZSI6MCwiTWFyZ2luIjp7IiRyZWYiOiI3OCJ9LCJQYWRkaW5nIjp7IiRyZWYiOiI3OSJ9LCJCYWNrZ3JvdW5kIjp7IiRpZCI6IjE4NiIsIkNvbG9yIjp7IiRpZCI6IjE4NyIsIkEiOjAsIlIiOjI1NSwiRyI6MjU1LCJCIjoyNTV9fSwiSXNWaXNpYmxlIjp0cnVlLCJXaWR0aCI6MC4wLCJIZWlnaHQiOjAuMCwiQm9yZGVyU3R5bGUiOnsiJGlkIjoiMTg4IiwiTGluZUNvbG9yIjpudWxsLCJMaW5lV2VpZ2h0IjowLjAsIkxpbmVUeXBlIjowLCJQYXJlbnRTdHlsZSI6bnVsbH0sIlBhcmVudFN0eWxlIjpudWxsfSwiRGF0ZUZvcm1hdCI6eyIkaWQiOiIxODkiLCJGb3JtYXRTdHJpbmciOiJNTU0gZCIsIlNlcGFyYXRvciI6Ii8iLCJVc2VJbnRlcm5hdGlvbmFsRGF0ZUZvcm1hdCI6ZmFsc2UsIkRhdGVJc1Zpc2libGUiOnRydWUsIlRpbWVJc1Zpc2libGUiOmZhbHNlLCJIb3VyRGlnaXRzIjoxLCJBbVBtRGVzaWduYXRvciI6MiwiVHJpbTAwTWludXRlcyI6ZmFsc2UsIkxhc3RLbm93blZpc2liaWxpdHlTdGF0ZSI6bnVsbH0sIldlZWtOdW1iZXJpbmciOnsiJGlkIjoiMTkwIiwiRm9ybWF0IjowLCJJc1Zpc2libGUiOmZhbHNlLCJMYXN0S25vd25WaXNpYmlsaXR5U3RhdGUiOmZhbHNlfSwiSXNWaXNpYmxlIjp0cnVlLCJQYXJlbnRTdHlsZSI6bnVsbH0sIkluZGV4IjoxLCJQZXJjZW50YWdlQ29tcGxldGUiOm51bGwsIlBvc2l0aW9uIjp7IlJhdGlvIjowLjAsIklzQ3VzdG9tIjpmYWxzZX0sIkRhdGVGb3JtYXQiOnsiJHJlZiI6IjE4OSJ9LCJXZWVrTnVtYmVyaW5nIjp7IiRpZCI6IjE5MSIsIkZvcm1hdCI6MCwiSXNWaXNpYmxlIjpmYWxzZSwiTGFzdEtub3duVmlzaWJpbGl0eVN0YXRlIjpmYWxzZX0sIlJlbGF0ZWRUYXNrSWQiOiIwMDAwMDAwMC0wMDAwLTAwMDAtMDAwMC0wMDAwMDAwMDAwMDAiLCJJZCI6IjczYmNiMmI4LTVhZTYtNDI0ZC05Mjk3LTliOWQ1MzJmMGM4NyIsIkltcG9ydElkIjpudWxsLCJUaXRsZSI6IlByb2plY3QgVGVzdGluZyIsIk5vdGUiOm51bGwsIkh5cGVybGluayI6eyIkaWQiOiIxOTIiLCJBZGRyZXNzIjpudWxsLCJTdWJBZGRyZXNzIjpudWxsfSwiSXNDaGFuZ2VkIjpmYWxzZSwiSXNOZXciOmZhbHNlfV0sIlRhc2tzIjpbeyIkaWQiOiIxOTMiLCJHcm91cE5hbWUiOm51bGwsIlN0YXJ0RGF0ZSI6IjIwMjEtMDMtMjdUMDA6MDA6MDBaIiwiRW5kRGF0ZSI6IjIwMjEtMDMtMjdUMjM6NTk6MDBaIiwiUGVyY2VudGFnZUNvbXBsZXRlIjpudWxsLCJTdHlsZSI6eyIkaWQiOiIxOTQiLCJTaGFwZSI6MywiU2hhcGVUaGlja25lc3MiOjIsIkR1cmF0aW9uRm9ybWF0IjowLCJJbmNsdWRlTm9uV29ya2luZ0RheXNJbkR1cmF0aW9uIjpmYWxzZSwiUGVyY2VudGFnZUNvbXBsZXRlU3R5bGUiOnsiJGlkIjoiMTk1IiwiRm9udFNldHRpbmdzIjp7IiRpZCI6IjE5NiIsIkZvbnRTaXplIjoxMCwiRm9udE5hbWUiOiJDYWxpYnJpIiwiSXNCb2xkIjpmYWxzZSwiSXNJdGFsaWMiOmZhbHNlLCJJc1VuZGVybGluZWQiOmZhbHNlLCJQYXJlbnRTdHlsZSI6bnVsbH0sIkF1dG9TaXplIjowLCJGb3JlZ3JvdW5kIjp7IiRyZWYiOiI4NiJ9LCJNYXhXaWR0aCI6MjAwLjAsIk1heEhlaWdodCI6IkluZmluaXR5IiwiU21hcnRGb3JlZ3JvdW5kSXNBY3RpdmUiOmZhbHNlLCJIb3Jpem9udGFsQWxpZ25tZW50IjowLCJWZXJ0aWNhbEFsaWdubWVudCI6MCwiU21hcnRGb3JlZ3JvdW5kIjpudWxsLCJCYWNrZ3JvdW5kRmlsbFR5cGUiOjAsIk1hcmdpbiI6eyIkcmVmIjoiODgifSwiUGFkZGluZyI6eyIkcmVmIjoiODkifSwiQmFja2dyb3VuZCI6eyIkcmVmIjoiOTAifSwiSXNWaXNpYmxlIjp0cnVlLCJXaWR0aCI6MC4wLCJIZWlnaHQiOjAuMCwiQm9yZGVyU3R5bGUiOnsiJGlkIjoiMTk3IiwiTGluZUNvbG9yIjpudWxsLCJMaW5lV2VpZ2h0IjowLjAsIkxpbmVUeXBlIjowLCJQYXJlbnRTdHlsZSI6bnVsbH0sIlBhcmVudFN0eWxlIjpudWxsfSwiRHVyYXRpb25TdHlsZSI6eyIkaWQiOiIxOTgiLCJGb250U2V0dGluZ3MiOnsiJGlkIjoiMTk5IiwiRm9udFNpemUiOjEwLCJGb250TmFtZSI6IkNhbGlicmkiLCJJc0JvbGQiOmZhbHNlLCJJc0l0YWxpYyI6ZmFsc2UsIklzVW5kZXJsaW5lZCI6ZmFsc2UsIlBhcmVudFN0eWxlIjpudWxsfSwiQXV0b1NpemUiOjAsIkZvcmVncm91bmQiOnsiJHJlZiI6IjkzIn0sIk1heFdpZHRoIjoyMDAuMCwiTWF4SGVpZ2h0IjoiSW5maW5pdHkiLCJTbWFydEZvcmVncm91bmRJc0FjdGl2ZSI6ZmFsc2UsIkhvcml6b250YWxBbGlnbm1lbnQiOjAsIlZlcnRpY2FsQWxpZ25tZW50IjowLCJTbWFydEZvcmVncm91bmQiOm51bGwsIkJhY2tncm91bmRGaWxsVHlwZSI6MCwiTWFyZ2luIjp7IiRyZWYiOiI5NSJ9LCJQYWRkaW5nIjp7IiRyZWYiOiI5NiJ9LCJCYWNrZ3JvdW5kIjp7IiRyZWYiOiI5NyJ9LCJJc1Zpc2libGUiOnRydWUsIldpZHRoIjowLjAsIkhlaWdodCI6MC4wLCJCb3JkZXJTdHlsZSI6eyIkaWQiOiIyMDAiLCJMaW5lQ29sb3IiOm51bGwsIkxpbmVXZWlnaHQiOjAuMCwiTGluZVR5cGUiOjAsIlBhcmVudFN0eWxlIjpudWxsfSwiUGFyZW50U3R5bGUiOm51bGx9LCJIb3Jpem9udGFsQ29ubmVjdG9yU3R5bGUiOnsiJGlkIjoiMjAxIiwiTGluZUNvbG9yIjp7IiRpZCI6IjIwMiIsIiR0eXBlIjoiTkxSRS5Db21tb24uRG9tLlNvbGlkQ29sb3JCcnVzaCwgTkxSRS5Db21tb24iLCJDb2xvciI6eyIkaWQiOiIyMDMiLCJBIjoyNTUsIlIiOjIwNCwiRyI6MjA0LCJCIjoyMDR9fSwiTGluZVdlaWdodCI6MS4wLCJMaW5lVHlwZSI6MCwiUGFyZW50U3R5bGUiOm51bGx9LCJWZXJ0aWNhbENvbm5lY3RvclN0eWxlIjp7IiRpZCI6IjIwNCIsIkxpbmVDb2xvciI6eyIkcmVmIjoiMTAyIn0sIkxpbmVXZWlnaHQiOjEuMCwiTGluZVR5cGUiOjAsIlBhcmVudFN0eWxlIjpudWxsfSwiTWFyZ2luIjpudWxsLCJTdGFydERhdGVQb3NpdGlvbiI6NCwiRW5kRGF0ZVBvc2l0aW9uIjo0LCJEYXRlSXNWaXNpYmxlIjp0cnVlLCJUaXRsZVBvc2l0aW9uIjoyLCJEdXJhdGlvblBvc2l0aW9uIjo2LCJQZXJjZW50YWdlQ29tcGxldGVkUG9zaXRpb24iOjYsIlNwYWNpbmciOjUsIklzQmVsb3dUaW1lYmFuZCI6ZmFsc2UsIlBlcmNlbnRhZ2VDb21wbGV0ZVNoYXBlT3BhY2l0eSI6MzUsIlNoYXBlU3R5bGUiOnsiJGlkIjoiMjA1IiwiTWFyZ2luIjp7IiRyZWYiOiIxMDUifSwiUGFkZGluZyI6eyIkcmVmIjoiMTA2In0sIkJhY2tncm91bmQiOnsiJGlkIjoiMjA2IiwiQ29sb3IiOnsiJGlkIjoiMjA3IiwiQSI6MjU1LCJSIjo5MSwiRyI6MTU1LCJCIjoyMTN9fSwiSXNWaXNpYmxlIjp0cnVlLCJXaWR0aCI6MC4wLCJIZWlnaHQiOjIyLjAsIkJvcmRlclN0eWxlIjp7IiRpZCI6IjIwOCIsIkxpbmVDb2xvciI6eyIkaWQiOiIyMDkiLCIkdHlwZSI6Ik5MUkUuQ29tbW9uLkRvbS5Tb2xpZENvbG9yQnJ1c2gsIE5MUkUuQ29tbW9uIiwiQ29sb3IiOnsiJGlkIjoiMjEwIiwiQSI6MjU1LCJSIjoyNTUsIkciOjAsIkIiOjB9fSwiTGluZVdlaWdodCI6MC4wLCJMaW5lVHlwZSI6MCwiUGFyZW50U3R5bGUiOm51bGx9LCJQYXJlbnRTdHlsZSI6bnVsbH0sIlRpdGxlU3R5bGUiOnsiJGlkIjoiMjExIiwiRm9udFNldHRpbmdzIjp7IiRpZCI6IjIxMiIsIkZvbnRTaXplIjoxMSwiRm9udE5hbWUiOiJDYWxpYnJpIiwiSXNCb2xkIjp0cnVlLCJJc0l0YWxpYyI6ZmFsc2UsIklzVW5kZXJsaW5lZCI6ZmFsc2UsIlBhcmVudFN0eWxlIjpudWxsfSwiQXV0b1NpemUiOjIsIkZvcmVncm91bmQiOnsiJGlkIjoiMjEzIiwiQ29sb3IiOnsiJGlkIjoiMjE0IiwiQSI6MjU1LCJSIjowLCJHIjowLCJCIjowfX0sIk1heFdpZHRoIjo4Mi4yNjAxNTQ3MjQxMjExLCJNYXhIZWlnaHQiOiJJbmZpbml0eSIsIlNtYXJ0Rm9yZWdyb3VuZElzQWN0aXZlIjpmYWxzZSwiSG9yaXpvbnRhbEFsaWdubWVudCI6MCwiVmVydGljYWxBbGlnbm1lbnQiOjAsIlNtYXJ0Rm9yZWdyb3VuZCI6bnVsbCwiQmFja2dyb3VuZEZpbGxUeXBlIjowLCJNYXJnaW4iOnsiJHJlZiI6IjExNiJ9LCJQYWRkaW5nIjp7IiRyZWYiOiIxMTcifSwiQmFja2dyb3VuZCI6eyIkaWQiOiIyMTUiLCJDb2xvciI6eyIkaWQiOiIyMTYiLCJBIjowLCJSIjoyNTUsIkciOjI1NSwiQiI6MjU1fX0sIklzVmlzaWJsZSI6dHJ1ZSwiV2lkdGgiOjAuMCwiSGVpZ2h0IjowLjAsIkJvcmRlclN0eWxlIjp7IiRpZCI6IjIxNyIsIkxpbmVDb2xvciI6bnVsbCwiTGluZVdlaWdodCI6MC4wLCJMaW5lVHlwZSI6MCwiUGFyZW50U3R5bGUiOm51bGx9LCJQYXJlbnRTdHlsZSI6bnVsbH0sIkRhdGVTdHlsZSI6eyIkaWQiOiIyMTgiLCJGb250U2V0dGluZ3MiOnsiJGlkIjoiMjE5IiwiRm9udFNpemUiOjEwLCJGb250TmFtZSI6IkNhbGlicmkiLCJJc0JvbGQiOmZhbHNlLCJJc0l0YWxpYyI6ZmFsc2UsIklzVW5kZXJsaW5lZCI6ZmFsc2UsIlBhcmVudFN0eWxlIjpudWxsfSwiQXV0b1NpemUiOjAsIkZvcmVncm91bmQiOnsiJGlkIjoiMjIwIiwiQ29sb3IiOnsiJGlkIjoiMjIxIiwiQSI6MjU1LCJSIjo2OCwiRyI6ODQsIkIiOjEwNn19LCJNYXhXaWR0aCI6MjAwLjAsIk1heEhlaWdodCI6IkluZmluaXR5IiwiU21hcnRGb3JlZ3JvdW5kSXNBY3RpdmUiOmZhbHNlLCJIb3Jpem9udGFsQWxpZ25tZW50IjowLCJWZXJ0aWNhbEFsaWdubWVudCI6MCwiU21hcnRGb3JlZ3JvdW5kIjpudWxsLCJCYWNrZ3JvdW5kRmlsbFR5cGUiOjAsIk1hcmdpbiI6eyIkcmVmIjoiMTIzIn0sIlBhZGRpbmciOnsiJHJlZiI6IjEyNCJ9LCJCYWNrZ3JvdW5kIjp7IiRpZCI6IjIyMiIsIkNvbG9yIjp7IiRpZCI6IjIyMyIsIkEiOjAsIlIiOjI1NSwiRyI6MjU1LCJCIjoyNTV9fSwiSXNWaXNpYmxlIjp0cnVlLCJXaWR0aCI6MC4wLCJIZWlnaHQiOjAuMCwiQm9yZGVyU3R5bGUiOnsiJGlkIjoiMjI0IiwiTGluZUNvbG9yIjpudWxsLCJMaW5lV2VpZ2h0IjowLjAsIkxpbmVUeXBlIjowLCJQYXJlbnRTdHlsZSI6bnVsbH0sIlBhcmVudFN0eWxlIjpudWxsfSwiRGF0ZUZvcm1hdCI6eyIkaWQiOiIyMjUiLCJGb3JtYXRTdHJpbmciOiJNTU0gZCIsIlNlcGFyYXRvciI6Ii8iLCJVc2VJbnRlcm5hdGlvbmFsRGF0ZUZvcm1hdCI6ZmFsc2UsIkRhdGVJc1Zpc2libGUiOnRydWUsIlRpbWVJc1Zpc2libGUiOmZhbHNlLCJIb3VyRGlnaXRzIjoxLCJBbVBtRGVzaWduYXRvciI6MiwiVHJpbTAwTWludXRlcyI6ZmFsc2UsIkxhc3RLbm93blZpc2liaWxpdHlTdGF0ZSI6bnVsbH0sIldlZWtOdW1iZXJpbmciOnsiJGlkIjoiMjI2IiwiRm9ybWF0IjowLCJJc1Zpc2libGUiOmZhbHNlLCJMYXN0S25vd25WaXNpYmlsaXR5U3RhdGUiOmZhbHNlfSwiSXNWaXNpYmxlIjp0cnVlLCJQYXJlbnRTdHlsZSI6bnVsbH0sIkluZGV4IjowLCJTbWFydER1cmF0aW9uQWN0aXZhdGVkIjpmYWxzZSwiRGF0ZUZvcm1hdCI6eyIkcmVmIjoiMjI1In0sIldlZWtOdW1iZXJpbmciOnsiJGlkIjoiMjI3IiwiRm9ybWF0IjowLCJJc1Zpc2libGUiOmZhbHNlLCJMYXN0S25vd25WaXNpYmlsaXR5U3RhdGUiOmZhbHNlfSwiSWQiOiIzYWZhNTgzMS05ZjM4LTRmM2EtODE5NS0wNDBiZWJjMWU1NmMiLCJJbXBvcnRJZCI6bnVsbCwiVGl0bGUiOiJEb2N1bWVudGF0aW9uIFF1aWNrIFBsYW4iLCJOb3RlIjpudWxsLCJIeXBlcmxpbmsiOnsiJGlkIjoiMjI4IiwiQWRkcmVzcyI6bnVsbCwiU3ViQWRkcmVzcyI6bnVsbH0sIklzQ2hhbmdlZCI6ZmFsc2UsIklzTmV3IjpmYWxzZX0seyIkaWQiOiIyMjkiLCJHcm91cE5hbWUiOm51bGwsIlN0YXJ0RGF0ZSI6IjIwMjEtMDMtMjdUMDA6MDA6MDBaIiwiRW5kRGF0ZSI6IjIwMjEtMDMtMjdUMjM6NTk6MDBaIiwiUGVyY2VudGFnZUNvbXBsZXRlIjpudWxsLCJTdHlsZSI6eyIkaWQiOiIyMzAiLCJTaGFwZSI6MywiU2hhcGVUaGlja25lc3MiOjIsIkR1cmF0aW9uRm9ybWF0IjowLCJJbmNsdWRlTm9uV29ya2luZ0RheXNJbkR1cmF0aW9uIjpmYWxzZSwiUGVyY2VudGFnZUNvbXBsZXRlU3R5bGUiOnsiJGlkIjoiMjMxIiwiRm9udFNldHRpbmdzIjp7IiRpZCI6IjIzMiIsIkZvbnRTaXplIjoxMCwiRm9udE5hbWUiOiJDYWxpYnJpIiwiSXNCb2xkIjpmYWxzZSwiSXNJdGFsaWMiOmZhbHNlLCJJc1VuZGVybGluZWQiOmZhbHNlLCJQYXJlbnRTdHlsZSI6bnVsbH0sIkF1dG9TaXplIjowLCJGb3JlZ3JvdW5kIjp7IiRyZWYiOiI4NiJ9LCJNYXhXaWR0aCI6MjAwLjAsIk1heEhlaWdodCI6IkluZmluaXR5IiwiU21hcnRGb3JlZ3JvdW5kSXNBY3RpdmUiOmZhbHNlLCJIb3Jpem9udGFsQWxpZ25tZW50IjowLCJWZXJ0aWNhbEFsaWdubWVudCI6MCwiU21hcnRGb3JlZ3JvdW5kIjpudWxsLCJCYWNrZ3JvdW5kRmlsbFR5cGUiOjAsIk1hcmdpbiI6eyIkcmVmIjoiODgifSwiUGFkZGluZyI6eyIkcmVmIjoiODkifSwiQmFja2dyb3VuZCI6eyIkcmVmIjoiOTAifSwiSXNWaXNpYmxlIjp0cnVlLCJXaWR0aCI6MC4wLCJIZWlnaHQiOjAuMCwiQm9yZGVyU3R5bGUiOnsiJGlkIjoiMjMzIiwiTGluZUNvbG9yIjpudWxsLCJMaW5lV2VpZ2h0IjowLjAsIkxpbmVUeXBlIjowLCJQYXJlbnRTdHlsZSI6bnVsbH0sIlBhcmVudFN0eWxlIjpudWxsfSwiRHVyYXRpb25TdHlsZSI6eyIkaWQiOiIyMzQiLCJGb250U2V0dGluZ3MiOnsiJGlkIjoiMjM1IiwiRm9udFNpemUiOjEwLCJGb250TmFtZSI6IkNhbGlicmkiLCJJc0JvbGQiOmZhbHNlLCJJc0l0YWxpYyI6ZmFsc2UsIklzVW5kZXJsaW5lZCI6ZmFsc2UsIlBhcmVudFN0eWxlIjpudWxsfSwiQXV0b1NpemUiOjAsIkZvcmVncm91bmQiOnsiJHJlZiI6IjkzIn0sIk1heFdpZHRoIjoyMDAuMCwiTWF4SGVpZ2h0IjoiSW5maW5pdHkiLCJTbWFydEZvcmVncm91bmRJc0FjdGl2ZSI6ZmFsc2UsIkhvcml6b250YWxBbGlnbm1lbnQiOjAsIlZlcnRpY2FsQWxpZ25tZW50IjowLCJTbWFydEZvcmVncm91bmQiOm51bGwsIkJhY2tncm91bmRGaWxsVHlwZSI6MCwiTWFyZ2luIjp7IiRyZWYiOiI5NSJ9LCJQYWRkaW5nIjp7IiRyZWYiOiI5NiJ9LCJCYWNrZ3JvdW5kIjp7IiRyZWYiOiI5NyJ9LCJJc1Zpc2libGUiOnRydWUsIldpZHRoIjowLjAsIkhlaWdodCI6MC4wLCJCb3JkZXJTdHlsZSI6eyIkaWQiOiIyMzYiLCJMaW5lQ29sb3IiOm51bGwsIkxpbmVXZWlnaHQiOjAuMCwiTGluZVR5cGUiOjAsIlBhcmVudFN0eWxlIjpudWxsfSwiUGFyZW50U3R5bGUiOm51bGx9LCJIb3Jpem9udGFsQ29ubmVjdG9yU3R5bGUiOnsiJGlkIjoiMjM3IiwiTGluZUNvbG9yIjp7IiRyZWYiOiI5OSJ9LCJMaW5lV2VpZ2h0IjoxLjAsIkxpbmVUeXBlIjowLCJQYXJlbnRTdHlsZSI6bnVsbH0sIlZlcnRpY2FsQ29ubmVjdG9yU3R5bGUiOnsiJGlkIjoiMjM4IiwiTGluZUNvbG9yIjp7IiRyZWYiOiIxMDIifSwiTGluZVdlaWdodCI6MS4wLCJMaW5lVHlwZSI6MCwiUGFyZW50U3R5bGUiOm51bGx9LCJNYXJnaW4iOm51bGwsIlN0YXJ0RGF0ZVBvc2l0aW9uIjo0LCJFbmREYXRlUG9zaXRpb24iOjQsIkRhdGVJc1Zpc2libGUiOnRydWUsIlRpdGxlUG9zaXRpb24iOjIsIkR1cmF0aW9uUG9zaXRpb24iOjYsIlBlcmNlbnRhZ2VDb21wbGV0ZWRQb3NpdGlvbiI6NiwiU3BhY2luZyI6NSwiSXNCZWxvd1RpbWViYW5kIjpmYWxzZSwiUGVyY2VudGFnZUNvbXBsZXRlU2hhcGVPcGFjaXR5IjozNSwiU2hhcGVTdHlsZSI6eyIkaWQiOiIyMzkiLCJNYXJnaW4iOnsiJHJlZiI6IjEwNSJ9LCJQYWRkaW5nIjp7IiRyZWYiOiIxMDYifSwiQmFja2dyb3VuZCI6eyIkaWQiOiIyNDAiLCJDb2xvciI6eyIkaWQiOiIyNDEiLCJBIjoyNTUsIlIiOjkxLCJHIjoxNTUsIkIiOjIxM319LCJJc1Zpc2libGUiOnRydWUsIldpZHRoIjowLjAsIkhlaWdodCI6MjIuMCwiQm9yZGVyU3R5bGUiOnsiJGlkIjoiMjQyIiwiTGluZUNvbG9yIjp7IiRyZWYiOiIyMDkifSwiTGluZVdlaWdodCI6MC4wLCJMaW5lVHlwZSI6MCwiUGFyZW50U3R5bGUiOm51bGx9LCJQYXJlbnRTdHlsZSI6bnVsbH0sIlRpdGxlU3R5bGUiOnsiJGlkIjoiMjQzIiwiRm9udFNldHRpbmdzIjp7IiRpZCI6IjI0NCIsIkZvbnRTaXplIjoxMSwiRm9udE5hbWUiOiJDYWxpYnJpIiwiSXNCb2xkIjp0cnVlLCJJc0l0YWxpYyI6ZmFsc2UsIklzVW5kZXJsaW5lZCI6ZmFsc2UsIlBhcmVudFN0eWxlIjpudWxsfSwiQXV0b1NpemUiOjAsIkZvcmVncm91bmQiOnsiJGlkIjoiMjQ1IiwiQ29sb3IiOnsiJGlkIjoiMjQ2IiwiQSI6MjU1LCJSIjowLCJHIjowLCJCIjowfX0sIk1heFdpZHRoIjo3MjAuMCwiTWF4SGVpZ2h0IjoiSW5maW5pdHkiLCJTbWFydEZvcmVncm91bmRJc0FjdGl2ZSI6ZmFsc2UsIkhvcml6b250YWxBbGlnbm1lbnQiOjEsIlZlcnRpY2FsQWxpZ25tZW50IjowLCJTbWFydEZvcmVncm91bmQiOm51bGwsIkJhY2tncm91bmRGaWxsVHlwZSI6MCwiTWFyZ2luIjp7IiRyZWYiOiIxMTYifSwiUGFkZGluZyI6eyIkcmVmIjoiMTE3In0sIkJhY2tncm91bmQiOnsiJGlkIjoiMjQ3IiwiQ29sb3IiOnsiJGlkIjoiMjQ4IiwiQSI6MCwiUiI6MjU1LCJHIjoyNTUsIkIiOjI1NX19LCJJc1Zpc2libGUiOnRydWUsIldpZHRoIjowLjAsIkhlaWdodCI6MC4wLCJCb3JkZXJTdHlsZSI6eyIkaWQiOiIyNDkiLCJMaW5lQ29sb3IiOm51bGwsIkxpbmVXZWlnaHQiOjAuMCwiTGluZVR5cGUiOjAsIlBhcmVudFN0eWxlIjpudWxsfSwiUGFyZW50U3R5bGUiOm51bGx9LCJEYXRlU3R5bGUiOnsiJGlkIjoiMjUwIiwiRm9udFNldHRpbmdzIjp7IiRpZCI6IjI1MSIsIkZvbnRTaXplIjoxMCwiRm9udE5hbWUiOiJDYWxpYnJpIiwiSXNCb2xkIjpmYWxzZSwiSXNJdGFsaWMiOmZhbHNlLCJJc1VuZGVybGluZWQiOmZhbHNlLCJQYXJlbnRTdHlsZSI6bnVsbH0sIkF1dG9TaXplIjowLCJGb3JlZ3JvdW5kIjp7IiRpZCI6IjI1MiIsIkNvbG9yIjp7IiRpZCI6IjI1MyIsIkEiOjI1NSwiUiI6NjgsIkciOjg0LCJCIjoxMDZ9fSwiTWF4V2lkdGgiOjIwMC4wLCJNYXhIZWlnaHQiOiJJbmZpbml0eSIsIlNtYXJ0Rm9yZWdyb3VuZElzQWN0aXZlIjpmYWxzZSwiSG9yaXpvbnRhbEFsaWdubWVudCI6MCwiVmVydGljYWxBbGlnbm1lbnQiOjAsIlNtYXJ0Rm9yZWdyb3VuZCI6bnVsbCwiQmFja2dyb3VuZEZpbGxUeXBlIjowLCJNYXJnaW4iOnsiJHJlZiI6IjEyMyJ9LCJQYWRkaW5nIjp7IiRyZWYiOiIxMjQifSwiQmFja2dyb3VuZCI6eyIkaWQiOiIyNTQiLCJDb2xvciI6eyIkaWQiOiIyNTUiLCJBIjowLCJSIjoyNTUsIkciOjI1NSwiQiI6MjU1fX0sIklzVmlzaWJsZSI6dHJ1ZSwiV2lkdGgiOjAuMCwiSGVpZ2h0IjowLjAsIkJvcmRlclN0eWxlIjp7IiRpZCI6IjI1NiIsIkxpbmVDb2xvciI6bnVsbCwiTGluZVdlaWdodCI6MC4wLCJMaW5lVHlwZSI6MCwiUGFyZW50U3R5bGUiOm51bGx9LCJQYXJlbnRTdHlsZSI6bnVsbH0sIkRhdGVGb3JtYXQiOnsiJHJlZiI6IjIyNSJ9LCJXZWVrTnVtYmVyaW5nIjp7IiRpZCI6IjI1NyIsIkZvcm1hdCI6MCwiSXNWaXNpYmxlIjpmYWxzZSwiTGFzdEtub3duVmlzaWJpbGl0eVN0YXRlIjpmYWxzZX0sIklzVmlzaWJsZSI6dHJ1ZSwiUGFyZW50U3R5bGUiOm51bGx9LCJJbmRleCI6MiwiU21hcnREdXJhdGlvbkFjdGl2YXRlZCI6ZmFsc2UsIkRhdGVGb3JtYXQiOnsiJHJlZiI6IjIyNSJ9LCJXZWVrTnVtYmVyaW5nIjp7IiRpZCI6IjI1OCIsIkZvcm1hdCI6MCwiSXNWaXNpYmxlIjpmYWxzZSwiTGFzdEtub3duVmlzaWJpbGl0eVN0YXRlIjpmYWxzZX0sIklkIjoiYzZhZDVkNjctMTFhMS00NjA0LWJkY2ItYzgxOTNjMjU4YmIwIiwiSW1wb3J0SWQiOm51bGwsIlRpdGxlIjoiQXNzaWduIFJvbGVzIiwiTm90ZSI6bnVsbCwiSHlwZXJsaW5rIjp7IiRpZCI6IjI1OSIsIkFkZHJlc3MiOm51bGwsIlN1YkFkZHJlc3MiOm51bGx9LCJJc0NoYW5nZWQiOmZhbHNlLCJJc05ldyI6ZmFsc2V9LHsiJGlkIjoiMjYwIiwiR3JvdXBOYW1lIjpudWxsLCJTdGFydERhdGUiOiIyMDIxLTAzLTI3VDAwOjAwOjAwWiIsIkVuZERhdGUiOiIyMDIyLTAzLTI4VDIzOjU5OjAwWiIsIlBlcmNlbnRhZ2VDb21wbGV0ZSI6bnVsbCwiU3R5bGUiOnsiJGlkIjoiMjYxIiwiU2hhcGUiOjMsIlNoYXBlVGhpY2tuZXNzIjozLCJEdXJhdGlvbkZvcm1hdCI6MCwiSW5jbHVkZU5vbldvcmtpbmdEYXlzSW5EdXJhdGlvbiI6ZmFsc2UsIlBlcmNlbnRhZ2VDb21wbGV0ZVN0eWxlIjp7IiRpZCI6IjI2MiIsIkZvbnRTZXR0aW5ncyI6eyIkaWQiOiIyNjMiLCJGb250U2l6ZSI6MTAsIkZvbnROYW1lIjoiQ2FsaWJyaSIsIklzQm9sZCI6ZmFsc2UsIklzSXRhbGljIjpmYWxzZSwiSXNVbmRlcmxpbmVkIjpmYWxzZSwiUGFyZW50U3R5bGUiOm51bGx9LCJBdXRvU2l6ZSI6MCwiRm9yZWdyb3VuZCI6eyIkcmVmIjoiODYifSwiTWF4V2lkdGgiOjIwMC4wLCJNYXhIZWlnaHQiOiJJbmZpbml0eSIsIlNtYXJ0Rm9yZWdyb3VuZElzQWN0aXZlIjpmYWxzZSwiSG9yaXpvbnRhbEFsaWdubWVudCI6MCwiVmVydGljYWxBbGlnbm1lbnQiOjAsIlNtYXJ0Rm9yZWdyb3VuZCI6bnVsbCwiQmFja2dyb3VuZEZpbGxUeXBlIjowLCJNYXJnaW4iOnsiJGlkIjoiMjY0IiwiVG9wIjowLCJMZWZ0IjowLCJSaWdodCI6MCwiQm90dG9tIjowfSwiUGFkZGluZyI6eyIkaWQiOiIyNjUiLCJUb3AiOjAsIkxlZnQiOjAsIlJpZ2h0IjowLCJCb3R0b20iOjB9LCJCYWNrZ3JvdW5kIjp7IiRpZCI6IjI2NiIsIkNvbG9yIjp7IiRpZCI6IjI2NyIsIkEiOjg5LCJSIjowLCJHIjowLCJCIjowfX0sIklzVmlzaWJsZSI6dHJ1ZSwiV2lkdGgiOjAuMCwiSGVpZ2h0IjowLjAsIkJvcmRlclN0eWxlIjp7IiRpZCI6IjI2OCIsIkxpbmVDb2xvciI6bnVsbCwiTGluZVdlaWdodCI6MC4wLCJMaW5lVHlwZSI6MCwiUGFyZW50U3R5bGUiOm51bGx9LCJQYXJlbnRTdHlsZSI6bnVsbH0sIkR1cmF0aW9uU3R5bGUiOnsiJGlkIjoiMjY5IiwiRm9udFNldHRpbmdzIjp7IiRpZCI6IjI3MCIsIkZvbnRTaXplIjoxMCwiRm9udE5hbWUiOiJDYWxpYnJpIiwiSXNCb2xkIjpmYWxzZSwiSXNJdGFsaWMiOmZhbHNlLCJJc1VuZGVybGluZWQiOmZhbHNlLCJQYXJlbnRTdHlsZSI6bnVsbH0sIkF1dG9TaXplIjowLCJGb3JlZ3JvdW5kIjp7IiRpZCI6IjI3MSIsIkNvbG9yIjp7IiRpZCI6IjI3MiIsIkEiOjI1NSwiUiI6MjM3LCJHIjoxMjUsIkIiOjQ5fX0sIk1heFdpZHRoIjoyMDAuMCwiTWF4SGVpZ2h0IjoiSW5maW5pdHkiLCJTbWFydEZvcmVncm91bmRJc0FjdGl2ZSI6ZmFsc2UsIkhvcml6b250YWxBbGlnbm1lbnQiOjAsIlZlcnRpY2FsQWxpZ25tZW50IjowLCJTbWFydEZvcmVncm91bmQiOm51bGwsIkJhY2tncm91bmRGaWxsVHlwZSI6MCwiTWFyZ2luIjp7IiRpZCI6IjI3MyIsIlRvcCI6MCwiTGVmdCI6MCwiUmlnaHQiOjAsIkJvdHRvbSI6MH0sIlBhZGRpbmciOnsiJGlkIjoiMjc0IiwiVG9wIjowLCJMZWZ0IjowLCJSaWdodCI6MCwiQm90dG9tIjowfSwiQmFja2dyb3VuZCI6eyIkaWQiOiIyNzUiLCJDb2xvciI6eyIkcmVmIjoiMjY3In19LCJJc1Zpc2libGUiOnRydWUsIldpZHRoIjowLjAsIkhlaWdodCI6MC4wLCJCb3JkZXJTdHlsZSI6eyIkaWQiOiIyNzYiLCJMaW5lQ29sb3IiOm51bGwsIkxpbmVXZWlnaHQiOjAuMCwiTGluZVR5cGUiOjAsIlBhcmVudFN0eWxlIjpudWxsfSwiUGFyZW50U3R5bGUiOm51bGx9LCJIb3Jpem9udGFsQ29ubmVjdG9yU3R5bGUiOnsiJGlkIjoiMjc3IiwiTGluZUNvbG9yIjp7IiRpZCI6IjI3OCIsIiR0eXBlIjoiTkxSRS5Db21tb24uRG9tLlNvbGlkQ29sb3JCcnVzaCwgTkxSRS5Db21tb24iLCJDb2xvciI6eyIkaWQiOiIyNzkiLCJBIjoyNTUsIlIiOjIwNCwiRyI6MjA0LCJCIjoyMDR9fSwiTGluZVdlaWdodCI6MS4wLCJMaW5lVHlwZSI6MCwiUGFyZW50U3R5bGUiOm51bGx9LCJWZXJ0aWNhbENvbm5lY3RvclN0eWxlIjp7IiRpZCI6IjI4MCIsIkxpbmVDb2xvciI6eyIkaWQiOiIyODEiLCIkdHlwZSI6Ik5MUkUuQ29tbW9uLkRvbS5Tb2xpZENvbG9yQnJ1c2gsIE5MUkUuQ29tbW9uIiwiQ29sb3IiOnsiJGlkIjoiMjgyIiwiQSI6MjU1LCJSIjoyMDQsIkciOjIwNCwiQiI6MjA0fX0sIkxpbmVXZWlnaHQiOjEuMCwiTGluZVR5cGUiOjAsIlBhcmVudFN0eWxlIjpudWxsfSwiTWFyZ2luIjpudWxsLCJTdGFydERhdGVQb3NpdGlvbiI6NCwiRW5kRGF0ZVBvc2l0aW9uIjo0LCJEYXRlSXNWaXNpYmxlIjp0cnVlLCJUaXRsZVBvc2l0aW9uIjo1LCJEdXJhdGlvblBvc2l0aW9uIjo2LCJQZXJjZW50YWdlQ29tcGxldGVkUG9zaXRpb24iOjYsIlNwYWNpbmciOjUsIklzQmVsb3dUaW1lYmFuZCI6ZmFsc2UsIlBlcmNlbnRhZ2VDb21wbGV0ZVNoYXBlT3BhY2l0eSI6MzUsIlNoYXBlU3R5bGUiOnsiJGlkIjoiMjgzIiwiTWFyZ2luIjp7IiRpZCI6IjI4NCIsIlRvcCI6MCwiTGVmdCI6NCwiUmlnaHQiOjQsIkJvdHRvbSI6MH0sIlBhZGRpbmciOnsiJGlkIjoiMjg1IiwiVG9wIjowLCJMZWZ0IjowLCJSaWdodCI6MCwiQm90dG9tIjowfSwiQmFja2dyb3VuZCI6eyIkaWQiOiIyODYiLCJDb2xvciI6eyIkaWQiOiIyODciLCJBIjoyNTUsIlIiOjkxLCJHIjoxNTUsIkIiOjIxM319LCJJc1Zpc2libGUiOnRydWUsIldpZHRoIjoyMDcuMzc2OTIyNjA3NDIxODgsIkhlaWdodCI6MjIuOTAzMTUwNTU4NDcxNjgsIkJvcmRlclN0eWxlIjp7IiRpZCI6IjI4OCIsIkxpbmVDb2xvciI6eyIkaWQiOiIyODkiLCIkdHlwZSI6Ik5MUkUuQ29tbW9uLkRvbS5Tb2xpZENvbG9yQnJ1c2gsIE5MUkUuQ29tbW9uIiwiQ29sb3IiOnsiJGlkIjoiMjkwIiwiQSI6MjU1LCJSIjoyNTUsIkciOjAsIkIiOjB9fSwiTGluZVdlaWdodCI6MC4wLCJMaW5lVHlwZSI6MCwiUGFyZW50U3R5bGUiOm51bGx9LCJQYXJlbnRTdHlsZSI6bnVsbH0sIlRpdGxlU3R5bGUiOnsiJGlkIjoiMjkxIiwiRm9udFNldHRpbmdzIjp7IiRpZCI6IjI5MiIsIkZvbnRTaXplIjoxMSwiRm9udE5hbWUiOiJDYWxpYnJpIiwiSXNCb2xkIjp0cnVlLCJJc0l0YWxpYyI6ZmFsc2UsIklzVW5kZXJsaW5lZCI6ZmFsc2UsIlBhcmVudFN0eWxlIjpudWxsfSwiQXV0b1NpemUiOjIsIkZvcmVncm91bmQiOnsiJGlkIjoiMjkzIiwiQ29sb3IiOnsiJGlkIjoiMjk0IiwiQSI6MjU1LCJSIjowLCJHIjowLCJCIjowfX0sIk1heFdpZHRoIjoyMDUuMDE3MTY2MTM3Njk1MzEsIk1heEhlaWdodCI6IkluZmluaXR5IiwiU21hcnRGb3JlZ3JvdW5kSXNBY3RpdmUiOmZhbHNlLCJIb3Jpem9udGFsQWxpZ25tZW50IjoxLCJWZXJ0aWNhbEFsaWdubWVudCI6MCwiU21hcnRGb3JlZ3JvdW5kIjpudWxsLCJCYWNrZ3JvdW5kRmlsbFR5cGUiOjAsIk1hcmdpbiI6eyIkaWQiOiIyOTUiLCJUb3AiOjAsIkxlZnQiOjAsIlJpZ2h0IjowLCJCb3R0b20iOjB9LCJQYWRkaW5nIjp7IiRpZCI6IjI5NiIsIlRvcCI6MCwiTGVmdCI6MCwiUmlnaHQiOjAsIkJvdHRvbSI6MH0sIkJhY2tncm91bmQiOnsiJGlkIjoiMjk3IiwiQ29sb3IiOnsiJGlkIjoiMjk4IiwiQSI6MCwiUiI6MjU1LCJHIjoyNTUsIkIiOjI1NX19LCJJc1Zpc2libGUiOnRydWUsIldpZHRoIjowLjAsIkhlaWdodCI6MC4wLCJCb3JkZXJTdHlsZSI6eyIkaWQiOiIyOTkiLCJMaW5lQ29sb3IiOm51bGwsIkxpbmVXZWlnaHQiOjAuMCwiTGluZVR5cGUiOjAsIlBhcmVudFN0eWxlIjpudWxsfSwiUGFyZW50U3R5bGUiOm51bGx9LCJEYXRlU3R5bGUiOnsiJGlkIjoiMzAwIiwiRm9udFNldHRpbmdzIjp7IiRpZCI6IjMwMSIsIkZvbnRTaXplIjoxMCwiRm9udE5hbWUiOiJDYWxpYnJpIiwiSXNCb2xkIjpmYWxzZSwiSXNJdGFsaWMiOmZhbHNlLCJJc1VuZGVybGluZWQiOmZhbHNlLCJQYXJlbnRTdHlsZSI6bnVsbH0sIkF1dG9TaXplIjowLCJGb3JlZ3JvdW5kIjp7IiRpZCI6IjMwMiIsIkNvbG9yIjp7IiRpZCI6IjMwMyIsIkEiOjI1NSwiUiI6NjgsIkciOjg0LCJCIjoxMDZ9fSwiTWF4V2lkdGgiOjIwMC4wLCJNYXhIZWlnaHQiOiJJbmZpbml0eSIsIlNtYXJ0Rm9yZWdyb3VuZElzQWN0aXZlIjpmYWxzZSwiSG9yaXpvbnRhbEFsaWdubWVudCI6MCwiVmVydGljYWxBbGlnbm1lbnQiOjAsIlNtYXJ0Rm9yZWdyb3VuZCI6bnVsbCwiQmFja2dyb3VuZEZpbGxUeXBlIjowLCJNYXJnaW4iOnsiJGlkIjoiMzA0IiwiVG9wIjowLCJMZWZ0IjowLCJSaWdodCI6MCwiQm90dG9tIjowfSwiUGFkZGluZyI6eyIkaWQiOiIzMDUiLCJUb3AiOjAsIkxlZnQiOjAsIlJpZ2h0IjowLCJCb3R0b20iOjB9LCJCYWNrZ3JvdW5kIjp7IiRpZCI6IjMwNiIsIkNvbG9yIjp7IiRpZCI6IjMwNyIsIkEiOjAsIlIiOjI1NSwiRyI6MjU1LCJCIjoyNTV9fSwiSXNWaXNpYmxlIjp0cnVlLCJXaWR0aCI6MC4wLCJIZWlnaHQiOjAuMCwiQm9yZGVyU3R5bGUiOnsiJGlkIjoiMzA4IiwiTGluZUNvbG9yIjpudWxsLCJMaW5lV2VpZ2h0IjowLjAsIkxpbmVUeXBlIjowLCJQYXJlbnRTdHlsZSI6bnVsbH0sIlBhcmVudFN0eWxlIjpudWxsfSwiRGF0ZUZvcm1hdCI6eyIkaWQiOiIzMDkiLCJGb3JtYXRTdHJpbmciOiJNTU0gZCIsIlNlcGFyYXRvciI6Ii8iLCJVc2VJbnRlcm5hdGlvbmFsRGF0ZUZvcm1hdCI6ZmFsc2UsIkRhdGVJc1Zpc2libGUiOnRydWUsIlRpbWVJc1Zpc2libGUiOmZhbHNlLCJIb3VyRGlnaXRzIjoxLCJBbVBtRGVzaWduYXRvciI6MiwiVHJpbTAwTWludXRlcyI6ZmFsc2UsIkxhc3RLbm93blZpc2liaWxpdHlTdGF0ZSI6bnVsbH0sIldlZWtOdW1iZXJpbmciOnsiJGlkIjoiMzEwIiwiRm9ybWF0IjowLCJJc1Zpc2libGUiOmZhbHNlLCJMYXN0S25vd25WaXNpYmlsaXR5U3RhdGUiOmZhbHNlfSwiSXNWaXNpYmxlIjp0cnVlLCJQYXJlbnRTdHlsZSI6bnVsbH0sIkluZGV4IjozLCJTbWFydER1cmF0aW9uQWN0aXZhdGVkIjpmYWxzZSwiRGF0ZUZvcm1hdCI6eyIkcmVmIjoiMzA5In0sIldlZWtOdW1iZXJpbmciOnsiJGlkIjoiMzExIiwiRm9ybWF0IjowLCJJc1Zpc2libGUiOmZhbHNlLCJMYXN0S25vd25WaXNpYmlsaXR5U3RhdGUiOmZhbHNlfSwiSWQiOiI2YjYxNGUxNC02MGZmLTRkOTItODMyMS02YzE1ODNjNWYwOGYiLCJJbXBvcnRJZCI6bnVsbCwiVGl0bGUiOiJSZXF1aXJlbWVudCBBbmFseXNpcyIsIk5vdGUiOm51bGwsIkh5cGVybGluayI6eyIkaWQiOiIzMTIiLCJBZGRyZXNzIjpudWxsLCJTdWJBZGRyZXNzIjpudWxsfSwiSXNDaGFuZ2VkIjpmYWxzZSwiSXNOZXciOmZhbHNlfSx7IiRpZCI6IjMxMyIsIkdyb3VwTmFtZSI6bnVsbCwiU3RhcnREYXRlIjoiMjAyMS0wMy0yOFQwMDowMDowMFoiLCJFbmREYXRlIjoiMjAyMS0wMy0yOFQyMzo1OTowMFoiLCJQZXJjZW50YWdlQ29tcGxldGUiOm51bGwsIlN0eWxlIjp7IiRpZCI6IjMxNCIsIlNoYXBlIjozLCJTaGFwZVRoaWNrbmVzcyI6MiwiRHVyYXRpb25Gb3JtYXQiOjAsIkluY2x1ZGVOb25Xb3JraW5nRGF5c0luRHVyYXRpb24iOmZhbHNlLCJQZXJjZW50YWdlQ29tcGxldGVTdHlsZSI6eyIkaWQiOiIzMTUiLCJGb250U2V0dGluZ3MiOnsiJGlkIjoiMzE2IiwiRm9udFNpemUiOjEwLCJGb250TmFtZSI6IkNhbGlicmkiLCJJc0JvbGQiOmZhbHNlLCJJc0l0YWxpYyI6ZmFsc2UsIklzVW5kZXJsaW5lZCI6ZmFsc2UsIlBhcmVudFN0eWxlIjpudWxsfSwiQXV0b1NpemUiOjAsIkZvcmVncm91bmQiOnsiJHJlZiI6Ijg2In0sIk1heFdpZHRoIjoyMDAuMCwiTWF4SGVpZ2h0IjoiSW5maW5pdHkiLCJTbWFydEZvcmVncm91bmRJc0FjdGl2ZSI6ZmFsc2UsIkhvcml6b250YWxBbGlnbm1lbnQiOjAsIlZlcnRpY2FsQWxpZ25tZW50IjowLCJTbWFydEZvcmVncm91bmQiOm51bGwsIkJhY2tncm91bmRGaWxsVHlwZSI6MCwiTWFyZ2luIjp7IiRyZWYiOiI4OCJ9LCJQYWRkaW5nIjp7IiRyZWYiOiI4OSJ9LCJCYWNrZ3JvdW5kIjp7IiRyZWYiOiI5MCJ9LCJJc1Zpc2libGUiOnRydWUsIldpZHRoIjowLjAsIkhlaWdodCI6MC4wLCJCb3JkZXJTdHlsZSI6eyIkaWQiOiIzMTciLCJMaW5lQ29sb3IiOm51bGwsIkxpbmVXZWlnaHQiOjAuMCwiTGluZVR5cGUiOjAsIlBhcmVudFN0eWxlIjpudWxsfSwiUGFyZW50U3R5bGUiOm51bGx9LCJEdXJhdGlvblN0eWxlIjp7IiRpZCI6IjMxOCIsIkZvbnRTZXR0aW5ncyI6eyIkaWQiOiIzMTkiLCJGb250U2l6ZSI6MTAsIkZvbnROYW1lIjoiQ2FsaWJyaSIsIklzQm9sZCI6ZmFsc2UsIklzSXRhbGljIjpmYWxzZSwiSXNVbmRlcmxpbmVkIjpmYWxzZSwiUGFyZW50U3R5bGUiOm51bGx9LCJBdXRvU2l6ZSI6MCwiRm9yZWdyb3VuZCI6eyIkcmVmIjoiOTMifSwiTWF4V2lkdGgiOjIwMC4wLCJNYXhIZWlnaHQiOiJJbmZpbml0eSIsIlNtYXJ0Rm9yZWdyb3VuZElzQWN0aXZlIjpmYWxzZSwiSG9yaXpvbnRhbEFsaWdubWVudCI6MCwiVmVydGljYWxBbGlnbm1lbnQiOjAsIlNtYXJ0Rm9yZWdyb3VuZCI6bnVsbCwiQmFja2dyb3VuZEZpbGxUeXBlIjowLCJNYXJnaW4iOnsiJHJlZiI6Ijk1In0sIlBhZGRpbmciOnsiJHJlZiI6Ijk2In0sIkJhY2tncm91bmQiOnsiJHJlZiI6Ijk3In0sIklzVmlzaWJsZSI6dHJ1ZSwiV2lkdGgiOjAuMCwiSGVpZ2h0IjowLjAsIkJvcmRlclN0eWxlIjp7IiRpZCI6IjMyMCIsIkxpbmVDb2xvciI6bnVsbCwiTGluZVdlaWdodCI6MC4wLCJMaW5lVHlwZSI6MCwiUGFyZW50U3R5bGUiOm51bGx9LCJQYXJlbnRTdHlsZSI6bnVsbH0sIkhvcml6b250YWxDb25uZWN0b3JTdHlsZSI6eyIkaWQiOiIzMjEiLCJMaW5lQ29sb3IiOnsiJHJlZiI6Ijk5In0sIkxpbmVXZWlnaHQiOjEuMCwiTGluZVR5cGUiOjAsIlBhcmVudFN0eWxlIjpudWxsfSwiVmVydGljYWxDb25uZWN0b3JTdHlsZSI6eyIkaWQiOiIzMjIiLCJMaW5lQ29sb3IiOnsiJHJlZiI6IjEwMiJ9LCJMaW5lV2VpZ2h0IjoxLjAsIkxpbmVUeXBlIjowLCJQYXJlbnRTdHlsZSI6bnVsbH0sIk1hcmdpbiI6bnVsbCwiU3RhcnREYXRlUG9zaXRpb24iOjQsIkVuZERhdGVQb3NpdGlvbiI6NCwiRGF0ZUlzVmlzaWJsZSI6dHJ1ZSwiVGl0bGVQb3NpdGlvbiI6MiwiRHVyYXRpb25Qb3NpdGlvbiI6NiwiUGVyY2VudGFnZUNvbXBsZXRlZFBvc2l0aW9uIjo2LCJTcGFjaW5nIjo1LCJJc0JlbG93VGltZWJhbmQiOmZhbHNlLCJQZXJjZW50YWdlQ29tcGxldGVTaGFwZU9wYWNpdHkiOjM1LCJTaGFwZVN0eWxlIjp7IiRpZCI6IjMyMyIsIk1hcmdpbiI6eyIkcmVmIjoiMTA1In0sIlBhZGRpbmciOnsiJHJlZiI6IjEwNiJ9LCJCYWNrZ3JvdW5kIjp7IiRpZCI6IjMyNCIsIkNvbG9yIjp7IiRpZCI6IjMyNSIsIkEiOjI1NSwiUiI6OTEsIkciOjE1NSwiQiI6MjEzfX0sIklzVmlzaWJsZSI6dHJ1ZSwiV2lkdGgiOjAuMCwiSGVpZ2h0IjoyMi4wLCJCb3JkZXJTdHlsZSI6eyIkaWQiOiIzMjYiLCJMaW5lQ29sb3IiOnsiJHJlZiI6IjIwOSJ9LCJMaW5lV2VpZ2h0IjowLjAsIkxpbmVUeXBlIjowLCJQYXJlbnRTdHlsZSI6bnVsbH0sIlBhcmVudFN0eWxlIjpudWxsfSwiVGl0bGVTdHlsZSI6eyIkaWQiOiIzMjciLCJGb250U2V0dGluZ3MiOnsiJGlkIjoiMzI4IiwiRm9udFNpemUiOjExLCJGb250TmFtZSI6IkNhbGlicmkiLCJJc0JvbGQiOnRydWUsIklzSXRhbGljIjpmYWxzZSwiSXNVbmRlcmxpbmVkIjpmYWxzZSwiUGFyZW50U3R5bGUiOm51bGx9LCJBdXRvU2l6ZSI6MCwiRm9yZWdyb3VuZCI6eyIkaWQiOiIzMjkiLCJDb2xvciI6eyIkaWQiOiIzMzAiLCJBIjoyNTUsIlIiOjAsIkciOjAsIkIiOjB9fSwiTWF4V2lkdGgiOjcyMC4wLCJNYXhIZWlnaHQiOiJJbmZpbml0eSIsIlNtYXJ0Rm9yZWdyb3VuZElzQWN0aXZlIjpmYWxzZSwiSG9yaXpvbnRhbEFsaWdubWVudCI6MSwiVmVydGljYWxBbGlnbm1lbnQiOjAsIlNtYXJ0Rm9yZWdyb3VuZCI6bnVsbCwiQmFja2dyb3VuZEZpbGxUeXBlIjowLCJNYXJnaW4iOnsiJHJlZiI6IjExNiJ9LCJQYWRkaW5nIjp7IiRyZWYiOiIxMTcifSwiQmFja2dyb3VuZCI6eyIkaWQiOiIzMzEiLCJDb2xvciI6eyIkaWQiOiIzMzIiLCJBIjowLCJSIjoyNTUsIkciOjI1NSwiQiI6MjU1fX0sIklzVmlzaWJsZSI6dHJ1ZSwiV2lkdGgiOjAuMCwiSGVpZ2h0IjowLjAsIkJvcmRlclN0eWxlIjp7IiRpZCI6IjMzMyIsIkxpbmVDb2xvciI6bnVsbCwiTGluZVdlaWdodCI6MC4wLCJMaW5lVHlwZSI6MCwiUGFyZW50U3R5bGUiOm51bGx9LCJQYXJlbnRTdHlsZSI6bnVsbH0sIkRhdGVTdHlsZSI6eyIkaWQiOiIzMzQiLCJGb250U2V0dGluZ3MiOnsiJGlkIjoiMzM1IiwiRm9udFNpemUiOjEwLCJGb250TmFtZSI6IkNhbGlicmkiLCJJc0JvbGQiOmZhbHNlLCJJc0l0YWxpYyI6ZmFsc2UsIklzVW5kZXJsaW5lZCI6ZmFsc2UsIlBhcmVudFN0eWxlIjpudWxsfSwiQXV0b1NpemUiOjAsIkZvcmVncm91bmQiOnsiJGlkIjoiMzM2IiwiQ29sb3IiOnsiJGlkIjoiMzM3IiwiQSI6MjU1LCJSIjo2OCwiRyI6ODQsIkIiOjEwNn19LCJNYXhXaWR0aCI6MjAwLjAsIk1heEhlaWdodCI6IkluZmluaXR5IiwiU21hcnRGb3JlZ3JvdW5kSXNBY3RpdmUiOmZhbHNlLCJIb3Jpem9udGFsQWxpZ25tZW50IjowLCJWZXJ0aWNhbEFsaWdubWVudCI6MCwiU21hcnRGb3JlZ3JvdW5kIjpudWxsLCJCYWNrZ3JvdW5kRmlsbFR5cGUiOjAsIk1hcmdpbiI6eyIkcmVmIjoiMTIzIn0sIlBhZGRpbmciOnsiJHJlZiI6IjEyNCJ9LCJCYWNrZ3JvdW5kIjp7IiRpZCI6IjMzOCIsIkNvbG9yIjp7IiRpZCI6IjMzOSIsIkEiOjAsIlIiOjI1NSwiRyI6MjU1LCJCIjoyNTV9fSwiSXNWaXNpYmxlIjp0cnVlLCJXaWR0aCI6MC4wLCJIZWlnaHQiOjAuMCwiQm9yZGVyU3R5bGUiOnsiJGlkIjoiMzQwIiwiTGluZUNvbG9yIjpudWxsLCJMaW5lV2VpZ2h0IjowLjAsIkxpbmVUeXBlIjowLCJQYXJlbnRTdHlsZSI6bnVsbH0sIlBhcmVudFN0eWxlIjpudWxsfSwiRGF0ZUZvcm1hdCI6eyIkcmVmIjoiMjI1In0sIldlZWtOdW1iZXJpbmciOnsiJGlkIjoiMzQxIiwiRm9ybWF0IjowLCJJc1Zpc2libGUiOmZhbHNlLCJMYXN0S25vd25WaXNpYmlsaXR5U3RhdGUiOmZhbHNlfSwiSXNWaXNpYmxlIjp0cnVlLCJQYXJlbnRTdHlsZSI6bnVsbH0sIkluZGV4Ijo0LCJTbWFydER1cmF0aW9uQWN0aXZhdGVkIjpmYWxzZSwiRGF0ZUZvcm1hdCI6eyIkcmVmIjoiMjI1In0sIldlZWtOdW1iZXJpbmciOnsiJGlkIjoiMzQyIiwiRm9ybWF0IjowLCJJc1Zpc2libGUiOmZhbHNlLCJMYXN0S25vd25WaXNpYmlsaXR5U3RhdGUiOmZhbHNlfSwiSWQiOiJjZTEyNWQ2Mi03NDM5LTRiZTQtOWVkYi0wMzE2OGYxOTU2ZmMiLCJJbXBvcnRJZCI6bnVsbCwiVGl0bGUiOiJEZXZlbG9wIFdpcmVmcmFtZXMiLCJOb3RlIjpudWxsLCJIeXBlcmxpbmsiOnsiJGlkIjoiMzQzIiwiQWRkcmVzcyI6bnVsbCwiU3ViQWRkcmVzcyI6bnVsbH0sIklzQ2hhbmdlZCI6ZmFsc2UsIklzTmV3IjpmYWxzZX0seyIkaWQiOiIzNDQiLCJHcm91cE5hbWUiOm51bGwsIlN0YXJ0RGF0ZSI6IjIwMjEtMDMtMjhUMDA6MDA6MDBaIiwiRW5kRGF0ZSI6IjIwMjEtMDMtMzBUMjM6NTk6MDBaIiwiUGVyY2VudGFnZUNvbXBsZXRlIjpudWxsLCJTdHlsZSI6eyIkaWQiOiIzNDUiLCJTaGFwZSI6MywiU2hhcGVUaGlja25lc3MiOjIsIkR1cmF0aW9uRm9ybWF0IjowLCJJbmNsdWRlTm9uV29ya2luZ0RheXNJbkR1cmF0aW9uIjpmYWxzZSwiUGVyY2VudGFnZUNvbXBsZXRlU3R5bGUiOnsiJGlkIjoiMzQ2IiwiRm9udFNldHRpbmdzIjp7IiRpZCI6IjM0NyIsIkZvbnRTaXplIjoxMCwiRm9udE5hbWUiOiJDYWxpYnJpIiwiSXNCb2xkIjpmYWxzZSwiSXNJdGFsaWMiOmZhbHNlLCJJc1VuZGVybGluZWQiOmZhbHNlLCJQYXJlbnRTdHlsZSI6bnVsbH0sIkF1dG9TaXplIjowLCJGb3JlZ3JvdW5kIjp7IiRyZWYiOiI4NiJ9LCJNYXhXaWR0aCI6MjAwLjAsIk1heEhlaWdodCI6IkluZmluaXR5IiwiU21hcnRGb3JlZ3JvdW5kSXNBY3RpdmUiOmZhbHNlLCJIb3Jpem9udGFsQWxpZ25tZW50IjowLCJWZXJ0aWNhbEFsaWdubWVudCI6MCwiU21hcnRGb3JlZ3JvdW5kIjpudWxsLCJCYWNrZ3JvdW5kRmlsbFR5cGUiOjAsIk1hcmdpbiI6eyIkcmVmIjoiODgifSwiUGFkZGluZyI6eyIkcmVmIjoiODkifSwiQmFja2dyb3VuZCI6eyIkcmVmIjoiOTAifSwiSXNWaXNpYmxlIjp0cnVlLCJXaWR0aCI6MC4wLCJIZWlnaHQiOjAuMCwiQm9yZGVyU3R5bGUiOnsiJGlkIjoiMzQ4IiwiTGluZUNvbG9yIjpudWxsLCJMaW5lV2VpZ2h0IjowLjAsIkxpbmVUeXBlIjowLCJQYXJlbnRTdHlsZSI6bnVsbH0sIlBhcmVudFN0eWxlIjpudWxsfSwiRHVyYXRpb25TdHlsZSI6eyIkaWQiOiIzNDkiLCJGb250U2V0dGluZ3MiOnsiJGlkIjoiMzUwIiwiRm9udFNpemUiOjEwLCJGb250TmFtZSI6IkNhbGlicmkiLCJJc0JvbGQiOmZhbHNlLCJJc0l0YWxpYyI6ZmFsc2UsIklzVW5kZXJsaW5lZCI6ZmFsc2UsIlBhcmVudFN0eWxlIjpudWxsfSwiQXV0b1NpemUiOjAsIkZvcmVncm91bmQiOnsiJHJlZiI6IjkzIn0sIk1heFdpZHRoIjoyMDAuMCwiTWF4SGVpZ2h0IjoiSW5maW5pdHkiLCJTbWFydEZvcmVncm91bmRJc0FjdGl2ZSI6ZmFsc2UsIkhvcml6b250YWxBbGlnbm1lbnQiOjAsIlZlcnRpY2FsQWxpZ25tZW50IjowLCJTbWFydEZvcmVncm91bmQiOm51bGwsIkJhY2tncm91bmRGaWxsVHlwZSI6MCwiTWFyZ2luIjp7IiRyZWYiOiI5NSJ9LCJQYWRkaW5nIjp7IiRyZWYiOiI5NiJ9LCJCYWNrZ3JvdW5kIjp7IiRyZWYiOiI5NyJ9LCJJc1Zpc2libGUiOnRydWUsIldpZHRoIjowLjAsIkhlaWdodCI6MC4wLCJCb3JkZXJTdHlsZSI6eyIkaWQiOiIzNTEiLCJMaW5lQ29sb3IiOm51bGwsIkxpbmVXZWlnaHQiOjAuMCwiTGluZVR5cGUiOjAsIlBhcmVudFN0eWxlIjpudWxsfSwiUGFyZW50U3R5bGUiOm51bGx9LCJIb3Jpem9udGFsQ29ubmVjdG9yU3R5bGUiOnsiJGlkIjoiMzUyIiwiTGluZUNvbG9yIjp7IiRyZWYiOiI5OSJ9LCJMaW5lV2VpZ2h0IjoxLjAsIkxpbmVUeXBlIjowLCJQYXJlbnRTdHlsZSI6bnVsbH0sIlZlcnRpY2FsQ29ubmVjdG9yU3R5bGUiOnsiJGlkIjoiMzUzIiwiTGluZUNvbG9yIjp7IiRyZWYiOiIxMDIifSwiTGluZVdlaWdodCI6MS4wLCJMaW5lVHlwZSI6MCwiUGFyZW50U3R5bGUiOm51bGx9LCJNYXJnaW4iOm51bGwsIlN0YXJ0RGF0ZVBvc2l0aW9uIjo0LCJFbmREYXRlUG9zaXRpb24iOjQsIkRhdGVJc1Zpc2libGUiOnRydWUsIlRpdGxlUG9zaXRpb24iOjIsIkR1cmF0aW9uUG9zaXRpb24iOjYsIlBlcmNlbnRhZ2VDb21wbGV0ZWRQb3NpdGlvbiI6NiwiU3BhY2luZyI6NSwiSXNCZWxvd1RpbWViYW5kIjpmYWxzZSwiUGVyY2VudGFnZUNvbXBsZXRlU2hhcGVPcGFjaXR5IjozNSwiU2hhcGVTdHlsZSI6eyIkaWQiOiIzNTQiLCJNYXJnaW4iOnsiJHJlZiI6IjEwNSJ9LCJQYWRkaW5nIjp7IiRyZWYiOiIxMDYifSwiQmFja2dyb3VuZCI6eyIkaWQiOiIzNTUiLCJDb2xvciI6eyIkaWQiOiIzNTYiLCJBIjoyNTUsIlIiOjkxLCJHIjoxNTUsIkIiOjIxM319LCJJc1Zpc2libGUiOnRydWUsIldpZHRoIjowLjAsIkhlaWdodCI6MjIuMCwiQm9yZGVyU3R5bGUiOnsiJGlkIjoiMzU3IiwiTGluZUNvbG9yIjp7IiRyZWYiOiIyMDkifSwiTGluZVdlaWdodCI6MC4wLCJMaW5lVHlwZSI6MCwiUGFyZW50U3R5bGUiOm51bGx9LCJQYXJlbnRTdHlsZSI6bnVsbH0sIlRpdGxlU3R5bGUiOnsiJGlkIjoiMzU4IiwiRm9udFNldHRpbmdzIjp7IiRpZCI6IjM1OSIsIkZvbnRTaXplIjoxMSwiRm9udE5hbWUiOiJDYWxpYnJpIiwiSXNCb2xkIjp0cnVlLCJJc0l0YWxpYyI6ZmFsc2UsIklzVW5kZXJsaW5lZCI6ZmFsc2UsIlBhcmVudFN0eWxlIjpudWxsfSwiQXV0b1NpemUiOjAsIkZvcmVncm91bmQiOnsiJGlkIjoiMzYwIiwiQ29sb3IiOnsiJGlkIjoiMzYxIiwiQSI6MjU1LCJSIjowLCJHIjowLCJCIjowfX0sIk1heFdpZHRoIjo3MjAuMCwiTWF4SGVpZ2h0IjoiSW5maW5pdHkiLCJTbWFydEZvcmVncm91bmRJc0FjdGl2ZSI6ZmFsc2UsIkhvcml6b250YWxBbGlnbm1lbnQiOjEsIlZlcnRpY2FsQWxpZ25tZW50IjowLCJTbWFydEZvcmVncm91bmQiOm51bGwsIkJhY2tncm91bmRGaWxsVHlwZSI6MCwiTWFyZ2luIjp7IiRyZWYiOiIxMTYifSwiUGFkZGluZyI6eyIkcmVmIjoiMTE3In0sIkJhY2tncm91bmQiOnsiJGlkIjoiMzYyIiwiQ29sb3IiOnsiJGlkIjoiMzYzIiwiQSI6MCwiUiI6MjU1LCJHIjoyNTUsIkIiOjI1NX19LCJJc1Zpc2libGUiOnRydWUsIldpZHRoIjowLjAsIkhlaWdodCI6MC4wLCJCb3JkZXJTdHlsZSI6eyIkaWQiOiIzNjQiLCJMaW5lQ29sb3IiOm51bGwsIkxpbmVXZWlnaHQiOjAuMCwiTGluZVR5cGUiOjAsIlBhcmVudFN0eWxlIjpudWxsfSwiUGFyZW50U3R5bGUiOm51bGx9LCJEYXRlU3R5bGUiOnsiJGlkIjoiMzY1IiwiRm9udFNldHRpbmdzIjp7IiRpZCI6IjM2NiIsIkZvbnRTaXplIjoxMCwiRm9udE5hbWUiOiJDYWxpYnJpIiwiSXNCb2xkIjpmYWxzZSwiSXNJdGFsaWMiOmZhbHNlLCJJc1VuZGVybGluZWQiOmZhbHNlLCJQYXJlbnRTdHlsZSI6bnVsbH0sIkF1dG9TaXplIjowLCJGb3JlZ3JvdW5kIjp7IiRpZCI6IjM2NyIsIkNvbG9yIjp7IiRpZCI6IjM2OCIsIkEiOjI1NSwiUiI6NjgsIkciOjg0LCJCIjoxMDZ9fSwiTWF4V2lkdGgiOjIwMC4wLCJNYXhIZWlnaHQiOiJJbmZpbml0eSIsIlNtYXJ0Rm9yZWdyb3VuZElzQWN0aXZlIjpmYWxzZSwiSG9yaXpvbnRhbEFsaWdubWVudCI6MCwiVmVydGljYWxBbGlnbm1lbnQiOjAsIlNtYXJ0Rm9yZWdyb3VuZCI6bnVsbCwiQmFja2dyb3VuZEZpbGxUeXBlIjowLCJNYXJnaW4iOnsiJHJlZiI6IjEyMyJ9LCJQYWRkaW5nIjp7IiRyZWYiOiIxMjQifSwiQmFja2dyb3VuZCI6eyIkaWQiOiIzNjkiLCJDb2xvciI6eyIkaWQiOiIzNzAiLCJBIjowLCJSIjoyNTUsIkciOjI1NSwiQiI6MjU1fX0sIklzVmlzaWJsZSI6dHJ1ZSwiV2lkdGgiOjAuMCwiSGVpZ2h0IjowLjAsIkJvcmRlclN0eWxlIjp7IiRpZCI6IjM3MSIsIkxpbmVDb2xvciI6bnVsbCwiTGluZVdlaWdodCI6MC4wLCJMaW5lVHlwZSI6MCwiUGFyZW50U3R5bGUiOm51bGx9LCJQYXJlbnRTdHlsZSI6bnVsbH0sIkRhdGVGb3JtYXQiOnsiJHJlZiI6IjIyNSJ9LCJXZWVrTnVtYmVyaW5nIjp7IiRpZCI6IjM3MiIsIkZvcm1hdCI6MCwiSXNWaXNpYmxlIjpmYWxzZSwiTGFzdEtub3duVmlzaWJpbGl0eVN0YXRlIjpmYWxzZX0sIklzVmlzaWJsZSI6dHJ1ZSwiUGFyZW50U3R5bGUiOm51bGx9LCJJbmRleCI6NSwiU21hcnREdXJhdGlvbkFjdGl2YXRlZCI6ZmFsc2UsIkRhdGVGb3JtYXQiOnsiJHJlZiI6IjIyNSJ9LCJXZWVrTnVtYmVyaW5nIjp7IiRpZCI6IjM3MyIsIkZvcm1hdCI6MCwiSXNWaXNpYmxlIjpmYWxzZSwiTGFzdEtub3duVmlzaWJpbGl0eVN0YXRlIjpmYWxzZX0sIklkIjoiYzNlODMzNjEtZWM2Ni00NjE1LTg3YjMtNmIxNDBjZTU0OTQ3IiwiSW1wb3J0SWQiOm51bGwsIlRpdGxlIjoiRGV2ZWxvcCBTb2xpZGl0eSBGaWxlcyIsIk5vdGUiOm51bGwsIkh5cGVybGluayI6eyIkaWQiOiIzNzQiLCJBZGRyZXNzIjpudWxsLCJTdWJBZGRyZXNzIjpudWxsfSwiSXNDaGFuZ2VkIjpmYWxzZSwiSXNOZXciOmZhbHNlfSx7IiRpZCI6IjM3NSIsIkdyb3VwTmFtZSI6bnVsbCwiU3RhcnREYXRlIjoiMjAyMS0wMy0yOVQwMDowMDowMFoiLCJFbmREYXRlIjoiMjAyMS0wMy0zMVQyMzo1OTowMFoiLCJQZXJjZW50YWdlQ29tcGxldGUiOm51bGwsIlN0eWxlIjp7IiRpZCI6IjM3NiIsIlNoYXBlIjozLCJTaGFwZVRoaWNrbmVzcyI6MywiRHVyYXRpb25Gb3JtYXQiOjAsIkluY2x1ZGVOb25Xb3JraW5nRGF5c0luRHVyYXRpb24iOmZhbHNlLCJQZXJjZW50YWdlQ29tcGxldGVTdHlsZSI6eyIkaWQiOiIzNzciLCJGb250U2V0dGluZ3MiOnsiJGlkIjoiMzc4IiwiRm9udFNpemUiOjEwLCJGb250TmFtZSI6IkNhbGlicmkiLCJJc0JvbGQiOmZhbHNlLCJJc0l0YWxpYyI6ZmFsc2UsIklzVW5kZXJsaW5lZCI6ZmFsc2UsIlBhcmVudFN0eWxlIjpudWxsfSwiQXV0b1NpemUiOjAsIkZvcmVncm91bmQiOnsiJHJlZiI6Ijg2In0sIk1heFdpZHRoIjoyMDAuMCwiTWF4SGVpZ2h0IjoiSW5maW5pdHkiLCJTbWFydEZvcmVncm91bmRJc0FjdGl2ZSI6ZmFsc2UsIkhvcml6b250YWxBbGlnbm1lbnQiOjAsIlZlcnRpY2FsQWxpZ25tZW50IjowLCJTbWFydEZvcmVncm91bmQiOm51bGwsIkJhY2tncm91bmRGaWxsVHlwZSI6MCwiTWFyZ2luIjp7IiRyZWYiOiI4OCJ9LCJQYWRkaW5nIjp7IiRyZWYiOiI4OSJ9LCJCYWNrZ3JvdW5kIjp7IiRyZWYiOiI5MCJ9LCJJc1Zpc2libGUiOnRydWUsIldpZHRoIjowLjAsIkhlaWdodCI6MC4wLCJCb3JkZXJTdHlsZSI6eyIkaWQiOiIzNzkiLCJMaW5lQ29sb3IiOm51bGwsIkxpbmVXZWlnaHQiOjAuMCwiTGluZVR5cGUiOjAsIlBhcmVudFN0eWxlIjpudWxsfSwiUGFyZW50U3R5bGUiOm51bGx9LCJEdXJhdGlvblN0eWxlIjp7IiRpZCI6IjM4MCIsIkZvbnRTZXR0aW5ncyI6eyIkaWQiOiIzODEiLCJGb250U2l6ZSI6MTAsIkZvbnROYW1lIjoiQ2FsaWJyaSIsIklzQm9sZCI6ZmFsc2UsIklzSXRhbGljIjpmYWxzZSwiSXNVbmRlcmxpbmVkIjpmYWxzZSwiUGFyZW50U3R5bGUiOm51bGx9LCJBdXRvU2l6ZSI6MCwiRm9yZWdyb3VuZCI6eyIkcmVmIjoiOTMifSwiTWF4V2lkdGgiOjIwMC4wLCJNYXhIZWlnaHQiOiJJbmZpbml0eSIsIlNtYXJ0Rm9yZWdyb3VuZElzQWN0aXZlIjpmYWxzZSwiSG9yaXpvbnRhbEFsaWdubWVudCI6MCwiVmVydGljYWxBbGlnbm1lbnQiOjAsIlNtYXJ0Rm9yZWdyb3VuZCI6bnVsbCwiQmFja2dyb3VuZEZpbGxUeXBlIjowLCJNYXJnaW4iOnsiJHJlZiI6Ijk1In0sIlBhZGRpbmciOnsiJHJlZiI6Ijk2In0sIkJhY2tncm91bmQiOnsiJHJlZiI6Ijk3In0sIklzVmlzaWJsZSI6dHJ1ZSwiV2lkdGgiOjAuMCwiSGVpZ2h0IjowLjAsIkJvcmRlclN0eWxlIjp7IiRpZCI6IjM4MiIsIkxpbmVDb2xvciI6bnVsbCwiTGluZVdlaWdodCI6MC4wLCJMaW5lVHlwZSI6MCwiUGFyZW50U3R5bGUiOm51bGx9LCJQYXJlbnRTdHlsZSI6bnVsbH0sIkhvcml6b250YWxDb25uZWN0b3JTdHlsZSI6eyIkaWQiOiIzODMiLCJMaW5lQ29sb3IiOnsiJHJlZiI6Ijk5In0sIkxpbmVXZWlnaHQiOjEuMCwiTGluZVR5cGUiOjAsIlBhcmVudFN0eWxlIjpudWxsfSwiVmVydGljYWxDb25uZWN0b3JTdHlsZSI6eyIkaWQiOiIzODQiLCJMaW5lQ29sb3IiOnsiJGlkIjoiMzg1IiwiJHR5cGUiOiJOTFJFLkNvbW1vbi5Eb20uU29saWRDb2xvckJydXNoLCBOTFJFLkNvbW1vbiIsIkNvbG9yIjp7IiRpZCI6IjM4NiIsIkEiOjI1NSwiUiI6OTEsIkciOjE1NSwiQiI6MjEzfX0sIkxpbmVXZWlnaHQiOjAuODMzMzMzMywiTGluZVR5cGUiOjAsIlBhcmVudFN0eWxlIjpudWxsfSwiTWFyZ2luIjpudWxsLCJTdGFydERhdGVQb3NpdGlvbiI6NCwiRW5kRGF0ZVBvc2l0aW9uIjo0LCJEYXRlSXNWaXNpYmxlIjp0cnVlLCJUaXRsZVBvc2l0aW9uIjoyLCJEdXJhdGlvblBvc2l0aW9uIjo2LCJQZXJjZW50YWdlQ29tcGxldGVkUG9zaXRpb24iOjYsIlNwYWNpbmciOjUsIklzQmVsb3dUaW1lYmFuZCI6ZmFsc2UsIlBlcmNlbnRhZ2VDb21wbGV0ZVNoYXBlT3BhY2l0eSI6MzUsIlNoYXBlU3R5bGUiOnsiJGlkIjoiMzg3IiwiTWFyZ2luIjp7IiRyZWYiOiIxMDUifSwiUGFkZGluZyI6eyIkcmVmIjoiMTA2In0sIkJhY2tncm91bmQiOnsiJGlkIjoiMzg4IiwiQ29sb3IiOnsiJGlkIjoiMzg5IiwiQSI6MjU1LCJSIjo5MSwiRyI6MTU1LCJCIjoyMTN9fSwiSXNWaXNpYmxlIjp0cnVlLCJXaWR0aCI6MzE1LjEyOTc2MDc0MjE4NzUsIkhlaWdodCI6MjMuMzg5MjExNjU0NjYzMDg2LCJCb3JkZXJTdHlsZSI6eyIkaWQiOiIzOTAiLCJMaW5lQ29sb3IiOnsiJHJlZiI6IjIwOSJ9LCJMaW5lV2VpZ2h0IjowLjAsIkxpbmVUeXBlIjowLCJQYXJlbnRTdHlsZSI6bnVsbH0sIlBhcmVudFN0eWxlIjpudWxsfSwiVGl0bGVTdHlsZSI6eyIkaWQiOiIzOTEiLCJGb250U2V0dGluZ3MiOnsiJGlkIjoiMzkyIiwiRm9udFNpemUiOjExLCJGb250TmFtZSI6IkNhbGlicmkiLCJJc0JvbGQiOnRydWUsIklzSXRhbGljIjpmYWxzZSwiSXNVbmRlcmxpbmVkIjpmYWxzZSwiUGFyZW50U3R5bGUiOm51bGx9LCJBdXRvU2l6ZSI6MCwiRm9yZWdyb3VuZCI6eyIkaWQiOiIzOTMiLCJDb2xvciI6eyIkaWQiOiIzOTQiLCJBIjoyNTUsIlIiOjAsIkciOjAsIkIiOjB9fSwiTWF4V2lkdGgiOjcyMC4wLCJNYXhIZWlnaHQiOiJJbmZpbml0eSIsIlNtYXJ0Rm9yZWdyb3VuZElzQWN0aXZlIjpmYWxzZSwiSG9yaXpvbnRhbEFsaWdubWVudCI6MSwiVmVydGljYWxBbGlnbm1lbnQiOjAsIlNtYXJ0Rm9yZWdyb3VuZCI6bnVsbCwiQmFja2dyb3VuZEZpbGxUeXBlIjowLCJNYXJnaW4iOnsiJHJlZiI6IjExNiJ9LCJQYWRkaW5nIjp7IiRyZWYiOiIxMTcifSwiQmFja2dyb3VuZCI6eyIkaWQiOiIzOTUiLCJDb2xvciI6eyIkaWQiOiIzOTYiLCJBIjowLCJSIjoyNTUsIkciOjI1NSwiQiI6MjU1fX0sIklzVmlzaWJsZSI6dHJ1ZSwiV2lkdGgiOjAuMCwiSGVpZ2h0IjowLjAsIkJvcmRlclN0eWxlIjp7IiRpZCI6IjM5NyIsIkxpbmVDb2xvciI6bnVsbCwiTGluZVdlaWdodCI6MC4wLCJMaW5lVHlwZSI6MCwiUGFyZW50U3R5bGUiOm51bGx9LCJQYXJlbnRTdHlsZSI6bnVsbH0sIkRhdGVTdHlsZSI6eyIkaWQiOiIzOTgiLCJGb250U2V0dGluZ3MiOnsiJGlkIjoiMzk5IiwiRm9udFNpemUiOjEwLCJGb250TmFtZSI6IkNhbGlicmkiLCJJc0JvbGQiOmZhbHNlLCJJc0l0YWxpYyI6ZmFsc2UsIklzVW5kZXJsaW5lZCI6ZmFsc2UsIlBhcmVudFN0eWxlIjpudWxsfSwiQXV0b1NpemUiOjAsIkZvcmVncm91bmQiOnsiJGlkIjoiNDAwIiwiQ29sb3IiOnsiJGlkIjoiNDAxIiwiQSI6MjU1LCJSIjo2OCwiRyI6ODQsIkIiOjEwNn19LCJNYXhXaWR0aCI6MjAwLjAsIk1heEhlaWdodCI6IkluZmluaXR5IiwiU21hcnRGb3JlZ3JvdW5kSXNBY3RpdmUiOmZhbHNlLCJIb3Jpem9udGFsQWxpZ25tZW50IjowLCJWZXJ0aWNhbEFsaWdubWVudCI6MCwiU21hcnRGb3JlZ3JvdW5kIjpudWxsLCJCYWNrZ3JvdW5kRmlsbFR5cGUiOjAsIk1hcmdpbiI6eyIkcmVmIjoiMTIzIn0sIlBhZGRpbmciOnsiJHJlZiI6IjEyNCJ9LCJCYWNrZ3JvdW5kIjp7IiRpZCI6IjQwMiIsIkNvbG9yIjp7IiRpZCI6IjQwMyIsIkEiOjAsIlIiOjI1NSwiRyI6MjU1LCJCIjoyNTV9fSwiSXNWaXNpYmxlIjp0cnVlLCJXaWR0aCI6MC4wLCJIZWlnaHQiOjAuMCwiQm9yZGVyU3R5bGUiOnsiJGlkIjoiNDA0IiwiTGluZUNvbG9yIjpudWxsLCJMaW5lV2VpZ2h0IjowLjAsIkxpbmVUeXBlIjowLCJQYXJlbnRTdHlsZSI6bnVsbH0sIlBhcmVudFN0eWxlIjpudWxsfSwiRGF0ZUZvcm1hdCI6eyIkcmVmIjoiMjI1In0sIldlZWtOdW1iZXJpbmciOnsiJGlkIjoiNDA1IiwiRm9ybWF0IjowLCJJc1Zpc2libGUiOmZhbHNlLCJMYXN0S25vd25WaXNpYmlsaXR5U3RhdGUiOmZhbHNlfSwiSXNWaXNpYmxlIjp0cnVlLCJQYXJlbnRTdHlsZSI6bnVsbH0sIkluZGV4Ijo2LCJTbWFydER1cmF0aW9uQWN0aXZhdGVkIjpmYWxzZSwiRGF0ZUZvcm1hdCI6eyIkcmVmIjoiMjI1In0sIldlZWtOdW1iZXJpbmciOnsiJGlkIjoiNDA2IiwiRm9ybWF0IjowLCJJc1Zpc2libGUiOmZhbHNlLCJMYXN0S25vd25WaXNpYmlsaXR5U3RhdGUiOmZhbHNlfSwiSWQiOiI1ZmEwYTJkZS00MTQyLTQ3MzQtODQ4ZC0wYjRhNmZiZmY3NDgiLCJJbXBvcnRJZCI6bnVsbCwiVGl0bGUiOiJEZXZlbG9wIFVzZXIgSW50ZXJmYWNlIiwiTm90ZSI6bnVsbCwiSHlwZXJsaW5rIjp7IiRpZCI6IjQwNyIsIkFkZHJlc3MiOm51bGwsIlN1YkFkZHJlc3MiOm51bGx9LCJJc0NoYW5nZWQiOmZhbHNlLCJJc05ldyI6ZmFsc2V9LHsiJGlkIjoiNDA4IiwiR3JvdXBOYW1lIjpudWxsLCJTdGFydERhdGUiOiIyMDIxLTAzLTMwVDAwOjAwOjAwWiIsIkVuZERhdGUiOiIyMDIxLTA0LTAxVDIzOjU5OjAwWiIsIlBlcmNlbnRhZ2VDb21wbGV0ZSI6bnVsbCwiU3R5bGUiOnsiJGlkIjoiNDA5IiwiU2hhcGUiOjMsIlNoYXBlVGhpY2tuZXNzIjoyLCJEdXJhdGlvbkZvcm1hdCI6MCwiSW5jbHVkZU5vbldvcmtpbmdEYXlzSW5EdXJhdGlvbiI6ZmFsc2UsIlBlcmNlbnRhZ2VDb21wbGV0ZVN0eWxlIjp7IiRpZCI6IjQxMCIsIkZvbnRTZXR0aW5ncyI6eyIkaWQiOiI0MTEiLCJGb250U2l6ZSI6MTAsIkZvbnROYW1lIjoiQ2FsaWJyaSIsIklzQm9sZCI6ZmFsc2UsIklzSXRhbGljIjpmYWxzZSwiSXNVbmRlcmxpbmVkIjpmYWxzZSwiUGFyZW50U3R5bGUiOm51bGx9LCJBdXRvU2l6ZSI6MCwiRm9yZWdyb3VuZCI6eyIkcmVmIjoiODYifSwiTWF4V2lkdGgiOjIwMC4wLCJNYXhIZWlnaHQiOiJJbmZpbml0eSIsIlNtYXJ0Rm9yZWdyb3VuZElzQWN0aXZlIjpmYWxzZSwiSG9yaXpvbnRhbEFsaWdubWVudCI6MCwiVmVydGljYWxBbGlnbm1lbnQiOjAsIlNtYXJ0Rm9yZWdyb3VuZCI6bnVsbCwiQmFja2dyb3VuZEZpbGxUeXBlIjowLCJNYXJnaW4iOnsiJHJlZiI6Ijg4In0sIlBhZGRpbmciOnsiJHJlZiI6Ijg5In0sIkJhY2tncm91bmQiOnsiJHJlZiI6IjkwIn0sIklzVmlzaWJsZSI6dHJ1ZSwiV2lkdGgiOjAuMCwiSGVpZ2h0IjowLjAsIkJvcmRlclN0eWxlIjp7IiRpZCI6IjQxMiIsIkxpbmVDb2xvciI6bnVsbCwiTGluZVdlaWdodCI6MC4wLCJMaW5lVHlwZSI6MCwiUGFyZW50U3R5bGUiOm51bGx9LCJQYXJlbnRTdHlsZSI6bnVsbH0sIkR1cmF0aW9uU3R5bGUiOnsiJGlkIjoiNDEzIiwiRm9udFNldHRpbmdzIjp7IiRpZCI6IjQxNCIsIkZvbnRTaXplIjoxMCwiRm9udE5hbWUiOiJDYWxpYnJpIiwiSXNCb2xkIjpmYWxzZSwiSXNJdGFsaWMiOmZhbHNlLCJJc1VuZGVybGluZWQiOmZhbHNlLCJQYXJlbnRTdHlsZSI6bnVsbH0sIkF1dG9TaXplIjowLCJGb3JlZ3JvdW5kIjp7IiRyZWYiOiI5MyJ9LCJNYXhXaWR0aCI6MjAwLjAsIk1heEhlaWdodCI6IkluZmluaXR5IiwiU21hcnRGb3JlZ3JvdW5kSXNBY3RpdmUiOmZhbHNlLCJIb3Jpem9udGFsQWxpZ25tZW50IjowLCJWZXJ0aWNhbEFsaWdubWVudCI6MCwiU21hcnRGb3JlZ3JvdW5kIjpudWxsLCJCYWNrZ3JvdW5kRmlsbFR5cGUiOjAsIk1hcmdpbiI6eyIkcmVmIjoiOTUifSwiUGFkZGluZyI6eyIkcmVmIjoiOTYifSwiQmFja2dyb3VuZCI6eyIkcmVmIjoiOTcifSwiSXNWaXNpYmxlIjp0cnVlLCJXaWR0aCI6MC4wLCJIZWlnaHQiOjAuMCwiQm9yZGVyU3R5bGUiOnsiJGlkIjoiNDE1IiwiTGluZUNvbG9yIjpudWxsLCJMaW5lV2VpZ2h0IjowLjAsIkxpbmVUeXBlIjowLCJQYXJlbnRTdHlsZSI6bnVsbH0sIlBhcmVudFN0eWxlIjpudWxsfSwiSG9yaXpvbnRhbENvbm5lY3RvclN0eWxlIjp7IiRpZCI6IjQxNiIsIkxpbmVDb2xvciI6eyIkcmVmIjoiOTkifSwiTGluZVdlaWdodCI6MS4wLCJMaW5lVHlwZSI6MCwiUGFyZW50U3R5bGUiOm51bGx9LCJWZXJ0aWNhbENvbm5lY3RvclN0eWxlIjp7IiRpZCI6IjQxNyIsIkxpbmVDb2xvciI6eyIkcmVmIjoiMTAyIn0sIkxpbmVXZWlnaHQiOjEuMCwiTGluZVR5cGUiOjAsIlBhcmVudFN0eWxlIjpudWxsfSwiTWFyZ2luIjpudWxsLCJTdGFydERhdGVQb3NpdGlvbiI6NCwiRW5kRGF0ZVBvc2l0aW9uIjo0LCJEYXRlSXNWaXNpYmxlIjp0cnVlLCJUaXRsZVBvc2l0aW9uIjoyLCJEdXJhdGlvblBvc2l0aW9uIjo2LCJQZXJjZW50YWdlQ29tcGxldGVkUG9zaXRpb24iOjYsIlNwYWNpbmciOjUsIklzQmVsb3dUaW1lYmFuZCI6ZmFsc2UsIlBlcmNlbnRhZ2VDb21wbGV0ZVNoYXBlT3BhY2l0eSI6MzUsIlNoYXBlU3R5bGUiOnsiJGlkIjoiNDE4IiwiTWFyZ2luIjp7IiRyZWYiOiIxMDUifSwiUGFkZGluZyI6eyIkcmVmIjoiMTA2In0sIkJhY2tncm91bmQiOnsiJGlkIjoiNDE5IiwiQ29sb3IiOnsiJGlkIjoiNDIwIiwiQSI6MjU1LCJSIjo5MSwiRyI6MTU1LCJCIjoyMTN9fSwiSXNWaXNpYmxlIjp0cnVlLCJXaWR0aCI6MC4wLCJIZWlnaHQiOjIyLjAsIkJvcmRlclN0eWxlIjp7IiRpZCI6IjQyMSIsIkxpbmVDb2xvciI6eyIkcmVmIjoiMjA5In0sIkxpbmVXZWlnaHQiOjAuMCwiTGluZVR5cGUiOjAsIlBhcmVudFN0eWxlIjpudWxsfSwiUGFyZW50U3R5bGUiOm51bGx9LCJUaXRsZVN0eWxlIjp7IiRpZCI6IjQyMiIsIkZvbnRTZXR0aW5ncyI6eyIkaWQiOiI0MjMiLCJGb250U2l6ZSI6MTEsIkZvbnROYW1lIjoiQ2FsaWJyaSIsIklzQm9sZCI6dHJ1ZSwiSXNJdGFsaWMiOmZhbHNlLCJJc1VuZGVybGluZWQiOmZhbHNlLCJQYXJlbnRTdHlsZSI6bnVsbH0sIkF1dG9TaXplIjowLCJGb3JlZ3JvdW5kIjp7IiRpZCI6IjQyNCIsIkNvbG9yIjp7IiRpZCI6IjQyNSIsIkEiOjI1NSwiUiI6MCwiRyI6MCwiQiI6MH19LCJNYXhXaWR0aCI6NzIwLjAsIk1heEhlaWdodCI6IkluZmluaXR5IiwiU21hcnRGb3JlZ3JvdW5kSXNBY3RpdmUiOmZhbHNlLCJIb3Jpem9udGFsQWxpZ25tZW50IjoxLCJWZXJ0aWNhbEFsaWdubWVudCI6MCwiU21hcnRGb3JlZ3JvdW5kIjpudWxsLCJCYWNrZ3JvdW5kRmlsbFR5cGUiOjAsIk1hcmdpbiI6eyIkcmVmIjoiMTE2In0sIlBhZGRpbmciOnsiJHJlZiI6IjExNyJ9LCJCYWNrZ3JvdW5kIjp7IiRpZCI6IjQyNiIsIkNvbG9yIjp7IiRpZCI6IjQyNyIsIkEiOjAsIlIiOjI1NSwiRyI6MjU1LCJCIjoyNTV9fSwiSXNWaXNpYmxlIjp0cnVlLCJXaWR0aCI6MC4wLCJIZWlnaHQiOjAuMCwiQm9yZGVyU3R5bGUiOnsiJGlkIjoiNDI4IiwiTGluZUNvbG9yIjpudWxsLCJMaW5lV2VpZ2h0IjowLjAsIkxpbmVUeXBlIjowLCJQYXJlbnRTdHlsZSI6bnVsbH0sIlBhcmVudFN0eWxlIjpudWxsfSwiRGF0ZVN0eWxlIjp7IiRpZCI6IjQyOSIsIkZvbnRTZXR0aW5ncyI6eyIkaWQiOiI0MzAiLCJGb250U2l6ZSI6MTAsIkZvbnROYW1lIjoiQ2FsaWJyaSIsIklzQm9sZCI6ZmFsc2UsIklzSXRhbGljIjpmYWxzZSwiSXNVbmRlcmxpbmVkIjpmYWxzZSwiUGFyZW50U3R5bGUiOm51bGx9LCJBdXRvU2l6ZSI6MCwiRm9yZWdyb3VuZCI6eyIkaWQiOiI0MzEiLCJDb2xvciI6eyIkaWQiOiI0MzIiLCJBIjoyNTUsIlIiOjY4LCJHIjo4NCwiQiI6MTA2fX0sIk1heFdpZHRoIjoyMDAuMCwiTWF4SGVpZ2h0IjoiSW5maW5pdHkiLCJTbWFydEZvcmVncm91bmRJc0FjdGl2ZSI6ZmFsc2UsIkhvcml6b250YWxBbGlnbm1lbnQiOjAsIlZlcnRpY2FsQWxpZ25tZW50IjowLCJTbWFydEZvcmVncm91bmQiOm51bGwsIkJhY2tncm91bmRGaWxsVHlwZSI6MCwiTWFyZ2luIjp7IiRyZWYiOiIxMjMifSwiUGFkZGluZyI6eyIkcmVmIjoiMTI0In0sIkJhY2tncm91bmQiOnsiJGlkIjoiNDMzIiwiQ29sb3IiOnsiJGlkIjoiNDM0IiwiQSI6MCwiUiI6MjU1LCJHIjoyNTUsIkIiOjI1NX19LCJJc1Zpc2libGUiOnRydWUsIldpZHRoIjowLjAsIkhlaWdodCI6MC4wLCJCb3JkZXJTdHlsZSI6eyIkaWQiOiI0MzUiLCJMaW5lQ29sb3IiOm51bGwsIkxpbmVXZWlnaHQiOjAuMCwiTGluZVR5cGUiOjAsIlBhcmVudFN0eWxlIjpudWxsfSwiUGFyZW50U3R5bGUiOm51bGx9LCJEYXRlRm9ybWF0Ijp7IiRyZWYiOiIyMjUifSwiV2Vla051bWJlcmluZyI6eyIkaWQiOiI0MzYiLCJGb3JtYXQiOjAsIklzVmlzaWJsZSI6ZmFsc2UsIkxhc3RLbm93blZpc2liaWxpdHlTdGF0ZSI6ZmFsc2V9LCJJc1Zpc2libGUiOnRydWUsIlBhcmVudFN0eWxlIjpudWxsfSwiSW5kZXgiOjcsIlNtYXJ0RHVyYXRpb25BY3RpdmF0ZWQiOmZhbHNlLCJEYXRlRm9ybWF0Ijp7IiRyZWYiOiIyMjUifSwiV2Vla051bWJlcmluZyI6eyIkaWQiOiI0MzciLCJGb3JtYXQiOjAsIklzVmlzaWJsZSI6ZmFsc2UsIkxhc3RLbm93blZpc2liaWxpdHlTdGF0ZSI6ZmFsc2V9LCJJZCI6ImU1OTU4ZWVmLTIxOWEtNDc0OC05OTBkLTNmMWY1ZDNkYzM5MiIsIkltcG9ydElkIjpudWxsLCJUaXRsZSI6IkludGVncmF0aW9uIiwiTm90ZSI6bnVsbCwiSHlwZXJsaW5rIjp7IiRpZCI6IjQzOCIsIkFkZHJlc3MiOm51bGwsIlN1YkFkZHJlc3MiOm51bGx9LCJJc0NoYW5nZWQiOmZhbHNlLCJJc05ldyI6ZmFsc2V9LHsiJGlkIjoiNDM5IiwiR3JvdXBOYW1lIjpudWxsLCJTdGFydERhdGUiOiIyMDIxLTA0LTAxVDAwOjAwOjAwWiIsIkVuZERhdGUiOiIyMDIxLTA0LTAyVDIzOjU5OjAwWiIsIlBlcmNlbnRhZ2VDb21wbGV0ZSI6bnVsbCwiU3R5bGUiOnsiJGlkIjoiNDQwIiwiU2hhcGUiOjMsIlNoYXBlVGhpY2tuZXNzIjoyLCJEdXJhdGlvbkZvcm1hdCI6MCwiSW5jbHVkZU5vbldvcmtpbmdEYXlzSW5EdXJhdGlvbiI6ZmFsc2UsIlBlcmNlbnRhZ2VDb21wbGV0ZVN0eWxlIjp7IiRpZCI6IjQ0MSIsIkZvbnRTZXR0aW5ncyI6eyIkaWQiOiI0NDIiLCJGb250U2l6ZSI6MTAsIkZvbnROYW1lIjoiQ2FsaWJyaSIsIklzQm9sZCI6ZmFsc2UsIklzSXRhbGljIjpmYWxzZSwiSXNVbmRlcmxpbmVkIjpmYWxzZSwiUGFyZW50U3R5bGUiOm51bGx9LCJBdXRvU2l6ZSI6MCwiRm9yZWdyb3VuZCI6eyIkcmVmIjoiODYifSwiTWF4V2lkdGgiOjIwMC4wLCJNYXhIZWlnaHQiOiJJbmZpbml0eSIsIlNtYXJ0Rm9yZWdyb3VuZElzQWN0aXZlIjpmYWxzZSwiSG9yaXpvbnRhbEFsaWdubWVudCI6MCwiVmVydGljYWxBbGlnbm1lbnQiOjAsIlNtYXJ0Rm9yZWdyb3VuZCI6bnVsbCwiQmFja2dyb3VuZEZpbGxUeXBlIjowLCJNYXJnaW4iOnsiJHJlZiI6Ijg4In0sIlBhZGRpbmciOnsiJHJlZiI6Ijg5In0sIkJhY2tncm91bmQiOnsiJHJlZiI6IjkwIn0sIklzVmlzaWJsZSI6dHJ1ZSwiV2lkdGgiOjAuMCwiSGVpZ2h0IjowLjAsIkJvcmRlclN0eWxlIjp7IiRpZCI6IjQ0MyIsIkxpbmVDb2xvciI6bnVsbCwiTGluZVdlaWdodCI6MC4wLCJMaW5lVHlwZSI6MCwiUGFyZW50U3R5bGUiOm51bGx9LCJQYXJlbnRTdHlsZSI6bnVsbH0sIkR1cmF0aW9uU3R5bGUiOnsiJGlkIjoiNDQ0IiwiRm9udFNldHRpbmdzIjp7IiRpZCI6IjQ0NSIsIkZvbnRTaXplIjoxMCwiRm9udE5hbWUiOiJDYWxpYnJpIiwiSXNCb2xkIjpmYWxzZSwiSXNJdGFsaWMiOmZhbHNlLCJJc1VuZGVybGluZWQiOmZhbHNlLCJQYXJlbnRTdHlsZSI6bnVsbH0sIkF1dG9TaXplIjowLCJGb3JlZ3JvdW5kIjp7IiRyZWYiOiI5MyJ9LCJNYXhXaWR0aCI6MjAwLjAsIk1heEhlaWdodCI6IkluZmluaXR5IiwiU21hcnRGb3JlZ3JvdW5kSXNBY3RpdmUiOmZhbHNlLCJIb3Jpem9udGFsQWxpZ25tZW50IjowLCJWZXJ0aWNhbEFsaWdubWVudCI6MCwiU21hcnRGb3JlZ3JvdW5kIjpudWxsLCJCYWNrZ3JvdW5kRmlsbFR5cGUiOjAsIk1hcmdpbiI6eyIkcmVmIjoiOTUifSwiUGFkZGluZyI6eyIkcmVmIjoiOTYifSwiQmFja2dyb3VuZCI6eyIkcmVmIjoiOTcifSwiSXNWaXNpYmxlIjp0cnVlLCJXaWR0aCI6MC4wLCJIZWlnaHQiOjAuMCwiQm9yZGVyU3R5bGUiOnsiJGlkIjoiNDQ2IiwiTGluZUNvbG9yIjpudWxsLCJMaW5lV2VpZ2h0IjowLjAsIkxpbmVUeXBlIjowLCJQYXJlbnRTdHlsZSI6bnVsbH0sIlBhcmVudFN0eWxlIjpudWxsfSwiSG9yaXpvbnRhbENvbm5lY3RvclN0eWxlIjp7IiRpZCI6IjQ0NyIsIkxpbmVDb2xvciI6eyIkcmVmIjoiOTkifSwiTGluZVdlaWdodCI6MS4wLCJMaW5lVHlwZSI6MCwiUGFyZW50U3R5bGUiOm51bGx9LCJWZXJ0aWNhbENvbm5lY3RvclN0eWxlIjp7IiRpZCI6IjQ0OCIsIkxpbmVDb2xvciI6eyIkcmVmIjoiMTAyIn0sIkxpbmVXZWlnaHQiOjEuMCwiTGluZVR5cGUiOjAsIlBhcmVudFN0eWxlIjpudWxsfSwiTWFyZ2luIjpudWxsLCJTdGFydERhdGVQb3NpdGlvbiI6NCwiRW5kRGF0ZVBvc2l0aW9uIjo0LCJEYXRlSXNWaXNpYmxlIjp0cnVlLCJUaXRsZVBvc2l0aW9uIjoyLCJEdXJhdGlvblBvc2l0aW9uIjo2LCJQZXJjZW50YWdlQ29tcGxldGVkUG9zaXRpb24iOjYsIlNwYWNpbmciOjUsIklzQmVsb3dUaW1lYmFuZCI6ZmFsc2UsIlBlcmNlbnRhZ2VDb21wbGV0ZVNoYXBlT3BhY2l0eSI6MzUsIlNoYXBlU3R5bGUiOnsiJGlkIjoiNDQ5IiwiTWFyZ2luIjp7IiRyZWYiOiIxMDUifSwiUGFkZGluZyI6eyIkcmVmIjoiMTA2In0sIkJhY2tncm91bmQiOnsiJGlkIjoiNDUwIiwiQ29sb3IiOnsiJGlkIjoiNDUxIiwiQSI6MjU1LCJSIjo5MSwiRyI6MTU1LCJCIjoyMTN9fSwiSXNWaXNpYmxlIjp0cnVlLCJXaWR0aCI6MC4wLCJIZWlnaHQiOjIyLjAsIkJvcmRlclN0eWxlIjp7IiRpZCI6IjQ1MiIsIkxpbmVDb2xvciI6eyIkcmVmIjoiMjA5In0sIkxpbmVXZWlnaHQiOjAuMCwiTGluZVR5cGUiOjAsIlBhcmVudFN0eWxlIjpudWxsfSwiUGFyZW50U3R5bGUiOm51bGx9LCJUaXRsZVN0eWxlIjp7IiRpZCI6IjQ1MyIsIkZvbnRTZXR0aW5ncyI6eyIkaWQiOiI0NTQiLCJGb250U2l6ZSI6MTEsIkZvbnROYW1lIjoiQ2FsaWJyaSIsIklzQm9sZCI6dHJ1ZSwiSXNJdGFsaWMiOmZhbHNlLCJJc1VuZGVybGluZWQiOmZhbHNlLCJQYXJlbnRTdHlsZSI6bnVsbH0sIkF1dG9TaXplIjowLCJGb3JlZ3JvdW5kIjp7IiRpZCI6IjQ1NSIsIkNvbG9yIjp7IiRpZCI6IjQ1NiIsIkEiOjI1NSwiUiI6MCwiRyI6MCwiQiI6MH19LCJNYXhXaWR0aCI6NzIwLjAsIk1heEhlaWdodCI6IkluZmluaXR5IiwiU21hcnRGb3JlZ3JvdW5kSXNBY3RpdmUiOmZhbHNlLCJIb3Jpem9udGFsQWxpZ25tZW50IjoxLCJWZXJ0aWNhbEFsaWdubWVudCI6MCwiU21hcnRGb3JlZ3JvdW5kIjpudWxsLCJCYWNrZ3JvdW5kRmlsbFR5cGUiOjAsIk1hcmdpbiI6eyIkcmVmIjoiMTE2In0sIlBhZGRpbmciOnsiJHJlZiI6IjExNyJ9LCJCYWNrZ3JvdW5kIjp7IiRpZCI6IjQ1NyIsIkNvbG9yIjp7IiRpZCI6IjQ1OCIsIkEiOjAsIlIiOjI1NSwiRyI6MjU1LCJCIjoyNTV9fSwiSXNWaXNpYmxlIjp0cnVlLCJXaWR0aCI6MC4wLCJIZWlnaHQiOjAuMCwiQm9yZGVyU3R5bGUiOnsiJGlkIjoiNDU5IiwiTGluZUNvbG9yIjpudWxsLCJMaW5lV2VpZ2h0IjowLjAsIkxpbmVUeXBlIjowLCJQYXJlbnRTdHlsZSI6bnVsbH0sIlBhcmVudFN0eWxlIjpudWxsfSwiRGF0ZVN0eWxlIjp7IiRpZCI6IjQ2MCIsIkZvbnRTZXR0aW5ncyI6eyIkaWQiOiI0NjEiLCJGb250U2l6ZSI6MTAsIkZvbnROYW1lIjoiQ2FsaWJyaSIsIklzQm9sZCI6ZmFsc2UsIklzSXRhbGljIjpmYWxzZSwiSXNVbmRlcmxpbmVkIjpmYWxzZSwiUGFyZW50U3R5bGUiOm51bGx9LCJBdXRvU2l6ZSI6MCwiRm9yZWdyb3VuZCI6eyIkaWQiOiI0NjIiLCJDb2xvciI6eyIkaWQiOiI0NjMiLCJBIjoyNTUsIlIiOjY4LCJHIjo4NCwiQiI6MTA2fX0sIk1heFdpZHRoIjoyMDAuMCwiTWF4SGVpZ2h0IjoiSW5maW5pdHkiLCJTbWFydEZvcmVncm91bmRJc0FjdGl2ZSI6ZmFsc2UsIkhvcml6b250YWxBbGlnbm1lbnQiOjAsIlZlcnRpY2FsQWxpZ25tZW50IjowLCJTbWFydEZvcmVncm91bmQiOm51bGwsIkJhY2tncm91bmRGaWxsVHlwZSI6MCwiTWFyZ2luIjp7IiRyZWYiOiIxMjMifSwiUGFkZGluZyI6eyIkcmVmIjoiMTI0In0sIkJhY2tncm91bmQiOnsiJGlkIjoiNDY0IiwiQ29sb3IiOnsiJGlkIjoiNDY1IiwiQSI6MCwiUiI6MjU1LCJHIjoyNTUsIkIiOjI1NX19LCJJc1Zpc2libGUiOnRydWUsIldpZHRoIjowLjAsIkhlaWdodCI6MC4wLCJCb3JkZXJTdHlsZSI6eyIkaWQiOiI0NjYiLCJMaW5lQ29sb3IiOm51bGwsIkxpbmVXZWlnaHQiOjAuMCwiTGluZVR5cGUiOjAsIlBhcmVudFN0eWxlIjpudWxsfSwiUGFyZW50U3R5bGUiOm51bGx9LCJEYXRlRm9ybWF0Ijp7IiRyZWYiOiIyMjUifSwiV2Vla051bWJlcmluZyI6eyIkaWQiOiI0NjciLCJGb3JtYXQiOjAsIklzVmlzaWJsZSI6ZmFsc2UsIkxhc3RLbm93blZpc2liaWxpdHlTdGF0ZSI6ZmFsc2V9LCJJc1Zpc2libGUiOnRydWUsIlBhcmVudFN0eWxlIjpudWxsfSwiSW5kZXgiOjgsIlNtYXJ0RHVyYXRpb25BY3RpdmF0ZWQiOmZhbHNlLCJEYXRlRm9ybWF0Ijp7IiRyZWYiOiIyMjUifSwiV2Vla051bWJlcmluZyI6eyIkaWQiOiI0NjgiLCJGb3JtYXQiOjAsIklzVmlzaWJsZSI6ZmFsc2UsIkxhc3RLbm93blZpc2liaWxpdHlTdGF0ZSI6ZmFsc2V9LCJJZCI6ImNkNDRiM2RkLWViMWUtNDhmNy05MDJjLTA0Y2FjMzhkNmY0MyIsIkltcG9ydElkIjpudWxsLCJUaXRsZSI6IlRlc3RpbmciLCJOb3RlIjpudWxsLCJIeXBlcmxpbmsiOnsiJGlkIjoiNDY5IiwiQWRkcmVzcyI6bnVsbCwiU3ViQWRkcmVzcyI6bnVsbH0sIklzQ2hhbmdlZCI6ZmFsc2UsIklzTmV3IjpmYWxzZX0seyIkaWQiOiI0NzAiLCJHcm91cE5hbWUiOm51bGwsIlN0YXJ0RGF0ZSI6IjIwMjEtMDQtMDNUMDA6MDA6MDBaIiwiRW5kRGF0ZSI6IjIwMjEtMDQtMDNUMjM6NTk6MDBaIiwiUGVyY2VudGFnZUNvbXBsZXRlIjpudWxsLCJTdHlsZSI6eyIkaWQiOiI0NzEiLCJTaGFwZSI6MywiU2hhcGVUaGlja25lc3MiOjIsIkR1cmF0aW9uRm9ybWF0IjowLCJJbmNsdWRlTm9uV29ya2luZ0RheXNJbkR1cmF0aW9uIjpmYWxzZSwiUGVyY2VudGFnZUNvbXBsZXRlU3R5bGUiOnsiJGlkIjoiNDcyIiwiRm9udFNldHRpbmdzIjp7IiRpZCI6IjQ3MyIsIkZvbnRTaXplIjoxMCwiRm9udE5hbWUiOiJDYWxpYnJpIiwiSXNCb2xkIjpmYWxzZSwiSXNJdGFsaWMiOmZhbHNlLCJJc1VuZGVybGluZWQiOmZhbHNlLCJQYXJlbnRTdHlsZSI6bnVsbH0sIkF1dG9TaXplIjowLCJGb3JlZ3JvdW5kIjp7IiRyZWYiOiI4NiJ9LCJNYXhXaWR0aCI6MjAwLjAsIk1heEhlaWdodCI6IkluZmluaXR5IiwiU21hcnRGb3JlZ3JvdW5kSXNBY3RpdmUiOmZhbHNlLCJIb3Jpem9udGFsQWxpZ25tZW50IjowLCJWZXJ0aWNhbEFsaWdubWVudCI6MCwiU21hcnRGb3JlZ3JvdW5kIjpudWxsLCJCYWNrZ3JvdW5kRmlsbFR5cGUiOjAsIk1hcmdpbiI6eyIkcmVmIjoiODgifSwiUGFkZGluZyI6eyIkcmVmIjoiODkifSwiQmFja2dyb3VuZCI6eyIkcmVmIjoiOTAifSwiSXNWaXNpYmxlIjp0cnVlLCJXaWR0aCI6MC4wLCJIZWlnaHQiOjAuMCwiQm9yZGVyU3R5bGUiOnsiJGlkIjoiNDc0IiwiTGluZUNvbG9yIjpudWxsLCJMaW5lV2VpZ2h0IjowLjAsIkxpbmVUeXBlIjowLCJQYXJlbnRTdHlsZSI6bnVsbH0sIlBhcmVudFN0eWxlIjpudWxsfSwiRHVyYXRpb25TdHlsZSI6eyIkaWQiOiI0NzUiLCJGb250U2V0dGluZ3MiOnsiJGlkIjoiNDc2IiwiRm9udFNpemUiOjEwLCJGb250TmFtZSI6IkNhbGlicmkiLCJJc0JvbGQiOmZhbHNlLCJJc0l0YWxpYyI6ZmFsc2UsIklzVW5kZXJsaW5lZCI6ZmFsc2UsIlBhcmVudFN0eWxlIjpudWxsfSwiQXV0b1NpemUiOjAsIkZvcmVncm91bmQiOnsiJHJlZiI6IjkzIn0sIk1heFdpZHRoIjoyMDAuMCwiTWF4SGVpZ2h0IjoiSW5maW5pdHkiLCJTbWFydEZvcmVncm91bmRJc0FjdGl2ZSI6ZmFsc2UsIkhvcml6b250YWxBbGlnbm1lbnQiOjAsIlZlcnRpY2FsQWxpZ25tZW50IjowLCJTbWFydEZvcmVncm91bmQiOm51bGwsIkJhY2tncm91bmRGaWxsVHlwZSI6MCwiTWFyZ2luIjp7IiRyZWYiOiI5NSJ9LCJQYWRkaW5nIjp7IiRyZWYiOiI5NiJ9LCJCYWNrZ3JvdW5kIjp7IiRyZWYiOiI5NyJ9LCJJc1Zpc2libGUiOnRydWUsIldpZHRoIjowLjAsIkhlaWdodCI6MC4wLCJCb3JkZXJTdHlsZSI6eyIkaWQiOiI0NzciLCJMaW5lQ29sb3IiOm51bGwsIkxpbmVXZWlnaHQiOjAuMCwiTGluZVR5cGUiOjAsIlBhcmVudFN0eWxlIjpudWxsfSwiUGFyZW50U3R5bGUiOm51bGx9LCJIb3Jpem9udGFsQ29ubmVjdG9yU3R5bGUiOnsiJGlkIjoiNDc4IiwiTGluZUNvbG9yIjp7IiRyZWYiOiI5OSJ9LCJMaW5lV2VpZ2h0IjoxLjAsIkxpbmVUeXBlIjowLCJQYXJlbnRTdHlsZSI6bnVsbH0sIlZlcnRpY2FsQ29ubmVjdG9yU3R5bGUiOnsiJGlkIjoiNDc5IiwiTGluZUNvbG9yIjp7IiRyZWYiOiIxMDIifSwiTGluZVdlaWdodCI6MS4wLCJMaW5lVHlwZSI6MCwiUGFyZW50U3R5bGUiOm51bGx9LCJNYXJnaW4iOm51bGwsIlN0YXJ0RGF0ZVBvc2l0aW9uIjo0LCJFbmREYXRlUG9zaXRpb24iOjQsIkRhdGVJc1Zpc2libGUiOnRydWUsIlRpdGxlUG9zaXRpb24iOjIsIkR1cmF0aW9uUG9zaXRpb24iOjYsIlBlcmNlbnRhZ2VDb21wbGV0ZWRQb3NpdGlvbiI6NiwiU3BhY2luZyI6NSwiSXNCZWxvd1RpbWViYW5kIjpmYWxzZSwiUGVyY2VudGFnZUNvbXBsZXRlU2hhcGVPcGFjaXR5IjozNSwiU2hhcGVTdHlsZSI6eyIkaWQiOiI0ODAiLCJNYXJnaW4iOnsiJHJlZiI6IjEwNSJ9LCJQYWRkaW5nIjp7IiRyZWYiOiIxMDYifSwiQmFja2dyb3VuZCI6eyIkaWQiOiI0ODEiLCJDb2xvciI6eyIkaWQiOiI0ODIiLCJBIjoyNTUsIlIiOjkxLCJHIjoxNTUsIkIiOjIxM319LCJJc1Zpc2libGUiOnRydWUsIldpZHRoIjowLjAsIkhlaWdodCI6MjIuMCwiQm9yZGVyU3R5bGUiOnsiJGlkIjoiNDgzIiwiTGluZUNvbG9yIjp7IiRyZWYiOiIyMDkifSwiTGluZVdlaWdodCI6MC4wLCJMaW5lVHlwZSI6MCwiUGFyZW50U3R5bGUiOm51bGx9LCJQYXJlbnRTdHlsZSI6bnVsbH0sIlRpdGxlU3R5bGUiOnsiJGlkIjoiNDg0IiwiRm9udFNldHRpbmdzIjp7IiRpZCI6IjQ4NSIsIkZvbnRTaXplIjoxMSwiRm9udE5hbWUiOiJDYWxpYnJpIiwiSXNCb2xkIjp0cnVlLCJJc0l0YWxpYyI6ZmFsc2UsIklzVW5kZXJsaW5lZCI6ZmFsc2UsIlBhcmVudFN0eWxlIjpudWxsfSwiQXV0b1NpemUiOjAsIkZvcmVncm91bmQiOnsiJGlkIjoiNDg2IiwiQ29sb3IiOnsiJGlkIjoiNDg3IiwiQSI6MjU1LCJSIjowLCJHIjowLCJCIjowfX0sIk1heFdpZHRoIjo3MjAuMCwiTWF4SGVpZ2h0IjoiSW5maW5pdHkiLCJTbWFydEZvcmVncm91bmRJc0FjdGl2ZSI6ZmFsc2UsIkhvcml6b250YWxBbGlnbm1lbnQiOjEsIlZlcnRpY2FsQWxpZ25tZW50IjowLCJTbWFydEZvcmVncm91bmQiOm51bGwsIkJhY2tncm91bmRGaWxsVHlwZSI6MCwiTWFyZ2luIjp7IiRyZWYiOiIxMTYifSwiUGFkZGluZyI6eyIkcmVmIjoiMTE3In0sIkJhY2tncm91bmQiOnsiJGlkIjoiNDg4IiwiQ29sb3IiOnsiJGlkIjoiNDg5IiwiQSI6MCwiUiI6MjU1LCJHIjoyNTUsIkIiOjI1NX19LCJJc1Zpc2libGUiOnRydWUsIldpZHRoIjowLjAsIkhlaWdodCI6MC4wLCJCb3JkZXJTdHlsZSI6eyIkaWQiOiI0OTAiLCJMaW5lQ29sb3IiOm51bGwsIkxpbmVXZWlnaHQiOjAuMCwiTGluZVR5cGUiOjAsIlBhcmVudFN0eWxlIjpudWxsfSwiUGFyZW50U3R5bGUiOm51bGx9LCJEYXRlU3R5bGUiOnsiJGlkIjoiNDkxIiwiRm9udFNldHRpbmdzIjp7IiRpZCI6IjQ5MiIsIkZvbnRTaXplIjoxMCwiRm9udE5hbWUiOiJDYWxpYnJpIiwiSXNCb2xkIjpmYWxzZSwiSXNJdGFsaWMiOmZhbHNlLCJJc1VuZGVybGluZWQiOmZhbHNlLCJQYXJlbnRTdHlsZSI6bnVsbH0sIkF1dG9TaXplIjowLCJGb3JlZ3JvdW5kIjp7IiRpZCI6IjQ5MyIsIkNvbG9yIjp7IiRpZCI6IjQ5NCIsIkEiOjI1NSwiUiI6NjgsIkciOjg0LCJCIjoxMDZ9fSwiTWF4V2lkdGgiOjIwMC4wLCJNYXhIZWlnaHQiOiJJbmZpbml0eSIsIlNtYXJ0Rm9yZWdyb3VuZElzQWN0aXZlIjpmYWxzZSwiSG9yaXpvbnRhbEFsaWdubWVudCI6MCwiVmVydGljYWxBbGlnbm1lbnQiOjAsIlNtYXJ0Rm9yZWdyb3VuZCI6bnVsbCwiQmFja2dyb3VuZEZpbGxUeXBlIjowLCJNYXJnaW4iOnsiJHJlZiI6IjEyMyJ9LCJQYWRkaW5nIjp7IiRyZWYiOiIxMjQifSwiQmFja2dyb3VuZCI6eyIkaWQiOiI0OTUiLCJDb2xvciI6eyIkaWQiOiI0OTYiLCJBIjowLCJSIjoyNTUsIkciOjI1NSwiQiI6MjU1fX0sIklzVmlzaWJsZSI6dHJ1ZSwiV2lkdGgiOjAuMCwiSGVpZ2h0IjowLjAsIkJvcmRlclN0eWxlIjp7IiRpZCI6IjQ5NyIsIkxpbmVDb2xvciI6bnVsbCwiTGluZVdlaWdodCI6MC4wLCJMaW5lVHlwZSI6MCwiUGFyZW50U3R5bGUiOm51bGx9LCJQYXJlbnRTdHlsZSI6bnVsbH0sIkRhdGVGb3JtYXQiOnsiJHJlZiI6IjIyNSJ9LCJXZWVrTnVtYmVyaW5nIjp7IiRpZCI6IjQ5OCIsIkZvcm1hdCI6MCwiSXNWaXNpYmxlIjpmYWxzZSwiTGFzdEtub3duVmlzaWJpbGl0eVN0YXRlIjpmYWxzZX0sIklzVmlzaWJsZSI6dHJ1ZSwiUGFyZW50U3R5bGUiOm51bGx9LCJJbmRleCI6OSwiU21hcnREdXJhdGlvbkFjdGl2YXRlZCI6ZmFsc2UsIkRhdGVGb3JtYXQiOnsiJHJlZiI6IjIyNSJ9LCJXZWVrTnVtYmVyaW5nIjp7IiRpZCI6IjQ5OSIsIkZvcm1hdCI6MCwiSXNWaXNpYmxlIjpmYWxzZSwiTGFzdEtub3duVmlzaWJpbGl0eVN0YXRlIjpmYWxzZX0sIklkIjoiOTY4Y2M2ZWItMWQxNC00NzQ3LWFiM2QtNThjNWQ3YTA5YTA2IiwiSW1wb3J0SWQiOm51bGwsIlRpdGxlIjoiU3VibWlzc2lvbiIsIk5vdGUiOm51bGwsIkh5cGVybGluayI6eyIkaWQiOiI1MDAiLCJBZGRyZXNzIjpudWxsLCJTdWJBZGRyZXNzIjpudWxsfSwiSXNDaGFuZ2VkIjpmYWxzZSwiSXNOZXciOmZhbHNlfV0sIlN3aW1sYW5lcyI6W10sIk1zUHJvamVjdEl0ZW1zVHJlZSI6eyIkaWQiOiI1MDEiLCJSb290Ijp7IkltcG9ydElkIjpudWxsLCJJc0ltcG9ydGVkIjpmYWxzZSwiQ2hpbGRyZW4iOltdfX0sIk1ldGFkYXRhIjp7IiRpZCI6IjUwMiIsIlJlY2VudENvbG9yc0NvbGxlY3Rpb24iOiJbXSJ9LCJTZXR0aW5ncyI6eyIkaWQiOiI1MDMiLCJJbXBhT3B0aW9ucyI6eyIkaWQiOiI1MDQiLCJMZWZ0VG9SaWdodCI6ZmFsc2UsIlBheWxvYWRPcHRpb25zIjoyfSwiVXNlQ29tcHJlc3Npb24iOmZhbHNlLCJDb21wcmVzaW9uUGVyY2VudGFnZSI6NTAuMCwiSW5hY3RpdmVJbnRlcnZhbFdpZHRoVGhyZXNob2xkIjozMC4wLCJJbmFjdGl2ZUludGVydmFsV2lkdGgiOjEuMCwiU3BsaXRUYXNrcyI6ZmFsc2UsIlVzZUNsdXN0ZXIiOmZhbHNlLCJFcHNpbG9uIjo1LjAsIk1pblBvaW50c1RvRm9ybUFDbHVzdGVyIjoyLCJHZW5lcmF0ZUludmlzaWJsZVNoYXBlcyI6ZmFsc2UsIlNtYXJ0VGltZWxpbmVUYXNrUGVyY2VudGFnZUZpdCI6ZmFsc2V9LCJJc05ldyI6ZmFsc2UsIkltcG9ydFR5cGUiOjAsIkZpbGVQYXRoIjpudWxsLCJUaW1lQ29uZmlndXJhdGlvbiI6eyIkaWQiOiI1MDUiLCJVc2VUaW1lIjpmYWxzZSwiV29ya0RheVN0YXJ0IjoiMDA6MDA6MDAiLCJXb3JrRGF5RW5kIjoiMjM6NTk6MDAifSwiTGFzdFVzZWRUZW1wbGF0ZUlkIjoiOTVmYmYwZjctY2E2Yy00YmI5LWFlNzgtMWFhZjJjYTk2MGViIiwiRmlyc3RXZWVrT2ZZZWFyIjowfQ=="/>
   <p:tag name="__MASTER" val="__part_0"/>
 </p:tagLst>
 </file>
@@ -11346,6 +11346,21 @@
 </file>
 
 <file path=customXml/item1.xml><?xml version="1.0" encoding="utf-8"?>
+<?mso-contentType ?>
+<FormTemplates xmlns="http://schemas.microsoft.com/sharepoint/v3/contenttype/forms">
+  <Display>DocumentLibraryForm</Display>
+  <Edit>DocumentLibraryForm</Edit>
+  <New>DocumentLibraryForm</New>
+</FormTemplates>
+</file>
+
+<file path=customXml/item2.xml><?xml version="1.0" encoding="utf-8"?>
+<p:properties xmlns:p="http://schemas.microsoft.com/office/2006/metadata/properties" xmlns:xsi="http://www.w3.org/2001/XMLSchema-instance" xmlns:pc="http://schemas.microsoft.com/office/infopath/2007/PartnerControls">
+  <documentManagement/>
+</p:properties>
+</file>
+
+<file path=customXml/item3.xml><?xml version="1.0" encoding="utf-8"?>
 <ct:contentTypeSchema xmlns:ct="http://schemas.microsoft.com/office/2006/metadata/contentType" xmlns:ma="http://schemas.microsoft.com/office/2006/metadata/properties/metaAttributes" ct:_="" ma:_="" ma:contentTypeName="Document" ma:contentTypeID="0x0101009F5D4579C79BA848862C07EA745A59DA" ma:contentTypeVersion="12" ma:contentTypeDescription="Create a new document." ma:contentTypeScope="" ma:versionID="561b97d3cd4e430cff1b017a8df43b50">
   <xsd:schema xmlns:xsd="http://www.w3.org/2001/XMLSchema" xmlns:xs="http://www.w3.org/2001/XMLSchema" xmlns:p="http://schemas.microsoft.com/office/2006/metadata/properties" xmlns:ns3="7a019f6c-b0e0-4e4c-a8bf-0404b70041b7" xmlns:ns4="3a44955a-9611-4e11-b394-5c7f996d2a5e" targetNamespace="http://schemas.microsoft.com/office/2006/metadata/properties" ma:root="true" ma:fieldsID="f385fe62994dfd7c4b5d8e86d7939601" ns3:_="" ns4:_="">
     <xsd:import namespace="7a019f6c-b0e0-4e4c-a8bf-0404b70041b7"/>
@@ -11562,22 +11577,32 @@
 </ct:contentTypeSchema>
 </file>
 
-<file path=customXml/item2.xml><?xml version="1.0" encoding="utf-8"?>
-<p:properties xmlns:p="http://schemas.microsoft.com/office/2006/metadata/properties" xmlns:xsi="http://www.w3.org/2001/XMLSchema-instance" xmlns:pc="http://schemas.microsoft.com/office/infopath/2007/PartnerControls">
-  <documentManagement/>
-</p:properties>
-</file>
-
-<file path=customXml/item3.xml><?xml version="1.0" encoding="utf-8"?>
-<?mso-contentType ?>
-<FormTemplates xmlns="http://schemas.microsoft.com/sharepoint/v3/contenttype/forms">
-  <Display>DocumentLibraryForm</Display>
-  <Edit>DocumentLibraryForm</Edit>
-  <New>DocumentLibraryForm</New>
-</FormTemplates>
-</file>
-
 <file path=customXml/itemProps1.xml><?xml version="1.0" encoding="utf-8"?>
+<ds:datastoreItem xmlns:ds="http://schemas.openxmlformats.org/officeDocument/2006/customXml" ds:itemID="{B9505F6C-6655-4394-A390-5D0FFB49AEA6}">
+  <ds:schemaRefs>
+    <ds:schemaRef ds:uri="http://schemas.microsoft.com/sharepoint/v3/contenttype/forms"/>
+  </ds:schemaRefs>
+</ds:datastoreItem>
+</file>
+
+<file path=customXml/itemProps2.xml><?xml version="1.0" encoding="utf-8"?>
+<ds:datastoreItem xmlns:ds="http://schemas.openxmlformats.org/officeDocument/2006/customXml" ds:itemID="{A75EC8C0-5113-4EFD-AE80-6BEE7563151B}">
+  <ds:schemaRefs>
+    <ds:schemaRef ds:uri="http://purl.org/dc/elements/1.1/"/>
+    <ds:schemaRef ds:uri="http://schemas.microsoft.com/office/2006/metadata/properties"/>
+    <ds:schemaRef ds:uri="http://purl.org/dc/terms/"/>
+    <ds:schemaRef ds:uri="3a44955a-9611-4e11-b394-5c7f996d2a5e"/>
+    <ds:schemaRef ds:uri="http://schemas.microsoft.com/office/infopath/2007/PartnerControls"/>
+    <ds:schemaRef ds:uri="http://schemas.microsoft.com/office/2006/documentManagement/types"/>
+    <ds:schemaRef ds:uri="7a019f6c-b0e0-4e4c-a8bf-0404b70041b7"/>
+    <ds:schemaRef ds:uri="http://schemas.openxmlformats.org/package/2006/metadata/core-properties"/>
+    <ds:schemaRef ds:uri="http://www.w3.org/XML/1998/namespace"/>
+    <ds:schemaRef ds:uri="http://purl.org/dc/dcmitype/"/>
+  </ds:schemaRefs>
+</ds:datastoreItem>
+</file>
+
+<file path=customXml/itemProps3.xml><?xml version="1.0" encoding="utf-8"?>
 <ds:datastoreItem xmlns:ds="http://schemas.openxmlformats.org/officeDocument/2006/customXml" ds:itemID="{155CF974-FFF5-49BF-A517-7EABF81AD041}">
   <ds:schemaRefs>
     <ds:schemaRef ds:uri="http://schemas.microsoft.com/office/2006/metadata/contentType"/>
@@ -11594,29 +11619,4 @@
     <ds:schemaRef ds:uri="http://schemas.microsoft.com/internal/obd"/>
   </ds:schemaRefs>
 </ds:datastoreItem>
-</file>
-
-<file path=customXml/itemProps2.xml><?xml version="1.0" encoding="utf-8"?>
-<ds:datastoreItem xmlns:ds="http://schemas.openxmlformats.org/officeDocument/2006/customXml" ds:itemID="{A75EC8C0-5113-4EFD-AE80-6BEE7563151B}">
-  <ds:schemaRefs>
-    <ds:schemaRef ds:uri="http://purl.org/dc/elements/1.1/"/>
-    <ds:schemaRef ds:uri="http://schemas.microsoft.com/office/2006/metadata/properties"/>
-    <ds:schemaRef ds:uri="http://purl.org/dc/terms/"/>
-    <ds:schemaRef ds:uri="3a44955a-9611-4e11-b394-5c7f996d2a5e"/>
-    <ds:schemaRef ds:uri="http://schemas.microsoft.com/office/infopath/2007/PartnerControls"/>
-    <ds:schemaRef ds:uri="http://schemas.microsoft.com/office/2006/documentManagement/types"/>
-    <ds:schemaRef ds:uri="7a019f6c-b0e0-4e4c-a8bf-0404b70041b7"/>
-    <ds:schemaRef ds:uri="http://schemas.openxmlformats.org/package/2006/metadata/core-properties"/>
-    <ds:schemaRef ds:uri="http://www.w3.org/XML/1998/namespace"/>
-    <ds:schemaRef ds:uri="http://purl.org/dc/dcmitype/"/>
-  </ds:schemaRefs>
-</ds:datastoreItem>
-</file>
-
-<file path=customXml/itemProps3.xml><?xml version="1.0" encoding="utf-8"?>
-<ds:datastoreItem xmlns:ds="http://schemas.openxmlformats.org/officeDocument/2006/customXml" ds:itemID="{B9505F6C-6655-4394-A390-5D0FFB49AEA6}">
-  <ds:schemaRefs>
-    <ds:schemaRef ds:uri="http://schemas.microsoft.com/sharepoint/v3/contenttype/forms"/>
-  </ds:schemaRefs>
-</ds:datastoreItem>
 </file>
</xml_diff>